<commit_message>
Add ppt file for Q1A for Question Set 1
</commit_message>
<xml_diff>
--- a/slideshow/movies-db-slideshow.pptx
+++ b/slideshow/movies-db-slideshow.pptx
@@ -6,6 +6,7 @@
   </p:sldMasterIdLst>
   <p:sldIdLst>
     <p:sldId id="256" r:id="rId2"/>
+    <p:sldId id="257" r:id="rId3"/>
   </p:sldIdLst>
   <p:sldSz cx="9144000" cy="6858000" type="screen4x3"/>
   <p:notesSz cx="6858000" cy="9144000"/>
@@ -207,11 +208,11 @@
           <c:showBubbleSize val="0"/>
         </c:dLbls>
         <c:gapWidth val="75"/>
-        <c:axId val="115507584"/>
-        <c:axId val="115509504"/>
+        <c:axId val="77141504"/>
+        <c:axId val="77143424"/>
       </c:barChart>
       <c:catAx>
-        <c:axId val="115507584"/>
+        <c:axId val="77141504"/>
         <c:scaling>
           <c:orientation val="minMax"/>
         </c:scaling>
@@ -240,7 +241,7 @@
         <c:majorTickMark val="none"/>
         <c:minorTickMark val="none"/>
         <c:tickLblPos val="nextTo"/>
-        <c:crossAx val="115509504"/>
+        <c:crossAx val="77143424"/>
         <c:crosses val="autoZero"/>
         <c:auto val="1"/>
         <c:lblAlgn val="ctr"/>
@@ -248,7 +249,7 @@
         <c:noMultiLvlLbl val="0"/>
       </c:catAx>
       <c:valAx>
-        <c:axId val="115509504"/>
+        <c:axId val="77143424"/>
         <c:scaling>
           <c:orientation val="minMax"/>
         </c:scaling>
@@ -277,7 +278,225 @@
         <c:majorTickMark val="none"/>
         <c:minorTickMark val="none"/>
         <c:tickLblPos val="nextTo"/>
-        <c:crossAx val="115507584"/>
+        <c:crossAx val="77141504"/>
+        <c:crosses val="autoZero"/>
+        <c:crossBetween val="between"/>
+      </c:valAx>
+    </c:plotArea>
+    <c:plotVisOnly val="1"/>
+    <c:dispBlanksAs val="gap"/>
+    <c:showDLblsOverMax val="0"/>
+  </c:chart>
+  <c:externalData r:id="rId2">
+    <c:autoUpdate val="0"/>
+  </c:externalData>
+</c:chartSpace>
+</file>
+
+<file path=ppt/charts/chart2.xml><?xml version="1.0" encoding="utf-8"?>
+<c:chartSpace xmlns:c="http://schemas.openxmlformats.org/drawingml/2006/chart" xmlns:a="http://schemas.openxmlformats.org/drawingml/2006/main" xmlns:r="http://schemas.openxmlformats.org/officeDocument/2006/relationships">
+  <c:date1904 val="0"/>
+  <c:lang val="en-ZA"/>
+  <c:roundedCorners val="0"/>
+  <mc:AlternateContent xmlns:mc="http://schemas.openxmlformats.org/markup-compatibility/2006">
+    <mc:Choice xmlns:c14="http://schemas.microsoft.com/office/drawing/2007/8/2/chart" Requires="c14">
+      <c14:style val="102"/>
+    </mc:Choice>
+    <mc:Fallback>
+      <c:style val="2"/>
+    </mc:Fallback>
+  </mc:AlternateContent>
+  <c:clrMapOvr bg1="lt1" tx1="dk1" bg2="lt2" tx2="dk2" accent1="accent1" accent2="accent2" accent3="accent3" accent4="accent4" accent5="accent5" accent6="accent6" hlink="hlink" folHlink="folHlink"/>
+  <c:chart>
+    <c:title>
+      <c:tx>
+        <c:rich>
+          <a:bodyPr/>
+          <a:lstStyle/>
+          <a:p>
+            <a:pPr>
+              <a:defRPr sz="3600"/>
+            </a:pPr>
+            <a:r>
+              <a:rPr lang="en-ZA" sz="3600"/>
+              <a:t>Top 10</a:t>
+            </a:r>
+            <a:r>
+              <a:rPr lang="en-ZA" sz="3600" baseline="0"/>
+              <a:t> Animation Movies</a:t>
+            </a:r>
+            <a:endParaRPr lang="en-ZA" sz="3600"/>
+          </a:p>
+        </c:rich>
+      </c:tx>
+      <c:layout/>
+      <c:overlay val="0"/>
+    </c:title>
+    <c:autoTitleDeleted val="0"/>
+    <c:plotArea>
+      <c:layout/>
+      <c:barChart>
+        <c:barDir val="bar"/>
+        <c:grouping val="clustered"/>
+        <c:varyColors val="0"/>
+        <c:ser>
+          <c:idx val="0"/>
+          <c:order val="0"/>
+          <c:tx>
+            <c:strRef>
+              <c:f>'top-10-animation-movies'!$C$1</c:f>
+              <c:strCache>
+                <c:ptCount val="1"/>
+                <c:pt idx="0">
+                  <c:v>rental_count</c:v>
+                </c:pt>
+              </c:strCache>
+            </c:strRef>
+          </c:tx>
+          <c:invertIfNegative val="0"/>
+          <c:cat>
+            <c:strRef>
+              <c:f>'top-10-animation-movies'!$A$2:$A$11</c:f>
+              <c:strCache>
+                <c:ptCount val="10"/>
+                <c:pt idx="0">
+                  <c:v>Juggler Hardly</c:v>
+                </c:pt>
+                <c:pt idx="1">
+                  <c:v>Dogma Family</c:v>
+                </c:pt>
+                <c:pt idx="2">
+                  <c:v>Storm Happiness</c:v>
+                </c:pt>
+                <c:pt idx="3">
+                  <c:v>Forrester Comancheros</c:v>
+                </c:pt>
+                <c:pt idx="4">
+                  <c:v>Blackout Private</c:v>
+                </c:pt>
+                <c:pt idx="5">
+                  <c:v>Gangs Pride</c:v>
+                </c:pt>
+                <c:pt idx="6">
+                  <c:v>Tracy Cider</c:v>
+                </c:pt>
+                <c:pt idx="7">
+                  <c:v>Clash Freddy</c:v>
+                </c:pt>
+                <c:pt idx="8">
+                  <c:v>Double Wrath</c:v>
+                </c:pt>
+                <c:pt idx="9">
+                  <c:v>Telemark Heartbreakers</c:v>
+                </c:pt>
+              </c:strCache>
+            </c:strRef>
+          </c:cat>
+          <c:val>
+            <c:numRef>
+              <c:f>'top-10-animation-movies'!$C$2:$C$11</c:f>
+              <c:numCache>
+                <c:formatCode>General</c:formatCode>
+                <c:ptCount val="10"/>
+                <c:pt idx="0">
+                  <c:v>32</c:v>
+                </c:pt>
+                <c:pt idx="1">
+                  <c:v>30</c:v>
+                </c:pt>
+                <c:pt idx="2">
+                  <c:v>29</c:v>
+                </c:pt>
+                <c:pt idx="3">
+                  <c:v>27</c:v>
+                </c:pt>
+                <c:pt idx="4">
+                  <c:v>27</c:v>
+                </c:pt>
+                <c:pt idx="5">
+                  <c:v>27</c:v>
+                </c:pt>
+                <c:pt idx="6">
+                  <c:v>26</c:v>
+                </c:pt>
+                <c:pt idx="7">
+                  <c:v>25</c:v>
+                </c:pt>
+                <c:pt idx="8">
+                  <c:v>25</c:v>
+                </c:pt>
+                <c:pt idx="9">
+                  <c:v>25</c:v>
+                </c:pt>
+              </c:numCache>
+            </c:numRef>
+          </c:val>
+        </c:ser>
+        <c:dLbls>
+          <c:showLegendKey val="0"/>
+          <c:showVal val="1"/>
+          <c:showCatName val="0"/>
+          <c:showSerName val="0"/>
+          <c:showPercent val="0"/>
+          <c:showBubbleSize val="0"/>
+        </c:dLbls>
+        <c:gapWidth val="75"/>
+        <c:axId val="97322496"/>
+        <c:axId val="97324032"/>
+      </c:barChart>
+      <c:catAx>
+        <c:axId val="97322496"/>
+        <c:scaling>
+          <c:orientation val="maxMin"/>
+        </c:scaling>
+        <c:delete val="0"/>
+        <c:axPos val="l"/>
+        <c:majorTickMark val="none"/>
+        <c:minorTickMark val="none"/>
+        <c:tickLblPos val="nextTo"/>
+        <c:crossAx val="97324032"/>
+        <c:crosses val="autoZero"/>
+        <c:auto val="1"/>
+        <c:lblAlgn val="ctr"/>
+        <c:lblOffset val="100"/>
+        <c:noMultiLvlLbl val="0"/>
+      </c:catAx>
+      <c:valAx>
+        <c:axId val="97324032"/>
+        <c:scaling>
+          <c:orientation val="minMax"/>
+        </c:scaling>
+        <c:delete val="0"/>
+        <c:axPos val="t"/>
+        <c:title>
+          <c:tx>
+            <c:rich>
+              <a:bodyPr/>
+              <a:lstStyle/>
+              <a:p>
+                <a:pPr>
+                  <a:defRPr sz="1800"/>
+                </a:pPr>
+                <a:r>
+                  <a:rPr lang="en-ZA" sz="1800"/>
+                  <a:t>Rental</a:t>
+                </a:r>
+                <a:r>
+                  <a:rPr lang="en-ZA" sz="1800" baseline="0"/>
+                  <a:t> Count</a:t>
+                </a:r>
+                <a:endParaRPr lang="en-ZA" sz="1800"/>
+              </a:p>
+            </c:rich>
+          </c:tx>
+          <c:layout/>
+          <c:overlay val="0"/>
+        </c:title>
+        <c:numFmt formatCode="General" sourceLinked="1"/>
+        <c:majorTickMark val="none"/>
+        <c:minorTickMark val="none"/>
+        <c:tickLblPos val="nextTo"/>
+        <c:crossAx val="97322496"/>
         <c:crosses val="autoZero"/>
         <c:crossBetween val="between"/>
       </c:valAx>
@@ -4374,6 +4593,131 @@
     <p:extLst>
       <p:ext uri="{BB962C8B-B14F-4D97-AF65-F5344CB8AC3E}">
         <p14:creationId xmlns:p14="http://schemas.microsoft.com/office/powerpoint/2010/main" val="3195493431"/>
+      </p:ext>
+    </p:extLst>
+  </p:cSld>
+  <p:clrMapOvr>
+    <a:masterClrMapping/>
+  </p:clrMapOvr>
+  <p:timing>
+    <p:tnLst>
+      <p:par>
+        <p:cTn id="1" dur="indefinite" restart="never" nodeType="tmRoot"/>
+      </p:par>
+    </p:tnLst>
+  </p:timing>
+</p:sld>
+</file>
+
+<file path=ppt/slides/slide2.xml><?xml version="1.0" encoding="utf-8"?>
+<p:sld xmlns:a="http://schemas.openxmlformats.org/drawingml/2006/main" xmlns:r="http://schemas.openxmlformats.org/officeDocument/2006/relationships" xmlns:p="http://schemas.openxmlformats.org/presentationml/2006/main">
+  <p:cSld>
+    <p:spTree>
+      <p:nvGrpSpPr>
+        <p:cNvPr id="1" name=""/>
+        <p:cNvGrpSpPr/>
+        <p:nvPr/>
+      </p:nvGrpSpPr>
+      <p:grpSpPr>
+        <a:xfrm>
+          <a:off x="0" y="0"/>
+          <a:ext cx="0" cy="0"/>
+          <a:chOff x="0" y="0"/>
+          <a:chExt cx="0" cy="0"/>
+        </a:xfrm>
+      </p:grpSpPr>
+      <p:sp>
+        <p:nvSpPr>
+          <p:cNvPr id="2" name="Title 1"/>
+          <p:cNvSpPr>
+            <a:spLocks noGrp="1"/>
+          </p:cNvSpPr>
+          <p:nvPr>
+            <p:ph type="title"/>
+          </p:nvPr>
+        </p:nvSpPr>
+        <p:spPr>
+          <a:xfrm>
+            <a:off x="5868144" y="764704"/>
+            <a:ext cx="2868632" cy="1215090"/>
+          </a:xfrm>
+        </p:spPr>
+        <p:txBody>
+          <a:bodyPr>
+            <a:noAutofit/>
+          </a:bodyPr>
+          <a:lstStyle/>
+          <a:p>
+            <a:pPr algn="ctr"/>
+            <a:r>
+              <a:rPr lang="en-ZA" sz="2400" dirty="0" smtClean="0"/>
+              <a:t>What are the top 10 Animation movies?</a:t>
+            </a:r>
+            <a:endParaRPr lang="en-ZA" sz="2400" dirty="0"/>
+          </a:p>
+        </p:txBody>
+      </p:sp>
+      <p:sp>
+        <p:nvSpPr>
+          <p:cNvPr id="5" name="Text Placeholder 4"/>
+          <p:cNvSpPr>
+            <a:spLocks noGrp="1"/>
+          </p:cNvSpPr>
+          <p:nvPr>
+            <p:ph type="body" idx="2"/>
+          </p:nvPr>
+        </p:nvSpPr>
+        <p:spPr>
+          <a:xfrm>
+            <a:off x="5868144" y="2010727"/>
+            <a:ext cx="2868632" cy="4617720"/>
+          </a:xfrm>
+        </p:spPr>
+        <p:txBody>
+          <a:bodyPr/>
+          <a:lstStyle/>
+          <a:p>
+            <a:r>
+              <a:rPr lang="en-ZA" dirty="0" smtClean="0"/>
+              <a:t>The movie ‘Juggler Hardly’ is the most popular animation movie, with 32 rentals </a:t>
+            </a:r>
+            <a:r>
+              <a:rPr lang="en-ZA" smtClean="0"/>
+              <a:t>in total.</a:t>
+            </a:r>
+            <a:endParaRPr lang="en-ZA" dirty="0"/>
+          </a:p>
+        </p:txBody>
+      </p:sp>
+      <p:graphicFrame>
+        <p:nvGraphicFramePr>
+          <p:cNvPr id="6" name="Content Placeholder 5"/>
+          <p:cNvGraphicFramePr>
+            <a:graphicFrameLocks noGrp="1"/>
+          </p:cNvGraphicFramePr>
+          <p:nvPr>
+            <p:ph sz="half" idx="1"/>
+            <p:extLst>
+              <p:ext uri="{D42A27DB-BD31-4B8C-83A1-F6EECF244321}">
+                <p14:modId xmlns:p14="http://schemas.microsoft.com/office/powerpoint/2010/main" val="1016686811"/>
+              </p:ext>
+            </p:extLst>
+          </p:nvPr>
+        </p:nvGraphicFramePr>
+        <p:xfrm>
+          <a:off x="152400" y="776288"/>
+          <a:ext cx="5715744" cy="5851525"/>
+        </p:xfrm>
+        <a:graphic>
+          <a:graphicData uri="http://schemas.openxmlformats.org/drawingml/2006/chart">
+            <c:chart xmlns:c="http://schemas.openxmlformats.org/drawingml/2006/chart" xmlns:r="http://schemas.openxmlformats.org/officeDocument/2006/relationships" r:id="rId2"/>
+          </a:graphicData>
+        </a:graphic>
+      </p:graphicFrame>
+    </p:spTree>
+    <p:extLst>
+      <p:ext uri="{BB962C8B-B14F-4D97-AF65-F5344CB8AC3E}">
+        <p14:creationId xmlns:p14="http://schemas.microsoft.com/office/powerpoint/2010/main" val="3515908278"/>
       </p:ext>
     </p:extLst>
   </p:cSld>
@@ -4951,4 +5295,285 @@
     </a:bgFillStyleLst>
   </a:fmtScheme>
 </a:themeOverride>
+</file>
+
+<file path=ppt/theme/themeOverride2.xml><?xml version="1.0" encoding="utf-8"?>
+<a:themeOverride xmlns:a="http://schemas.openxmlformats.org/drawingml/2006/main">
+  <a:clrScheme name="Office">
+    <a:dk1>
+      <a:sysClr val="windowText" lastClr="000000"/>
+    </a:dk1>
+    <a:lt1>
+      <a:sysClr val="window" lastClr="FFFFFF"/>
+    </a:lt1>
+    <a:dk2>
+      <a:srgbClr val="1F497D"/>
+    </a:dk2>
+    <a:lt2>
+      <a:srgbClr val="EEECE1"/>
+    </a:lt2>
+    <a:accent1>
+      <a:srgbClr val="4F81BD"/>
+    </a:accent1>
+    <a:accent2>
+      <a:srgbClr val="C0504D"/>
+    </a:accent2>
+    <a:accent3>
+      <a:srgbClr val="9BBB59"/>
+    </a:accent3>
+    <a:accent4>
+      <a:srgbClr val="8064A2"/>
+    </a:accent4>
+    <a:accent5>
+      <a:srgbClr val="4BACC6"/>
+    </a:accent5>
+    <a:accent6>
+      <a:srgbClr val="F79646"/>
+    </a:accent6>
+    <a:hlink>
+      <a:srgbClr val="0000FF"/>
+    </a:hlink>
+    <a:folHlink>
+      <a:srgbClr val="800080"/>
+    </a:folHlink>
+  </a:clrScheme>
+  <a:fontScheme name="Office">
+    <a:majorFont>
+      <a:latin typeface="Cambria"/>
+      <a:ea typeface=""/>
+      <a:cs typeface=""/>
+      <a:font script="Jpan" typeface="ＭＳ Ｐゴシック"/>
+      <a:font script="Hang" typeface="맑은 고딕"/>
+      <a:font script="Hans" typeface="宋体"/>
+      <a:font script="Hant" typeface="新細明體"/>
+      <a:font script="Arab" typeface="Times New Roman"/>
+      <a:font script="Hebr" typeface="Times New Roman"/>
+      <a:font script="Thai" typeface="Tahoma"/>
+      <a:font script="Ethi" typeface="Nyala"/>
+      <a:font script="Beng" typeface="Vrinda"/>
+      <a:font script="Gujr" typeface="Shruti"/>
+      <a:font script="Khmr" typeface="MoolBoran"/>
+      <a:font script="Knda" typeface="Tunga"/>
+      <a:font script="Guru" typeface="Raavi"/>
+      <a:font script="Cans" typeface="Euphemia"/>
+      <a:font script="Cher" typeface="Plantagenet Cherokee"/>
+      <a:font script="Yiii" typeface="Microsoft Yi Baiti"/>
+      <a:font script="Tibt" typeface="Microsoft Himalaya"/>
+      <a:font script="Thaa" typeface="MV Boli"/>
+      <a:font script="Deva" typeface="Mangal"/>
+      <a:font script="Telu" typeface="Gautami"/>
+      <a:font script="Taml" typeface="Latha"/>
+      <a:font script="Syrc" typeface="Estrangelo Edessa"/>
+      <a:font script="Orya" typeface="Kalinga"/>
+      <a:font script="Mlym" typeface="Kartika"/>
+      <a:font script="Laoo" typeface="DokChampa"/>
+      <a:font script="Sinh" typeface="Iskoola Pota"/>
+      <a:font script="Mong" typeface="Mongolian Baiti"/>
+      <a:font script="Viet" typeface="Times New Roman"/>
+      <a:font script="Uigh" typeface="Microsoft Uighur"/>
+      <a:font script="Geor" typeface="Sylfaen"/>
+    </a:majorFont>
+    <a:minorFont>
+      <a:latin typeface="Calibri"/>
+      <a:ea typeface=""/>
+      <a:cs typeface=""/>
+      <a:font script="Jpan" typeface="ＭＳ Ｐゴシック"/>
+      <a:font script="Hang" typeface="맑은 고딕"/>
+      <a:font script="Hans" typeface="宋体"/>
+      <a:font script="Hant" typeface="新細明體"/>
+      <a:font script="Arab" typeface="Arial"/>
+      <a:font script="Hebr" typeface="Arial"/>
+      <a:font script="Thai" typeface="Tahoma"/>
+      <a:font script="Ethi" typeface="Nyala"/>
+      <a:font script="Beng" typeface="Vrinda"/>
+      <a:font script="Gujr" typeface="Shruti"/>
+      <a:font script="Khmr" typeface="DaunPenh"/>
+      <a:font script="Knda" typeface="Tunga"/>
+      <a:font script="Guru" typeface="Raavi"/>
+      <a:font script="Cans" typeface="Euphemia"/>
+      <a:font script="Cher" typeface="Plantagenet Cherokee"/>
+      <a:font script="Yiii" typeface="Microsoft Yi Baiti"/>
+      <a:font script="Tibt" typeface="Microsoft Himalaya"/>
+      <a:font script="Thaa" typeface="MV Boli"/>
+      <a:font script="Deva" typeface="Mangal"/>
+      <a:font script="Telu" typeface="Gautami"/>
+      <a:font script="Taml" typeface="Latha"/>
+      <a:font script="Syrc" typeface="Estrangelo Edessa"/>
+      <a:font script="Orya" typeface="Kalinga"/>
+      <a:font script="Mlym" typeface="Kartika"/>
+      <a:font script="Laoo" typeface="DokChampa"/>
+      <a:font script="Sinh" typeface="Iskoola Pota"/>
+      <a:font script="Mong" typeface="Mongolian Baiti"/>
+      <a:font script="Viet" typeface="Arial"/>
+      <a:font script="Uigh" typeface="Microsoft Uighur"/>
+      <a:font script="Geor" typeface="Sylfaen"/>
+    </a:minorFont>
+  </a:fontScheme>
+  <a:fmtScheme name="Office">
+    <a:fillStyleLst>
+      <a:solidFill>
+        <a:schemeClr val="phClr"/>
+      </a:solidFill>
+      <a:gradFill rotWithShape="1">
+        <a:gsLst>
+          <a:gs pos="0">
+            <a:schemeClr val="phClr">
+              <a:tint val="50000"/>
+              <a:satMod val="300000"/>
+            </a:schemeClr>
+          </a:gs>
+          <a:gs pos="35000">
+            <a:schemeClr val="phClr">
+              <a:tint val="37000"/>
+              <a:satMod val="300000"/>
+            </a:schemeClr>
+          </a:gs>
+          <a:gs pos="100000">
+            <a:schemeClr val="phClr">
+              <a:tint val="15000"/>
+              <a:satMod val="350000"/>
+            </a:schemeClr>
+          </a:gs>
+        </a:gsLst>
+        <a:lin ang="16200000" scaled="1"/>
+      </a:gradFill>
+      <a:gradFill rotWithShape="1">
+        <a:gsLst>
+          <a:gs pos="0">
+            <a:schemeClr val="phClr">
+              <a:shade val="51000"/>
+              <a:satMod val="130000"/>
+            </a:schemeClr>
+          </a:gs>
+          <a:gs pos="80000">
+            <a:schemeClr val="phClr">
+              <a:shade val="93000"/>
+              <a:satMod val="130000"/>
+            </a:schemeClr>
+          </a:gs>
+          <a:gs pos="100000">
+            <a:schemeClr val="phClr">
+              <a:shade val="94000"/>
+              <a:satMod val="135000"/>
+            </a:schemeClr>
+          </a:gs>
+        </a:gsLst>
+        <a:lin ang="16200000" scaled="0"/>
+      </a:gradFill>
+    </a:fillStyleLst>
+    <a:lnStyleLst>
+      <a:ln w="9525" cap="flat" cmpd="sng" algn="ctr">
+        <a:solidFill>
+          <a:schemeClr val="phClr">
+            <a:shade val="95000"/>
+            <a:satMod val="105000"/>
+          </a:schemeClr>
+        </a:solidFill>
+        <a:prstDash val="solid"/>
+      </a:ln>
+      <a:ln w="25400" cap="flat" cmpd="sng" algn="ctr">
+        <a:solidFill>
+          <a:schemeClr val="phClr"/>
+        </a:solidFill>
+        <a:prstDash val="solid"/>
+      </a:ln>
+      <a:ln w="38100" cap="flat" cmpd="sng" algn="ctr">
+        <a:solidFill>
+          <a:schemeClr val="phClr"/>
+        </a:solidFill>
+        <a:prstDash val="solid"/>
+      </a:ln>
+    </a:lnStyleLst>
+    <a:effectStyleLst>
+      <a:effectStyle>
+        <a:effectLst>
+          <a:outerShdw blurRad="40000" dist="20000" dir="5400000" rotWithShape="0">
+            <a:srgbClr val="000000">
+              <a:alpha val="38000"/>
+            </a:srgbClr>
+          </a:outerShdw>
+        </a:effectLst>
+      </a:effectStyle>
+      <a:effectStyle>
+        <a:effectLst>
+          <a:outerShdw blurRad="40000" dist="23000" dir="5400000" rotWithShape="0">
+            <a:srgbClr val="000000">
+              <a:alpha val="35000"/>
+            </a:srgbClr>
+          </a:outerShdw>
+        </a:effectLst>
+      </a:effectStyle>
+      <a:effectStyle>
+        <a:effectLst>
+          <a:outerShdw blurRad="40000" dist="23000" dir="5400000" rotWithShape="0">
+            <a:srgbClr val="000000">
+              <a:alpha val="35000"/>
+            </a:srgbClr>
+          </a:outerShdw>
+        </a:effectLst>
+        <a:scene3d>
+          <a:camera prst="orthographicFront">
+            <a:rot lat="0" lon="0" rev="0"/>
+          </a:camera>
+          <a:lightRig rig="threePt" dir="t">
+            <a:rot lat="0" lon="0" rev="1200000"/>
+          </a:lightRig>
+        </a:scene3d>
+        <a:sp3d>
+          <a:bevelT w="63500" h="25400"/>
+        </a:sp3d>
+      </a:effectStyle>
+    </a:effectStyleLst>
+    <a:bgFillStyleLst>
+      <a:solidFill>
+        <a:schemeClr val="phClr"/>
+      </a:solidFill>
+      <a:gradFill rotWithShape="1">
+        <a:gsLst>
+          <a:gs pos="0">
+            <a:schemeClr val="phClr">
+              <a:tint val="40000"/>
+              <a:satMod val="350000"/>
+            </a:schemeClr>
+          </a:gs>
+          <a:gs pos="40000">
+            <a:schemeClr val="phClr">
+              <a:tint val="45000"/>
+              <a:shade val="99000"/>
+              <a:satMod val="350000"/>
+            </a:schemeClr>
+          </a:gs>
+          <a:gs pos="100000">
+            <a:schemeClr val="phClr">
+              <a:shade val="20000"/>
+              <a:satMod val="255000"/>
+            </a:schemeClr>
+          </a:gs>
+        </a:gsLst>
+        <a:path path="circle">
+          <a:fillToRect l="50000" t="-80000" r="50000" b="180000"/>
+        </a:path>
+      </a:gradFill>
+      <a:gradFill rotWithShape="1">
+        <a:gsLst>
+          <a:gs pos="0">
+            <a:schemeClr val="phClr">
+              <a:tint val="80000"/>
+              <a:satMod val="300000"/>
+            </a:schemeClr>
+          </a:gs>
+          <a:gs pos="100000">
+            <a:schemeClr val="phClr">
+              <a:shade val="30000"/>
+              <a:satMod val="200000"/>
+            </a:schemeClr>
+          </a:gs>
+        </a:gsLst>
+        <a:path path="circle">
+          <a:fillToRect l="50000" t="50000" r="50000" b="50000"/>
+        </a:path>
+      </a:gradFill>
+    </a:bgFillStyleLst>
+  </a:fmtScheme>
+</a:themeOverride>
 </file>
</xml_diff>

<commit_message>
fix: Revise ppt visuals to comply with project specs
</commit_message>
<xml_diff>
--- a/slideshow/movies-db-slideshow.pptx
+++ b/slideshow/movies-db-slideshow.pptx
@@ -123,7 +123,38 @@
   </mc:AlternateContent>
   <c:clrMapOvr bg1="lt1" tx1="dk1" bg2="lt2" tx2="dk2" accent1="accent1" accent2="accent2" accent3="accent3" accent4="accent4" accent5="accent5" accent6="accent6" hlink="hlink" folHlink="folHlink"/>
   <c:chart>
-    <c:autoTitleDeleted val="1"/>
+    <c:title>
+      <c:tx>
+        <c:rich>
+          <a:bodyPr/>
+          <a:lstStyle/>
+          <a:p>
+            <a:pPr>
+              <a:defRPr sz="3200"/>
+            </a:pPr>
+            <a:r>
+              <a:rPr lang="en-ZA" sz="3200" dirty="0"/>
+              <a:t>Family-Friendly</a:t>
+            </a:r>
+            <a:r>
+              <a:rPr lang="en-ZA" sz="3200" baseline="0" dirty="0"/>
+              <a:t> Categories Total Rentals</a:t>
+            </a:r>
+            <a:endParaRPr lang="en-ZA" sz="3200" dirty="0"/>
+          </a:p>
+        </c:rich>
+      </c:tx>
+      <c:layout>
+        <c:manualLayout>
+          <c:xMode val="edge"/>
+          <c:yMode val="edge"/>
+          <c:x val="0.19297330321302003"/>
+          <c:y val="1.0645288914817572E-2"/>
+        </c:manualLayout>
+      </c:layout>
+      <c:overlay val="1"/>
+    </c:title>
+    <c:autoTitleDeleted val="0"/>
     <c:plotArea>
       <c:layout/>
       <c:barChart>
@@ -208,11 +239,11 @@
           <c:showBubbleSize val="0"/>
         </c:dLbls>
         <c:gapWidth val="75"/>
-        <c:axId val="77141504"/>
-        <c:axId val="77143424"/>
+        <c:axId val="76355072"/>
+        <c:axId val="76356992"/>
       </c:barChart>
       <c:catAx>
-        <c:axId val="77141504"/>
+        <c:axId val="76355072"/>
         <c:scaling>
           <c:orientation val="minMax"/>
         </c:scaling>
@@ -241,7 +272,7 @@
         <c:majorTickMark val="none"/>
         <c:minorTickMark val="none"/>
         <c:tickLblPos val="nextTo"/>
-        <c:crossAx val="77143424"/>
+        <c:crossAx val="76356992"/>
         <c:crosses val="autoZero"/>
         <c:auto val="1"/>
         <c:lblAlgn val="ctr"/>
@@ -249,7 +280,7 @@
         <c:noMultiLvlLbl val="0"/>
       </c:catAx>
       <c:valAx>
-        <c:axId val="77143424"/>
+        <c:axId val="76356992"/>
         <c:scaling>
           <c:orientation val="minMax"/>
         </c:scaling>
@@ -278,7 +309,7 @@
         <c:majorTickMark val="none"/>
         <c:minorTickMark val="none"/>
         <c:tickLblPos val="nextTo"/>
-        <c:crossAx val="77141504"/>
+        <c:crossAx val="76355072"/>
         <c:crosses val="autoZero"/>
         <c:crossBetween val="between"/>
       </c:valAx>
@@ -441,20 +472,43 @@
           <c:showBubbleSize val="0"/>
         </c:dLbls>
         <c:gapWidth val="75"/>
-        <c:axId val="97322496"/>
-        <c:axId val="97324032"/>
+        <c:axId val="135964160"/>
+        <c:axId val="135966080"/>
       </c:barChart>
       <c:catAx>
-        <c:axId val="97322496"/>
+        <c:axId val="135964160"/>
         <c:scaling>
           <c:orientation val="maxMin"/>
         </c:scaling>
         <c:delete val="0"/>
         <c:axPos val="l"/>
+        <c:title>
+          <c:tx>
+            <c:rich>
+              <a:bodyPr rot="-5400000" vert="horz"/>
+              <a:lstStyle/>
+              <a:p>
+                <a:pPr>
+                  <a:defRPr sz="1800"/>
+                </a:pPr>
+                <a:r>
+                  <a:rPr lang="en-ZA" sz="1800"/>
+                  <a:t>Animation</a:t>
+                </a:r>
+                <a:r>
+                  <a:rPr lang="en-ZA" sz="1800" baseline="0"/>
+                  <a:t> Movies</a:t>
+                </a:r>
+              </a:p>
+            </c:rich>
+          </c:tx>
+          <c:layout/>
+          <c:overlay val="0"/>
+        </c:title>
         <c:majorTickMark val="none"/>
         <c:minorTickMark val="none"/>
         <c:tickLblPos val="nextTo"/>
-        <c:crossAx val="97324032"/>
+        <c:crossAx val="135966080"/>
         <c:crosses val="autoZero"/>
         <c:auto val="1"/>
         <c:lblAlgn val="ctr"/>
@@ -462,7 +516,7 @@
         <c:noMultiLvlLbl val="0"/>
       </c:catAx>
       <c:valAx>
-        <c:axId val="97324032"/>
+        <c:axId val="135966080"/>
         <c:scaling>
           <c:orientation val="minMax"/>
         </c:scaling>
@@ -496,7 +550,7 @@
         <c:majorTickMark val="none"/>
         <c:minorTickMark val="none"/>
         <c:tickLblPos val="nextTo"/>
-        <c:crossAx val="97322496"/>
+        <c:crossAx val="135964160"/>
         <c:crosses val="autoZero"/>
         <c:crossBetween val="between"/>
       </c:valAx>
@@ -4571,17 +4625,22 @@
       </p:sp>
       <p:graphicFrame>
         <p:nvGraphicFramePr>
-          <p:cNvPr id="8" name="Content Placeholder 7"/>
+          <p:cNvPr id="6" name="Content Placeholder 5"/>
           <p:cNvGraphicFramePr>
             <a:graphicFrameLocks noGrp="1"/>
           </p:cNvGraphicFramePr>
           <p:nvPr>
             <p:ph sz="half" idx="1"/>
+            <p:extLst>
+              <p:ext uri="{D42A27DB-BD31-4B8C-83A1-F6EECF244321}">
+                <p14:modId xmlns:p14="http://schemas.microsoft.com/office/powerpoint/2010/main" val="4777255"/>
+              </p:ext>
+            </p:extLst>
           </p:nvPr>
         </p:nvGraphicFramePr>
         <p:xfrm>
           <a:off x="152400" y="776288"/>
-          <a:ext cx="5715000" cy="5851525"/>
+          <a:ext cx="5715744" cy="5965080"/>
         </p:xfrm>
         <a:graphic>
           <a:graphicData uri="http://schemas.openxmlformats.org/drawingml/2006/chart">
@@ -4691,7 +4750,7 @@
       </p:sp>
       <p:graphicFrame>
         <p:nvGraphicFramePr>
-          <p:cNvPr id="6" name="Content Placeholder 5"/>
+          <p:cNvPr id="7" name="Content Placeholder 6"/>
           <p:cNvGraphicFramePr>
             <a:graphicFrameLocks noGrp="1"/>
           </p:cNvGraphicFramePr>
@@ -4699,7 +4758,7 @@
             <p:ph sz="half" idx="1"/>
             <p:extLst>
               <p:ext uri="{D42A27DB-BD31-4B8C-83A1-F6EECF244321}">
-                <p14:modId xmlns:p14="http://schemas.microsoft.com/office/powerpoint/2010/main" val="1016686811"/>
+                <p14:modId xmlns:p14="http://schemas.microsoft.com/office/powerpoint/2010/main" val="2240966407"/>
               </p:ext>
             </p:extLst>
           </p:nvPr>

</xml_diff>

<commit_message>
feat: Add ppt visualisation for Q2 in Question Set 1
</commit_message>
<xml_diff>
--- a/slideshow/movies-db-slideshow.pptx
+++ b/slideshow/movies-db-slideshow.pptx
@@ -7,6 +7,7 @@
   <p:sldIdLst>
     <p:sldId id="256" r:id="rId2"/>
     <p:sldId id="257" r:id="rId3"/>
+    <p:sldId id="258" r:id="rId4"/>
   </p:sldIdLst>
   <p:sldSz cx="9144000" cy="6858000" type="screen4x3"/>
   <p:notesSz cx="6858000" cy="9144000"/>
@@ -239,11 +240,11 @@
           <c:showBubbleSize val="0"/>
         </c:dLbls>
         <c:gapWidth val="75"/>
-        <c:axId val="76355072"/>
-        <c:axId val="76356992"/>
+        <c:axId val="36509184"/>
+        <c:axId val="36511104"/>
       </c:barChart>
       <c:catAx>
-        <c:axId val="76355072"/>
+        <c:axId val="36509184"/>
         <c:scaling>
           <c:orientation val="minMax"/>
         </c:scaling>
@@ -272,7 +273,7 @@
         <c:majorTickMark val="none"/>
         <c:minorTickMark val="none"/>
         <c:tickLblPos val="nextTo"/>
-        <c:crossAx val="76356992"/>
+        <c:crossAx val="36511104"/>
         <c:crosses val="autoZero"/>
         <c:auto val="1"/>
         <c:lblAlgn val="ctr"/>
@@ -280,7 +281,7 @@
         <c:noMultiLvlLbl val="0"/>
       </c:catAx>
       <c:valAx>
-        <c:axId val="76356992"/>
+        <c:axId val="36511104"/>
         <c:scaling>
           <c:orientation val="minMax"/>
         </c:scaling>
@@ -309,7 +310,7 @@
         <c:majorTickMark val="none"/>
         <c:minorTickMark val="none"/>
         <c:tickLblPos val="nextTo"/>
-        <c:crossAx val="76355072"/>
+        <c:crossAx val="36509184"/>
         <c:crosses val="autoZero"/>
         <c:crossBetween val="between"/>
       </c:valAx>
@@ -472,11 +473,11 @@
           <c:showBubbleSize val="0"/>
         </c:dLbls>
         <c:gapWidth val="75"/>
-        <c:axId val="135964160"/>
-        <c:axId val="135966080"/>
+        <c:axId val="72285184"/>
+        <c:axId val="72631424"/>
       </c:barChart>
       <c:catAx>
-        <c:axId val="135964160"/>
+        <c:axId val="72285184"/>
         <c:scaling>
           <c:orientation val="maxMin"/>
         </c:scaling>
@@ -508,7 +509,7 @@
         <c:majorTickMark val="none"/>
         <c:minorTickMark val="none"/>
         <c:tickLblPos val="nextTo"/>
-        <c:crossAx val="135966080"/>
+        <c:crossAx val="72631424"/>
         <c:crosses val="autoZero"/>
         <c:auto val="1"/>
         <c:lblAlgn val="ctr"/>
@@ -516,7 +517,7 @@
         <c:noMultiLvlLbl val="0"/>
       </c:catAx>
       <c:valAx>
-        <c:axId val="135966080"/>
+        <c:axId val="72631424"/>
         <c:scaling>
           <c:orientation val="minMax"/>
         </c:scaling>
@@ -550,7 +551,7 @@
         <c:majorTickMark val="none"/>
         <c:minorTickMark val="none"/>
         <c:tickLblPos val="nextTo"/>
-        <c:crossAx val="135964160"/>
+        <c:crossAx val="72285184"/>
         <c:crosses val="autoZero"/>
         <c:crossBetween val="between"/>
       </c:valAx>
@@ -562,6 +563,533 @@
   <c:externalData r:id="rId2">
     <c:autoUpdate val="0"/>
   </c:externalData>
+</c:chartSpace>
+</file>
+
+<file path=ppt/charts/chart3.xml><?xml version="1.0" encoding="utf-8"?>
+<c:chartSpace xmlns:c="http://schemas.openxmlformats.org/drawingml/2006/chart" xmlns:a="http://schemas.openxmlformats.org/drawingml/2006/main" xmlns:r="http://schemas.openxmlformats.org/officeDocument/2006/relationships">
+  <c:date1904 val="0"/>
+  <c:lang val="en-ZA"/>
+  <c:roundedCorners val="0"/>
+  <mc:AlternateContent xmlns:mc="http://schemas.openxmlformats.org/markup-compatibility/2006">
+    <mc:Choice xmlns:c14="http://schemas.microsoft.com/office/drawing/2007/8/2/chart" Requires="c14">
+      <c14:style val="102"/>
+    </mc:Choice>
+    <mc:Fallback>
+      <c:style val="2"/>
+    </mc:Fallback>
+  </mc:AlternateContent>
+  <c:clrMapOvr bg1="lt1" tx1="dk1" bg2="lt2" tx2="dk2" accent1="accent1" accent2="accent2" accent3="accent3" accent4="accent4" accent5="accent5" accent6="accent6" hlink="hlink" folHlink="folHlink"/>
+  <c:pivotSource>
+    <c:name>[family-cat-quartiles.xlsx]Sheet1!PivotTable1</c:name>
+    <c:fmtId val="5"/>
+  </c:pivotSource>
+  <c:chart>
+    <c:title>
+      <c:tx>
+        <c:rich>
+          <a:bodyPr/>
+          <a:lstStyle/>
+          <a:p>
+            <a:pPr>
+              <a:defRPr sz="3200"/>
+            </a:pPr>
+            <a:r>
+              <a:rPr lang="en-ZA" sz="3200" dirty="0" smtClean="0"/>
+              <a:t>Family Categories</a:t>
+            </a:r>
+            <a:r>
+              <a:rPr lang="en-ZA" sz="3200" baseline="0" dirty="0" smtClean="0"/>
+              <a:t> Quartiles</a:t>
+            </a:r>
+            <a:endParaRPr lang="en-ZA" sz="3200" dirty="0"/>
+          </a:p>
+        </c:rich>
+      </c:tx>
+      <c:layout>
+        <c:manualLayout>
+          <c:xMode val="edge"/>
+          <c:yMode val="edge"/>
+          <c:x val="0.14251286267003674"/>
+          <c:y val="3.3086378281359574E-2"/>
+        </c:manualLayout>
+      </c:layout>
+      <c:overlay val="1"/>
+    </c:title>
+    <c:autoTitleDeleted val="0"/>
+    <c:pivotFmts>
+      <c:pivotFmt>
+        <c:idx val="0"/>
+      </c:pivotFmt>
+      <c:pivotFmt>
+        <c:idx val="1"/>
+      </c:pivotFmt>
+      <c:pivotFmt>
+        <c:idx val="2"/>
+      </c:pivotFmt>
+      <c:pivotFmt>
+        <c:idx val="3"/>
+      </c:pivotFmt>
+      <c:pivotFmt>
+        <c:idx val="4"/>
+      </c:pivotFmt>
+      <c:pivotFmt>
+        <c:idx val="5"/>
+      </c:pivotFmt>
+      <c:pivotFmt>
+        <c:idx val="6"/>
+      </c:pivotFmt>
+      <c:pivotFmt>
+        <c:idx val="7"/>
+      </c:pivotFmt>
+      <c:pivotFmt>
+        <c:idx val="8"/>
+      </c:pivotFmt>
+      <c:pivotFmt>
+        <c:idx val="9"/>
+      </c:pivotFmt>
+      <c:pivotFmt>
+        <c:idx val="10"/>
+      </c:pivotFmt>
+      <c:pivotFmt>
+        <c:idx val="11"/>
+      </c:pivotFmt>
+      <c:pivotFmt>
+        <c:idx val="12"/>
+        <c:marker>
+          <c:symbol val="none"/>
+        </c:marker>
+      </c:pivotFmt>
+      <c:pivotFmt>
+        <c:idx val="13"/>
+        <c:marker>
+          <c:symbol val="none"/>
+        </c:marker>
+      </c:pivotFmt>
+      <c:pivotFmt>
+        <c:idx val="14"/>
+        <c:marker>
+          <c:symbol val="none"/>
+        </c:marker>
+      </c:pivotFmt>
+      <c:pivotFmt>
+        <c:idx val="15"/>
+        <c:marker>
+          <c:symbol val="none"/>
+        </c:marker>
+      </c:pivotFmt>
+      <c:pivotFmt>
+        <c:idx val="16"/>
+        <c:marker>
+          <c:symbol val="none"/>
+        </c:marker>
+      </c:pivotFmt>
+      <c:pivotFmt>
+        <c:idx val="17"/>
+        <c:marker>
+          <c:symbol val="none"/>
+        </c:marker>
+      </c:pivotFmt>
+      <c:pivotFmt>
+        <c:idx val="18"/>
+        <c:marker>
+          <c:symbol val="none"/>
+        </c:marker>
+      </c:pivotFmt>
+      <c:pivotFmt>
+        <c:idx val="19"/>
+        <c:marker>
+          <c:symbol val="none"/>
+        </c:marker>
+      </c:pivotFmt>
+    </c:pivotFmts>
+    <c:plotArea>
+      <c:layout/>
+      <c:barChart>
+        <c:barDir val="col"/>
+        <c:grouping val="stacked"/>
+        <c:varyColors val="0"/>
+        <c:ser>
+          <c:idx val="0"/>
+          <c:order val="0"/>
+          <c:tx>
+            <c:strRef>
+              <c:f>Sheet1!$B$3:$B$4</c:f>
+              <c:strCache>
+                <c:ptCount val="1"/>
+                <c:pt idx="0">
+                  <c:v>1st_quartile</c:v>
+                </c:pt>
+              </c:strCache>
+            </c:strRef>
+          </c:tx>
+          <c:invertIfNegative val="0"/>
+          <c:cat>
+            <c:strRef>
+              <c:f>Sheet1!$A$5:$A$11</c:f>
+              <c:strCache>
+                <c:ptCount val="6"/>
+                <c:pt idx="0">
+                  <c:v>Animation</c:v>
+                </c:pt>
+                <c:pt idx="1">
+                  <c:v>Children</c:v>
+                </c:pt>
+                <c:pt idx="2">
+                  <c:v>Classics</c:v>
+                </c:pt>
+                <c:pt idx="3">
+                  <c:v>Comedy</c:v>
+                </c:pt>
+                <c:pt idx="4">
+                  <c:v>Family</c:v>
+                </c:pt>
+                <c:pt idx="5">
+                  <c:v>Music</c:v>
+                </c:pt>
+              </c:strCache>
+            </c:strRef>
+          </c:cat>
+          <c:val>
+            <c:numRef>
+              <c:f>Sheet1!$B$5:$B$11</c:f>
+              <c:numCache>
+                <c:formatCode>General</c:formatCode>
+                <c:ptCount val="6"/>
+                <c:pt idx="0">
+                  <c:v>22</c:v>
+                </c:pt>
+                <c:pt idx="1">
+                  <c:v>15</c:v>
+                </c:pt>
+                <c:pt idx="2">
+                  <c:v>15</c:v>
+                </c:pt>
+                <c:pt idx="3">
+                  <c:v>12</c:v>
+                </c:pt>
+                <c:pt idx="4">
+                  <c:v>13</c:v>
+                </c:pt>
+                <c:pt idx="5">
+                  <c:v>10</c:v>
+                </c:pt>
+              </c:numCache>
+            </c:numRef>
+          </c:val>
+        </c:ser>
+        <c:ser>
+          <c:idx val="1"/>
+          <c:order val="1"/>
+          <c:tx>
+            <c:strRef>
+              <c:f>Sheet1!$C$3:$C$4</c:f>
+              <c:strCache>
+                <c:ptCount val="1"/>
+                <c:pt idx="0">
+                  <c:v>2nd_quartile</c:v>
+                </c:pt>
+              </c:strCache>
+            </c:strRef>
+          </c:tx>
+          <c:invertIfNegative val="0"/>
+          <c:cat>
+            <c:strRef>
+              <c:f>Sheet1!$A$5:$A$11</c:f>
+              <c:strCache>
+                <c:ptCount val="6"/>
+                <c:pt idx="0">
+                  <c:v>Animation</c:v>
+                </c:pt>
+                <c:pt idx="1">
+                  <c:v>Children</c:v>
+                </c:pt>
+                <c:pt idx="2">
+                  <c:v>Classics</c:v>
+                </c:pt>
+                <c:pt idx="3">
+                  <c:v>Comedy</c:v>
+                </c:pt>
+                <c:pt idx="4">
+                  <c:v>Family</c:v>
+                </c:pt>
+                <c:pt idx="5">
+                  <c:v>Music</c:v>
+                </c:pt>
+              </c:strCache>
+            </c:strRef>
+          </c:cat>
+          <c:val>
+            <c:numRef>
+              <c:f>Sheet1!$C$5:$C$11</c:f>
+              <c:numCache>
+                <c:formatCode>General</c:formatCode>
+                <c:ptCount val="6"/>
+                <c:pt idx="0">
+                  <c:v>10</c:v>
+                </c:pt>
+                <c:pt idx="1">
+                  <c:v>15</c:v>
+                </c:pt>
+                <c:pt idx="2">
+                  <c:v>13</c:v>
+                </c:pt>
+                <c:pt idx="3">
+                  <c:v>18</c:v>
+                </c:pt>
+                <c:pt idx="4">
+                  <c:v>15</c:v>
+                </c:pt>
+                <c:pt idx="5">
+                  <c:v>10</c:v>
+                </c:pt>
+              </c:numCache>
+            </c:numRef>
+          </c:val>
+        </c:ser>
+        <c:ser>
+          <c:idx val="2"/>
+          <c:order val="2"/>
+          <c:tx>
+            <c:strRef>
+              <c:f>Sheet1!$D$3:$D$4</c:f>
+              <c:strCache>
+                <c:ptCount val="1"/>
+                <c:pt idx="0">
+                  <c:v>3rd_quartile</c:v>
+                </c:pt>
+              </c:strCache>
+            </c:strRef>
+          </c:tx>
+          <c:invertIfNegative val="0"/>
+          <c:cat>
+            <c:strRef>
+              <c:f>Sheet1!$A$5:$A$11</c:f>
+              <c:strCache>
+                <c:ptCount val="6"/>
+                <c:pt idx="0">
+                  <c:v>Animation</c:v>
+                </c:pt>
+                <c:pt idx="1">
+                  <c:v>Children</c:v>
+                </c:pt>
+                <c:pt idx="2">
+                  <c:v>Classics</c:v>
+                </c:pt>
+                <c:pt idx="3">
+                  <c:v>Comedy</c:v>
+                </c:pt>
+                <c:pt idx="4">
+                  <c:v>Family</c:v>
+                </c:pt>
+                <c:pt idx="5">
+                  <c:v>Music</c:v>
+                </c:pt>
+              </c:strCache>
+            </c:strRef>
+          </c:cat>
+          <c:val>
+            <c:numRef>
+              <c:f>Sheet1!$D$5:$D$11</c:f>
+              <c:numCache>
+                <c:formatCode>General</c:formatCode>
+                <c:ptCount val="6"/>
+                <c:pt idx="0">
+                  <c:v>16</c:v>
+                </c:pt>
+                <c:pt idx="1">
+                  <c:v>17</c:v>
+                </c:pt>
+                <c:pt idx="2">
+                  <c:v>13</c:v>
+                </c:pt>
+                <c:pt idx="3">
+                  <c:v>13</c:v>
+                </c:pt>
+                <c:pt idx="4">
+                  <c:v>20</c:v>
+                </c:pt>
+                <c:pt idx="5">
+                  <c:v>19</c:v>
+                </c:pt>
+              </c:numCache>
+            </c:numRef>
+          </c:val>
+        </c:ser>
+        <c:ser>
+          <c:idx val="3"/>
+          <c:order val="3"/>
+          <c:tx>
+            <c:strRef>
+              <c:f>Sheet1!$E$3:$E$4</c:f>
+              <c:strCache>
+                <c:ptCount val="1"/>
+                <c:pt idx="0">
+                  <c:v>4th_quartile</c:v>
+                </c:pt>
+              </c:strCache>
+            </c:strRef>
+          </c:tx>
+          <c:invertIfNegative val="0"/>
+          <c:cat>
+            <c:strRef>
+              <c:f>Sheet1!$A$5:$A$11</c:f>
+              <c:strCache>
+                <c:ptCount val="6"/>
+                <c:pt idx="0">
+                  <c:v>Animation</c:v>
+                </c:pt>
+                <c:pt idx="1">
+                  <c:v>Children</c:v>
+                </c:pt>
+                <c:pt idx="2">
+                  <c:v>Classics</c:v>
+                </c:pt>
+                <c:pt idx="3">
+                  <c:v>Comedy</c:v>
+                </c:pt>
+                <c:pt idx="4">
+                  <c:v>Family</c:v>
+                </c:pt>
+                <c:pt idx="5">
+                  <c:v>Music</c:v>
+                </c:pt>
+              </c:strCache>
+            </c:strRef>
+          </c:cat>
+          <c:val>
+            <c:numRef>
+              <c:f>Sheet1!$E$5:$E$11</c:f>
+              <c:numCache>
+                <c:formatCode>General</c:formatCode>
+                <c:ptCount val="6"/>
+                <c:pt idx="0">
+                  <c:v>18</c:v>
+                </c:pt>
+                <c:pt idx="1">
+                  <c:v>13</c:v>
+                </c:pt>
+                <c:pt idx="2">
+                  <c:v>16</c:v>
+                </c:pt>
+                <c:pt idx="3">
+                  <c:v>15</c:v>
+                </c:pt>
+                <c:pt idx="4">
+                  <c:v>21</c:v>
+                </c:pt>
+                <c:pt idx="5">
+                  <c:v>12</c:v>
+                </c:pt>
+              </c:numCache>
+            </c:numRef>
+          </c:val>
+        </c:ser>
+        <c:dLbls>
+          <c:showLegendKey val="0"/>
+          <c:showVal val="0"/>
+          <c:showCatName val="0"/>
+          <c:showSerName val="0"/>
+          <c:showPercent val="0"/>
+          <c:showBubbleSize val="0"/>
+        </c:dLbls>
+        <c:gapWidth val="55"/>
+        <c:overlap val="100"/>
+        <c:axId val="91436928"/>
+        <c:axId val="97535872"/>
+      </c:barChart>
+      <c:catAx>
+        <c:axId val="91436928"/>
+        <c:scaling>
+          <c:orientation val="minMax"/>
+        </c:scaling>
+        <c:delete val="0"/>
+        <c:axPos val="b"/>
+        <c:title>
+          <c:tx>
+            <c:rich>
+              <a:bodyPr/>
+              <a:lstStyle/>
+              <a:p>
+                <a:pPr>
+                  <a:defRPr sz="1800"/>
+                </a:pPr>
+                <a:r>
+                  <a:rPr lang="en-ZA" sz="1800"/>
+                  <a:t>Categories</a:t>
+                </a:r>
+              </a:p>
+            </c:rich>
+          </c:tx>
+          <c:layout/>
+          <c:overlay val="0"/>
+        </c:title>
+        <c:majorTickMark val="none"/>
+        <c:minorTickMark val="none"/>
+        <c:tickLblPos val="nextTo"/>
+        <c:crossAx val="97535872"/>
+        <c:crosses val="autoZero"/>
+        <c:auto val="1"/>
+        <c:lblAlgn val="ctr"/>
+        <c:lblOffset val="100"/>
+        <c:noMultiLvlLbl val="0"/>
+      </c:catAx>
+      <c:valAx>
+        <c:axId val="97535872"/>
+        <c:scaling>
+          <c:orientation val="minMax"/>
+        </c:scaling>
+        <c:delete val="0"/>
+        <c:axPos val="l"/>
+        <c:majorGridlines/>
+        <c:title>
+          <c:tx>
+            <c:rich>
+              <a:bodyPr rot="-5400000" vert="horz"/>
+              <a:lstStyle/>
+              <a:p>
+                <a:pPr>
+                  <a:defRPr sz="1800"/>
+                </a:pPr>
+                <a:r>
+                  <a:rPr lang="en-ZA" sz="1800"/>
+                  <a:t>Quartile Count</a:t>
+                </a:r>
+              </a:p>
+            </c:rich>
+          </c:tx>
+          <c:layout/>
+          <c:overlay val="0"/>
+        </c:title>
+        <c:numFmt formatCode="General" sourceLinked="1"/>
+        <c:majorTickMark val="none"/>
+        <c:minorTickMark val="none"/>
+        <c:tickLblPos val="nextTo"/>
+        <c:crossAx val="91436928"/>
+        <c:crosses val="autoZero"/>
+        <c:crossBetween val="between"/>
+      </c:valAx>
+    </c:plotArea>
+    <c:legend>
+      <c:legendPos val="r"/>
+      <c:layout/>
+      <c:overlay val="0"/>
+    </c:legend>
+    <c:plotVisOnly val="1"/>
+    <c:dispBlanksAs val="gap"/>
+    <c:showDLblsOverMax val="0"/>
+  </c:chart>
+  <c:externalData r:id="rId2">
+    <c:autoUpdate val="0"/>
+  </c:externalData>
+  <c:extLst>
+    <c:ext xmlns:c14="http://schemas.microsoft.com/office/drawing/2007/8/2/chart" uri="{781A3756-C4B2-4CAC-9D66-4F8BD8637D16}">
+      <c14:pivotOptions>
+        <c14:dropZoneFilter val="1"/>
+        <c14:dropZoneSeries val="1"/>
+      </c14:pivotOptions>
+    </c:ext>
+  </c:extLst>
 </c:chartSpace>
 </file>
 
@@ -1223,7 +1751,7 @@
           <a:p>
             <a:fld id="{B7DBE297-B1CA-4802-89AA-46848864696C}" type="datetimeFigureOut">
               <a:rPr lang="en-ZA" smtClean="0"/>
-              <a:t>2021/06/07</a:t>
+              <a:t>2021/06/08</a:t>
             </a:fld>
             <a:endParaRPr lang="en-ZA"/>
           </a:p>
@@ -1406,7 +1934,7 @@
           <a:p>
             <a:fld id="{B7DBE297-B1CA-4802-89AA-46848864696C}" type="datetimeFigureOut">
               <a:rPr lang="en-ZA" smtClean="0"/>
-              <a:t>2021/06/07</a:t>
+              <a:t>2021/06/08</a:t>
             </a:fld>
             <a:endParaRPr lang="en-ZA"/>
           </a:p>
@@ -1581,7 +2109,7 @@
           <a:p>
             <a:fld id="{B7DBE297-B1CA-4802-89AA-46848864696C}" type="datetimeFigureOut">
               <a:rPr lang="en-ZA" smtClean="0"/>
-              <a:t>2021/06/07</a:t>
+              <a:t>2021/06/08</a:t>
             </a:fld>
             <a:endParaRPr lang="en-ZA"/>
           </a:p>
@@ -1746,7 +2274,7 @@
           <a:p>
             <a:fld id="{B7DBE297-B1CA-4802-89AA-46848864696C}" type="datetimeFigureOut">
               <a:rPr lang="en-ZA" smtClean="0"/>
-              <a:t>2021/06/07</a:t>
+              <a:t>2021/06/08</a:t>
             </a:fld>
             <a:endParaRPr lang="en-ZA"/>
           </a:p>
@@ -1967,7 +2495,7 @@
           <a:p>
             <a:fld id="{B7DBE297-B1CA-4802-89AA-46848864696C}" type="datetimeFigureOut">
               <a:rPr lang="en-ZA" smtClean="0"/>
-              <a:t>2021/06/07</a:t>
+              <a:t>2021/06/08</a:t>
             </a:fld>
             <a:endParaRPr lang="en-ZA"/>
           </a:p>
@@ -2226,7 +2754,7 @@
           <a:p>
             <a:fld id="{B7DBE297-B1CA-4802-89AA-46848864696C}" type="datetimeFigureOut">
               <a:rPr lang="en-ZA" smtClean="0"/>
-              <a:t>2021/06/07</a:t>
+              <a:t>2021/06/08</a:t>
             </a:fld>
             <a:endParaRPr lang="en-ZA"/>
           </a:p>
@@ -2630,7 +3158,7 @@
           <a:p>
             <a:fld id="{B7DBE297-B1CA-4802-89AA-46848864696C}" type="datetimeFigureOut">
               <a:rPr lang="en-ZA" smtClean="0"/>
-              <a:t>2021/06/07</a:t>
+              <a:t>2021/06/08</a:t>
             </a:fld>
             <a:endParaRPr lang="en-ZA"/>
           </a:p>
@@ -2761,7 +3289,7 @@
           <a:p>
             <a:fld id="{B7DBE297-B1CA-4802-89AA-46848864696C}" type="datetimeFigureOut">
               <a:rPr lang="en-ZA" smtClean="0"/>
-              <a:t>2021/06/07</a:t>
+              <a:t>2021/06/08</a:t>
             </a:fld>
             <a:endParaRPr lang="en-ZA"/>
           </a:p>
@@ -2861,7 +3389,7 @@
           <a:p>
             <a:fld id="{B7DBE297-B1CA-4802-89AA-46848864696C}" type="datetimeFigureOut">
               <a:rPr lang="en-ZA" smtClean="0"/>
-              <a:t>2021/06/07</a:t>
+              <a:t>2021/06/08</a:t>
             </a:fld>
             <a:endParaRPr lang="en-ZA"/>
           </a:p>
@@ -3106,7 +3634,7 @@
           <a:p>
             <a:fld id="{B7DBE297-B1CA-4802-89AA-46848864696C}" type="datetimeFigureOut">
               <a:rPr lang="en-ZA" smtClean="0"/>
-              <a:t>2021/06/07</a:t>
+              <a:t>2021/06/08</a:t>
             </a:fld>
             <a:endParaRPr lang="en-ZA"/>
           </a:p>
@@ -3350,7 +3878,7 @@
           <a:p>
             <a:fld id="{B7DBE297-B1CA-4802-89AA-46848864696C}" type="datetimeFigureOut">
               <a:rPr lang="en-ZA" smtClean="0"/>
-              <a:t>2021/06/07</a:t>
+              <a:t>2021/06/08</a:t>
             </a:fld>
             <a:endParaRPr lang="en-ZA"/>
           </a:p>
@@ -4174,7 +4702,7 @@
           <a:p>
             <a:fld id="{B7DBE297-B1CA-4802-89AA-46848864696C}" type="datetimeFigureOut">
               <a:rPr lang="en-ZA" smtClean="0"/>
-              <a:t>2021/06/07</a:t>
+              <a:t>2021/06/08</a:t>
             </a:fld>
             <a:endParaRPr lang="en-ZA"/>
           </a:p>
@@ -4633,14 +5161,14 @@
             <p:ph sz="half" idx="1"/>
             <p:extLst>
               <p:ext uri="{D42A27DB-BD31-4B8C-83A1-F6EECF244321}">
-                <p14:modId xmlns:p14="http://schemas.microsoft.com/office/powerpoint/2010/main" val="4777255"/>
+                <p14:modId xmlns:p14="http://schemas.microsoft.com/office/powerpoint/2010/main" val="4094096037"/>
               </p:ext>
             </p:extLst>
           </p:nvPr>
         </p:nvGraphicFramePr>
         <p:xfrm>
-          <a:off x="152400" y="776288"/>
-          <a:ext cx="5715744" cy="5965080"/>
+          <a:off x="0" y="776288"/>
+          <a:ext cx="5868144" cy="6081712"/>
         </p:xfrm>
         <a:graphic>
           <a:graphicData uri="http://schemas.openxmlformats.org/drawingml/2006/chart">
@@ -4758,14 +5286,14 @@
             <p:ph sz="half" idx="1"/>
             <p:extLst>
               <p:ext uri="{D42A27DB-BD31-4B8C-83A1-F6EECF244321}">
-                <p14:modId xmlns:p14="http://schemas.microsoft.com/office/powerpoint/2010/main" val="2240966407"/>
+                <p14:modId xmlns:p14="http://schemas.microsoft.com/office/powerpoint/2010/main" val="3586978509"/>
               </p:ext>
             </p:extLst>
           </p:nvPr>
         </p:nvGraphicFramePr>
         <p:xfrm>
-          <a:off x="152400" y="776288"/>
-          <a:ext cx="5715744" cy="5851525"/>
+          <a:off x="0" y="476672"/>
+          <a:ext cx="5868144" cy="6381328"/>
         </p:xfrm>
         <a:graphic>
           <a:graphicData uri="http://schemas.openxmlformats.org/drawingml/2006/chart">
@@ -4777,6 +5305,127 @@
     <p:extLst>
       <p:ext uri="{BB962C8B-B14F-4D97-AF65-F5344CB8AC3E}">
         <p14:creationId xmlns:p14="http://schemas.microsoft.com/office/powerpoint/2010/main" val="3515908278"/>
+      </p:ext>
+    </p:extLst>
+  </p:cSld>
+  <p:clrMapOvr>
+    <a:masterClrMapping/>
+  </p:clrMapOvr>
+  <p:timing>
+    <p:tnLst>
+      <p:par>
+        <p:cTn id="1" dur="indefinite" restart="never" nodeType="tmRoot"/>
+      </p:par>
+    </p:tnLst>
+  </p:timing>
+</p:sld>
+</file>
+
+<file path=ppt/slides/slide3.xml><?xml version="1.0" encoding="utf-8"?>
+<p:sld xmlns:a="http://schemas.openxmlformats.org/drawingml/2006/main" xmlns:r="http://schemas.openxmlformats.org/officeDocument/2006/relationships" xmlns:p="http://schemas.openxmlformats.org/presentationml/2006/main">
+  <p:cSld>
+    <p:spTree>
+      <p:nvGrpSpPr>
+        <p:cNvPr id="1" name=""/>
+        <p:cNvGrpSpPr/>
+        <p:nvPr/>
+      </p:nvGrpSpPr>
+      <p:grpSpPr>
+        <a:xfrm>
+          <a:off x="0" y="0"/>
+          <a:ext cx="0" cy="0"/>
+          <a:chOff x="0" y="0"/>
+          <a:chExt cx="0" cy="0"/>
+        </a:xfrm>
+      </p:grpSpPr>
+      <p:sp>
+        <p:nvSpPr>
+          <p:cNvPr id="2" name="Title 1"/>
+          <p:cNvSpPr>
+            <a:spLocks noGrp="1"/>
+          </p:cNvSpPr>
+          <p:nvPr>
+            <p:ph type="title"/>
+          </p:nvPr>
+        </p:nvSpPr>
+        <p:spPr>
+          <a:xfrm>
+            <a:off x="5868144" y="764704"/>
+            <a:ext cx="2868632" cy="2880320"/>
+          </a:xfrm>
+        </p:spPr>
+        <p:txBody>
+          <a:bodyPr>
+            <a:noAutofit/>
+          </a:bodyPr>
+          <a:lstStyle/>
+          <a:p>
+            <a:pPr algn="ctr"/>
+            <a:r>
+              <a:rPr lang="en-ZA" sz="2400" dirty="0" smtClean="0"/>
+              <a:t>What are the rental duration lengths for the family-friendly movies, divided according to the quartiles across all categories?</a:t>
+            </a:r>
+            <a:endParaRPr lang="en-ZA" sz="2400" dirty="0"/>
+          </a:p>
+        </p:txBody>
+      </p:sp>
+      <p:sp>
+        <p:nvSpPr>
+          <p:cNvPr id="5" name="Text Placeholder 4"/>
+          <p:cNvSpPr>
+            <a:spLocks noGrp="1"/>
+          </p:cNvSpPr>
+          <p:nvPr>
+            <p:ph type="body" idx="2"/>
+          </p:nvPr>
+        </p:nvSpPr>
+        <p:spPr>
+          <a:xfrm>
+            <a:off x="5868144" y="3717031"/>
+            <a:ext cx="2868632" cy="2911415"/>
+          </a:xfrm>
+        </p:spPr>
+        <p:txBody>
+          <a:bodyPr/>
+          <a:lstStyle/>
+          <a:p>
+            <a:r>
+              <a:rPr lang="en-ZA" dirty="0" smtClean="0"/>
+              <a:t>The ‘Children’ category is the only category with a near symmetrical quartile distribution.</a:t>
+            </a:r>
+            <a:endParaRPr lang="en-ZA" dirty="0"/>
+          </a:p>
+        </p:txBody>
+      </p:sp>
+      <p:graphicFrame>
+        <p:nvGraphicFramePr>
+          <p:cNvPr id="8" name="Content Placeholder 7"/>
+          <p:cNvGraphicFramePr>
+            <a:graphicFrameLocks noGrp="1"/>
+          </p:cNvGraphicFramePr>
+          <p:nvPr>
+            <p:ph sz="half" idx="1"/>
+            <p:extLst>
+              <p:ext uri="{D42A27DB-BD31-4B8C-83A1-F6EECF244321}">
+                <p14:modId xmlns:p14="http://schemas.microsoft.com/office/powerpoint/2010/main" val="521902775"/>
+              </p:ext>
+            </p:extLst>
+          </p:nvPr>
+        </p:nvGraphicFramePr>
+        <p:xfrm>
+          <a:off x="0" y="332656"/>
+          <a:ext cx="5868144" cy="6525344"/>
+        </p:xfrm>
+        <a:graphic>
+          <a:graphicData uri="http://schemas.openxmlformats.org/drawingml/2006/chart">
+            <c:chart xmlns:c="http://schemas.openxmlformats.org/drawingml/2006/chart" xmlns:r="http://schemas.openxmlformats.org/officeDocument/2006/relationships" r:id="rId2"/>
+          </a:graphicData>
+        </a:graphic>
+      </p:graphicFrame>
+    </p:spTree>
+    <p:extLst>
+      <p:ext uri="{BB962C8B-B14F-4D97-AF65-F5344CB8AC3E}">
+        <p14:creationId xmlns:p14="http://schemas.microsoft.com/office/powerpoint/2010/main" val="806615183"/>
       </p:ext>
     </p:extLst>
   </p:cSld>
@@ -5635,4 +6284,285 @@
     </a:bgFillStyleLst>
   </a:fmtScheme>
 </a:themeOverride>
+</file>
+
+<file path=ppt/theme/themeOverride3.xml><?xml version="1.0" encoding="utf-8"?>
+<a:themeOverride xmlns:a="http://schemas.openxmlformats.org/drawingml/2006/main">
+  <a:clrScheme name="Office">
+    <a:dk1>
+      <a:sysClr val="windowText" lastClr="000000"/>
+    </a:dk1>
+    <a:lt1>
+      <a:sysClr val="window" lastClr="FFFFFF"/>
+    </a:lt1>
+    <a:dk2>
+      <a:srgbClr val="1F497D"/>
+    </a:dk2>
+    <a:lt2>
+      <a:srgbClr val="EEECE1"/>
+    </a:lt2>
+    <a:accent1>
+      <a:srgbClr val="4F81BD"/>
+    </a:accent1>
+    <a:accent2>
+      <a:srgbClr val="C0504D"/>
+    </a:accent2>
+    <a:accent3>
+      <a:srgbClr val="9BBB59"/>
+    </a:accent3>
+    <a:accent4>
+      <a:srgbClr val="8064A2"/>
+    </a:accent4>
+    <a:accent5>
+      <a:srgbClr val="4BACC6"/>
+    </a:accent5>
+    <a:accent6>
+      <a:srgbClr val="F79646"/>
+    </a:accent6>
+    <a:hlink>
+      <a:srgbClr val="0000FF"/>
+    </a:hlink>
+    <a:folHlink>
+      <a:srgbClr val="800080"/>
+    </a:folHlink>
+  </a:clrScheme>
+  <a:fontScheme name="Office">
+    <a:majorFont>
+      <a:latin typeface="Cambria"/>
+      <a:ea typeface=""/>
+      <a:cs typeface=""/>
+      <a:font script="Jpan" typeface="ＭＳ Ｐゴシック"/>
+      <a:font script="Hang" typeface="맑은 고딕"/>
+      <a:font script="Hans" typeface="宋体"/>
+      <a:font script="Hant" typeface="新細明體"/>
+      <a:font script="Arab" typeface="Times New Roman"/>
+      <a:font script="Hebr" typeface="Times New Roman"/>
+      <a:font script="Thai" typeface="Tahoma"/>
+      <a:font script="Ethi" typeface="Nyala"/>
+      <a:font script="Beng" typeface="Vrinda"/>
+      <a:font script="Gujr" typeface="Shruti"/>
+      <a:font script="Khmr" typeface="MoolBoran"/>
+      <a:font script="Knda" typeface="Tunga"/>
+      <a:font script="Guru" typeface="Raavi"/>
+      <a:font script="Cans" typeface="Euphemia"/>
+      <a:font script="Cher" typeface="Plantagenet Cherokee"/>
+      <a:font script="Yiii" typeface="Microsoft Yi Baiti"/>
+      <a:font script="Tibt" typeface="Microsoft Himalaya"/>
+      <a:font script="Thaa" typeface="MV Boli"/>
+      <a:font script="Deva" typeface="Mangal"/>
+      <a:font script="Telu" typeface="Gautami"/>
+      <a:font script="Taml" typeface="Latha"/>
+      <a:font script="Syrc" typeface="Estrangelo Edessa"/>
+      <a:font script="Orya" typeface="Kalinga"/>
+      <a:font script="Mlym" typeface="Kartika"/>
+      <a:font script="Laoo" typeface="DokChampa"/>
+      <a:font script="Sinh" typeface="Iskoola Pota"/>
+      <a:font script="Mong" typeface="Mongolian Baiti"/>
+      <a:font script="Viet" typeface="Times New Roman"/>
+      <a:font script="Uigh" typeface="Microsoft Uighur"/>
+      <a:font script="Geor" typeface="Sylfaen"/>
+    </a:majorFont>
+    <a:minorFont>
+      <a:latin typeface="Calibri"/>
+      <a:ea typeface=""/>
+      <a:cs typeface=""/>
+      <a:font script="Jpan" typeface="ＭＳ Ｐゴシック"/>
+      <a:font script="Hang" typeface="맑은 고딕"/>
+      <a:font script="Hans" typeface="宋体"/>
+      <a:font script="Hant" typeface="新細明體"/>
+      <a:font script="Arab" typeface="Arial"/>
+      <a:font script="Hebr" typeface="Arial"/>
+      <a:font script="Thai" typeface="Tahoma"/>
+      <a:font script="Ethi" typeface="Nyala"/>
+      <a:font script="Beng" typeface="Vrinda"/>
+      <a:font script="Gujr" typeface="Shruti"/>
+      <a:font script="Khmr" typeface="DaunPenh"/>
+      <a:font script="Knda" typeface="Tunga"/>
+      <a:font script="Guru" typeface="Raavi"/>
+      <a:font script="Cans" typeface="Euphemia"/>
+      <a:font script="Cher" typeface="Plantagenet Cherokee"/>
+      <a:font script="Yiii" typeface="Microsoft Yi Baiti"/>
+      <a:font script="Tibt" typeface="Microsoft Himalaya"/>
+      <a:font script="Thaa" typeface="MV Boli"/>
+      <a:font script="Deva" typeface="Mangal"/>
+      <a:font script="Telu" typeface="Gautami"/>
+      <a:font script="Taml" typeface="Latha"/>
+      <a:font script="Syrc" typeface="Estrangelo Edessa"/>
+      <a:font script="Orya" typeface="Kalinga"/>
+      <a:font script="Mlym" typeface="Kartika"/>
+      <a:font script="Laoo" typeface="DokChampa"/>
+      <a:font script="Sinh" typeface="Iskoola Pota"/>
+      <a:font script="Mong" typeface="Mongolian Baiti"/>
+      <a:font script="Viet" typeface="Arial"/>
+      <a:font script="Uigh" typeface="Microsoft Uighur"/>
+      <a:font script="Geor" typeface="Sylfaen"/>
+    </a:minorFont>
+  </a:fontScheme>
+  <a:fmtScheme name="Office">
+    <a:fillStyleLst>
+      <a:solidFill>
+        <a:schemeClr val="phClr"/>
+      </a:solidFill>
+      <a:gradFill rotWithShape="1">
+        <a:gsLst>
+          <a:gs pos="0">
+            <a:schemeClr val="phClr">
+              <a:tint val="50000"/>
+              <a:satMod val="300000"/>
+            </a:schemeClr>
+          </a:gs>
+          <a:gs pos="35000">
+            <a:schemeClr val="phClr">
+              <a:tint val="37000"/>
+              <a:satMod val="300000"/>
+            </a:schemeClr>
+          </a:gs>
+          <a:gs pos="100000">
+            <a:schemeClr val="phClr">
+              <a:tint val="15000"/>
+              <a:satMod val="350000"/>
+            </a:schemeClr>
+          </a:gs>
+        </a:gsLst>
+        <a:lin ang="16200000" scaled="1"/>
+      </a:gradFill>
+      <a:gradFill rotWithShape="1">
+        <a:gsLst>
+          <a:gs pos="0">
+            <a:schemeClr val="phClr">
+              <a:shade val="51000"/>
+              <a:satMod val="130000"/>
+            </a:schemeClr>
+          </a:gs>
+          <a:gs pos="80000">
+            <a:schemeClr val="phClr">
+              <a:shade val="93000"/>
+              <a:satMod val="130000"/>
+            </a:schemeClr>
+          </a:gs>
+          <a:gs pos="100000">
+            <a:schemeClr val="phClr">
+              <a:shade val="94000"/>
+              <a:satMod val="135000"/>
+            </a:schemeClr>
+          </a:gs>
+        </a:gsLst>
+        <a:lin ang="16200000" scaled="0"/>
+      </a:gradFill>
+    </a:fillStyleLst>
+    <a:lnStyleLst>
+      <a:ln w="9525" cap="flat" cmpd="sng" algn="ctr">
+        <a:solidFill>
+          <a:schemeClr val="phClr">
+            <a:shade val="95000"/>
+            <a:satMod val="105000"/>
+          </a:schemeClr>
+        </a:solidFill>
+        <a:prstDash val="solid"/>
+      </a:ln>
+      <a:ln w="25400" cap="flat" cmpd="sng" algn="ctr">
+        <a:solidFill>
+          <a:schemeClr val="phClr"/>
+        </a:solidFill>
+        <a:prstDash val="solid"/>
+      </a:ln>
+      <a:ln w="38100" cap="flat" cmpd="sng" algn="ctr">
+        <a:solidFill>
+          <a:schemeClr val="phClr"/>
+        </a:solidFill>
+        <a:prstDash val="solid"/>
+      </a:ln>
+    </a:lnStyleLst>
+    <a:effectStyleLst>
+      <a:effectStyle>
+        <a:effectLst>
+          <a:outerShdw blurRad="40000" dist="20000" dir="5400000" rotWithShape="0">
+            <a:srgbClr val="000000">
+              <a:alpha val="38000"/>
+            </a:srgbClr>
+          </a:outerShdw>
+        </a:effectLst>
+      </a:effectStyle>
+      <a:effectStyle>
+        <a:effectLst>
+          <a:outerShdw blurRad="40000" dist="23000" dir="5400000" rotWithShape="0">
+            <a:srgbClr val="000000">
+              <a:alpha val="35000"/>
+            </a:srgbClr>
+          </a:outerShdw>
+        </a:effectLst>
+      </a:effectStyle>
+      <a:effectStyle>
+        <a:effectLst>
+          <a:outerShdw blurRad="40000" dist="23000" dir="5400000" rotWithShape="0">
+            <a:srgbClr val="000000">
+              <a:alpha val="35000"/>
+            </a:srgbClr>
+          </a:outerShdw>
+        </a:effectLst>
+        <a:scene3d>
+          <a:camera prst="orthographicFront">
+            <a:rot lat="0" lon="0" rev="0"/>
+          </a:camera>
+          <a:lightRig rig="threePt" dir="t">
+            <a:rot lat="0" lon="0" rev="1200000"/>
+          </a:lightRig>
+        </a:scene3d>
+        <a:sp3d>
+          <a:bevelT w="63500" h="25400"/>
+        </a:sp3d>
+      </a:effectStyle>
+    </a:effectStyleLst>
+    <a:bgFillStyleLst>
+      <a:solidFill>
+        <a:schemeClr val="phClr"/>
+      </a:solidFill>
+      <a:gradFill rotWithShape="1">
+        <a:gsLst>
+          <a:gs pos="0">
+            <a:schemeClr val="phClr">
+              <a:tint val="40000"/>
+              <a:satMod val="350000"/>
+            </a:schemeClr>
+          </a:gs>
+          <a:gs pos="40000">
+            <a:schemeClr val="phClr">
+              <a:tint val="45000"/>
+              <a:shade val="99000"/>
+              <a:satMod val="350000"/>
+            </a:schemeClr>
+          </a:gs>
+          <a:gs pos="100000">
+            <a:schemeClr val="phClr">
+              <a:shade val="20000"/>
+              <a:satMod val="255000"/>
+            </a:schemeClr>
+          </a:gs>
+        </a:gsLst>
+        <a:path path="circle">
+          <a:fillToRect l="50000" t="-80000" r="50000" b="180000"/>
+        </a:path>
+      </a:gradFill>
+      <a:gradFill rotWithShape="1">
+        <a:gsLst>
+          <a:gs pos="0">
+            <a:schemeClr val="phClr">
+              <a:tint val="80000"/>
+              <a:satMod val="300000"/>
+            </a:schemeClr>
+          </a:gs>
+          <a:gs pos="100000">
+            <a:schemeClr val="phClr">
+              <a:shade val="30000"/>
+              <a:satMod val="200000"/>
+            </a:schemeClr>
+          </a:gs>
+        </a:gsLst>
+        <a:path path="circle">
+          <a:fillToRect l="50000" t="50000" r="50000" b="50000"/>
+        </a:path>
+      </a:gradFill>
+    </a:bgFillStyleLst>
+  </a:fmtScheme>
+</a:themeOverride>
 </file>
</xml_diff>

<commit_message>
feat: Add ppt visualisation for Q1 in Question Set 2
</commit_message>
<xml_diff>
--- a/slideshow/movies-db-slideshow.pptx
+++ b/slideshow/movies-db-slideshow.pptx
@@ -8,6 +8,7 @@
     <p:sldId id="256" r:id="rId2"/>
     <p:sldId id="257" r:id="rId3"/>
     <p:sldId id="258" r:id="rId4"/>
+    <p:sldId id="259" r:id="rId5"/>
   </p:sldIdLst>
   <p:sldSz cx="9144000" cy="6858000" type="screen4x3"/>
   <p:notesSz cx="6858000" cy="9144000"/>
@@ -240,11 +241,11 @@
           <c:showBubbleSize val="0"/>
         </c:dLbls>
         <c:gapWidth val="75"/>
-        <c:axId val="36509184"/>
-        <c:axId val="36511104"/>
+        <c:axId val="77669888"/>
+        <c:axId val="77671808"/>
       </c:barChart>
       <c:catAx>
-        <c:axId val="36509184"/>
+        <c:axId val="77669888"/>
         <c:scaling>
           <c:orientation val="minMax"/>
         </c:scaling>
@@ -273,7 +274,7 @@
         <c:majorTickMark val="none"/>
         <c:minorTickMark val="none"/>
         <c:tickLblPos val="nextTo"/>
-        <c:crossAx val="36511104"/>
+        <c:crossAx val="77671808"/>
         <c:crosses val="autoZero"/>
         <c:auto val="1"/>
         <c:lblAlgn val="ctr"/>
@@ -281,7 +282,7 @@
         <c:noMultiLvlLbl val="0"/>
       </c:catAx>
       <c:valAx>
-        <c:axId val="36511104"/>
+        <c:axId val="77671808"/>
         <c:scaling>
           <c:orientation val="minMax"/>
         </c:scaling>
@@ -310,7 +311,7 @@
         <c:majorTickMark val="none"/>
         <c:minorTickMark val="none"/>
         <c:tickLblPos val="nextTo"/>
-        <c:crossAx val="36509184"/>
+        <c:crossAx val="77669888"/>
         <c:crosses val="autoZero"/>
         <c:crossBetween val="between"/>
       </c:valAx>
@@ -473,11 +474,11 @@
           <c:showBubbleSize val="0"/>
         </c:dLbls>
         <c:gapWidth val="75"/>
-        <c:axId val="72285184"/>
-        <c:axId val="72631424"/>
+        <c:axId val="36441088"/>
+        <c:axId val="36459648"/>
       </c:barChart>
       <c:catAx>
-        <c:axId val="72285184"/>
+        <c:axId val="36441088"/>
         <c:scaling>
           <c:orientation val="maxMin"/>
         </c:scaling>
@@ -509,7 +510,7 @@
         <c:majorTickMark val="none"/>
         <c:minorTickMark val="none"/>
         <c:tickLblPos val="nextTo"/>
-        <c:crossAx val="72631424"/>
+        <c:crossAx val="36459648"/>
         <c:crosses val="autoZero"/>
         <c:auto val="1"/>
         <c:lblAlgn val="ctr"/>
@@ -517,7 +518,7 @@
         <c:noMultiLvlLbl val="0"/>
       </c:catAx>
       <c:valAx>
-        <c:axId val="72631424"/>
+        <c:axId val="36459648"/>
         <c:scaling>
           <c:orientation val="minMax"/>
         </c:scaling>
@@ -551,7 +552,7 @@
         <c:majorTickMark val="none"/>
         <c:minorTickMark val="none"/>
         <c:tickLblPos val="nextTo"/>
-        <c:crossAx val="72285184"/>
+        <c:crossAx val="36441088"/>
         <c:crosses val="autoZero"/>
         <c:crossBetween val="between"/>
       </c:valAx>
@@ -995,11 +996,11 @@
         </c:dLbls>
         <c:gapWidth val="55"/>
         <c:overlap val="100"/>
-        <c:axId val="91436928"/>
-        <c:axId val="97535872"/>
+        <c:axId val="82612608"/>
+        <c:axId val="35120640"/>
       </c:barChart>
       <c:catAx>
-        <c:axId val="91436928"/>
+        <c:axId val="82612608"/>
         <c:scaling>
           <c:orientation val="minMax"/>
         </c:scaling>
@@ -1027,7 +1028,7 @@
         <c:majorTickMark val="none"/>
         <c:minorTickMark val="none"/>
         <c:tickLblPos val="nextTo"/>
-        <c:crossAx val="97535872"/>
+        <c:crossAx val="35120640"/>
         <c:crosses val="autoZero"/>
         <c:auto val="1"/>
         <c:lblAlgn val="ctr"/>
@@ -1035,7 +1036,7 @@
         <c:noMultiLvlLbl val="0"/>
       </c:catAx>
       <c:valAx>
-        <c:axId val="97535872"/>
+        <c:axId val="35120640"/>
         <c:scaling>
           <c:orientation val="minMax"/>
         </c:scaling>
@@ -1065,7 +1066,7 @@
         <c:majorTickMark val="none"/>
         <c:minorTickMark val="none"/>
         <c:tickLblPos val="nextTo"/>
-        <c:crossAx val="91436928"/>
+        <c:crossAx val="82612608"/>
         <c:crosses val="autoZero"/>
         <c:crossBetween val="between"/>
       </c:valAx>
@@ -1086,6 +1087,408 @@
     <c:ext xmlns:c14="http://schemas.microsoft.com/office/drawing/2007/8/2/chart" uri="{781A3756-C4B2-4CAC-9D66-4F8BD8637D16}">
       <c14:pivotOptions>
         <c14:dropZoneFilter val="1"/>
+        <c14:dropZoneSeries val="1"/>
+      </c14:pivotOptions>
+    </c:ext>
+  </c:extLst>
+</c:chartSpace>
+</file>
+
+<file path=ppt/charts/chart4.xml><?xml version="1.0" encoding="utf-8"?>
+<c:chartSpace xmlns:c="http://schemas.openxmlformats.org/drawingml/2006/chart" xmlns:a="http://schemas.openxmlformats.org/drawingml/2006/main" xmlns:r="http://schemas.openxmlformats.org/officeDocument/2006/relationships">
+  <c:date1904 val="0"/>
+  <c:lang val="en-ZA"/>
+  <c:roundedCorners val="0"/>
+  <mc:AlternateContent xmlns:mc="http://schemas.openxmlformats.org/markup-compatibility/2006">
+    <mc:Choice xmlns:c14="http://schemas.microsoft.com/office/drawing/2007/8/2/chart" Requires="c14">
+      <c14:style val="102"/>
+    </mc:Choice>
+    <mc:Fallback>
+      <c:style val="2"/>
+    </mc:Fallback>
+  </mc:AlternateContent>
+  <c:clrMapOvr bg1="lt1" tx1="dk1" bg2="lt2" tx2="dk2" accent1="accent1" accent2="accent2" accent3="accent3" accent4="accent4" accent5="accent5" accent6="accent6" hlink="hlink" folHlink="folHlink"/>
+  <c:pivotSource>
+    <c:name>[store-rental-orders-extract.xlsx]Sheet1!PivotTable1</c:name>
+    <c:fmtId val="7"/>
+  </c:pivotSource>
+  <c:chart>
+    <c:title>
+      <c:tx>
+        <c:rich>
+          <a:bodyPr/>
+          <a:lstStyle/>
+          <a:p>
+            <a:pPr>
+              <a:defRPr sz="3200"/>
+            </a:pPr>
+            <a:r>
+              <a:rPr lang="en-ZA" sz="3200" dirty="0"/>
+              <a:t>Store 1 v Store 2 </a:t>
+            </a:r>
+            <a:r>
+              <a:rPr lang="en-ZA" sz="3200" dirty="0" smtClean="0"/>
+              <a:t>Rentals</a:t>
+            </a:r>
+            <a:endParaRPr lang="en-ZA" sz="3200" dirty="0"/>
+          </a:p>
+        </c:rich>
+      </c:tx>
+      <c:layout/>
+      <c:overlay val="1"/>
+    </c:title>
+    <c:autoTitleDeleted val="0"/>
+    <c:pivotFmts>
+      <c:pivotFmt>
+        <c:idx val="0"/>
+        <c:marker>
+          <c:symbol val="none"/>
+        </c:marker>
+      </c:pivotFmt>
+      <c:pivotFmt>
+        <c:idx val="1"/>
+        <c:marker>
+          <c:symbol val="none"/>
+        </c:marker>
+      </c:pivotFmt>
+      <c:pivotFmt>
+        <c:idx val="2"/>
+        <c:marker>
+          <c:symbol val="none"/>
+        </c:marker>
+      </c:pivotFmt>
+      <c:pivotFmt>
+        <c:idx val="3"/>
+        <c:marker>
+          <c:symbol val="none"/>
+        </c:marker>
+      </c:pivotFmt>
+      <c:pivotFmt>
+        <c:idx val="4"/>
+        <c:marker>
+          <c:symbol val="none"/>
+        </c:marker>
+      </c:pivotFmt>
+      <c:pivotFmt>
+        <c:idx val="5"/>
+        <c:marker>
+          <c:symbol val="none"/>
+        </c:marker>
+      </c:pivotFmt>
+      <c:pivotFmt>
+        <c:idx val="6"/>
+        <c:marker>
+          <c:symbol val="none"/>
+        </c:marker>
+      </c:pivotFmt>
+      <c:pivotFmt>
+        <c:idx val="7"/>
+      </c:pivotFmt>
+      <c:pivotFmt>
+        <c:idx val="8"/>
+      </c:pivotFmt>
+      <c:pivotFmt>
+        <c:idx val="9"/>
+        <c:marker>
+          <c:symbol val="none"/>
+        </c:marker>
+      </c:pivotFmt>
+      <c:pivotFmt>
+        <c:idx val="10"/>
+        <c:marker>
+          <c:symbol val="none"/>
+        </c:marker>
+      </c:pivotFmt>
+      <c:pivotFmt>
+        <c:idx val="11"/>
+        <c:marker>
+          <c:symbol val="none"/>
+        </c:marker>
+      </c:pivotFmt>
+      <c:pivotFmt>
+        <c:idx val="12"/>
+        <c:marker>
+          <c:symbol val="none"/>
+        </c:marker>
+      </c:pivotFmt>
+      <c:pivotFmt>
+        <c:idx val="13"/>
+        <c:marker>
+          <c:symbol val="none"/>
+        </c:marker>
+      </c:pivotFmt>
+      <c:pivotFmt>
+        <c:idx val="14"/>
+        <c:marker>
+          <c:symbol val="none"/>
+        </c:marker>
+      </c:pivotFmt>
+    </c:pivotFmts>
+    <c:plotArea>
+      <c:layout/>
+      <c:lineChart>
+        <c:grouping val="standard"/>
+        <c:varyColors val="0"/>
+        <c:ser>
+          <c:idx val="0"/>
+          <c:order val="0"/>
+          <c:tx>
+            <c:strRef>
+              <c:f>Sheet1!$B$3:$B$4</c:f>
+              <c:strCache>
+                <c:ptCount val="1"/>
+                <c:pt idx="0">
+                  <c:v>1</c:v>
+                </c:pt>
+              </c:strCache>
+            </c:strRef>
+          </c:tx>
+          <c:marker>
+            <c:symbol val="none"/>
+          </c:marker>
+          <c:cat>
+            <c:multiLvlStrRef>
+              <c:f>Sheet1!$A$5:$A$12</c:f>
+              <c:multiLvlStrCache>
+                <c:ptCount val="5"/>
+                <c:lvl>
+                  <c:pt idx="0">
+                    <c:v>5</c:v>
+                  </c:pt>
+                  <c:pt idx="1">
+                    <c:v>6</c:v>
+                  </c:pt>
+                  <c:pt idx="2">
+                    <c:v>7</c:v>
+                  </c:pt>
+                  <c:pt idx="3">
+                    <c:v>8</c:v>
+                  </c:pt>
+                  <c:pt idx="4">
+                    <c:v>2</c:v>
+                  </c:pt>
+                </c:lvl>
+                <c:lvl>
+                  <c:pt idx="0">
+                    <c:v>2005</c:v>
+                  </c:pt>
+                  <c:pt idx="4">
+                    <c:v>2006</c:v>
+                  </c:pt>
+                </c:lvl>
+              </c:multiLvlStrCache>
+            </c:multiLvlStrRef>
+          </c:cat>
+          <c:val>
+            <c:numRef>
+              <c:f>Sheet1!$B$5:$B$12</c:f>
+              <c:numCache>
+                <c:formatCode>General</c:formatCode>
+                <c:ptCount val="5"/>
+                <c:pt idx="0">
+                  <c:v>558</c:v>
+                </c:pt>
+                <c:pt idx="1">
+                  <c:v>1163</c:v>
+                </c:pt>
+                <c:pt idx="2">
+                  <c:v>3342</c:v>
+                </c:pt>
+                <c:pt idx="3">
+                  <c:v>2892</c:v>
+                </c:pt>
+                <c:pt idx="4">
+                  <c:v>85</c:v>
+                </c:pt>
+              </c:numCache>
+            </c:numRef>
+          </c:val>
+          <c:smooth val="0"/>
+        </c:ser>
+        <c:ser>
+          <c:idx val="1"/>
+          <c:order val="1"/>
+          <c:tx>
+            <c:strRef>
+              <c:f>Sheet1!$C$3:$C$4</c:f>
+              <c:strCache>
+                <c:ptCount val="1"/>
+                <c:pt idx="0">
+                  <c:v>2</c:v>
+                </c:pt>
+              </c:strCache>
+            </c:strRef>
+          </c:tx>
+          <c:marker>
+            <c:symbol val="none"/>
+          </c:marker>
+          <c:cat>
+            <c:multiLvlStrRef>
+              <c:f>Sheet1!$A$5:$A$12</c:f>
+              <c:multiLvlStrCache>
+                <c:ptCount val="5"/>
+                <c:lvl>
+                  <c:pt idx="0">
+                    <c:v>5</c:v>
+                  </c:pt>
+                  <c:pt idx="1">
+                    <c:v>6</c:v>
+                  </c:pt>
+                  <c:pt idx="2">
+                    <c:v>7</c:v>
+                  </c:pt>
+                  <c:pt idx="3">
+                    <c:v>8</c:v>
+                  </c:pt>
+                  <c:pt idx="4">
+                    <c:v>2</c:v>
+                  </c:pt>
+                </c:lvl>
+                <c:lvl>
+                  <c:pt idx="0">
+                    <c:v>2005</c:v>
+                  </c:pt>
+                  <c:pt idx="4">
+                    <c:v>2006</c:v>
+                  </c:pt>
+                </c:lvl>
+              </c:multiLvlStrCache>
+            </c:multiLvlStrRef>
+          </c:cat>
+          <c:val>
+            <c:numRef>
+              <c:f>Sheet1!$C$5:$C$12</c:f>
+              <c:numCache>
+                <c:formatCode>General</c:formatCode>
+                <c:ptCount val="5"/>
+                <c:pt idx="0">
+                  <c:v>598</c:v>
+                </c:pt>
+                <c:pt idx="1">
+                  <c:v>1148</c:v>
+                </c:pt>
+                <c:pt idx="2">
+                  <c:v>3367</c:v>
+                </c:pt>
+                <c:pt idx="3">
+                  <c:v>2794</c:v>
+                </c:pt>
+                <c:pt idx="4">
+                  <c:v>97</c:v>
+                </c:pt>
+              </c:numCache>
+            </c:numRef>
+          </c:val>
+          <c:smooth val="0"/>
+        </c:ser>
+        <c:dLbls>
+          <c:showLegendKey val="0"/>
+          <c:showVal val="0"/>
+          <c:showCatName val="0"/>
+          <c:showSerName val="0"/>
+          <c:showPercent val="0"/>
+          <c:showBubbleSize val="0"/>
+        </c:dLbls>
+        <c:marker val="1"/>
+        <c:smooth val="0"/>
+        <c:axId val="38938880"/>
+        <c:axId val="38953344"/>
+      </c:lineChart>
+      <c:catAx>
+        <c:axId val="38938880"/>
+        <c:scaling>
+          <c:orientation val="minMax"/>
+        </c:scaling>
+        <c:delete val="0"/>
+        <c:axPos val="b"/>
+        <c:title>
+          <c:tx>
+            <c:rich>
+              <a:bodyPr/>
+              <a:lstStyle/>
+              <a:p>
+                <a:pPr>
+                  <a:defRPr sz="1800"/>
+                </a:pPr>
+                <a:r>
+                  <a:rPr lang="en-ZA" sz="1800"/>
+                  <a:t>Time</a:t>
+                </a:r>
+                <a:r>
+                  <a:rPr lang="en-ZA" sz="1800" baseline="0"/>
+                  <a:t> (Year - Month)</a:t>
+                </a:r>
+                <a:endParaRPr lang="en-ZA" sz="1800"/>
+              </a:p>
+            </c:rich>
+          </c:tx>
+          <c:layout/>
+          <c:overlay val="0"/>
+        </c:title>
+        <c:majorTickMark val="none"/>
+        <c:minorTickMark val="none"/>
+        <c:tickLblPos val="nextTo"/>
+        <c:crossAx val="38953344"/>
+        <c:crosses val="autoZero"/>
+        <c:auto val="1"/>
+        <c:lblAlgn val="ctr"/>
+        <c:lblOffset val="100"/>
+        <c:noMultiLvlLbl val="0"/>
+      </c:catAx>
+      <c:valAx>
+        <c:axId val="38953344"/>
+        <c:scaling>
+          <c:orientation val="minMax"/>
+        </c:scaling>
+        <c:delete val="0"/>
+        <c:axPos val="l"/>
+        <c:majorGridlines/>
+        <c:title>
+          <c:tx>
+            <c:rich>
+              <a:bodyPr/>
+              <a:lstStyle/>
+              <a:p>
+                <a:pPr>
+                  <a:defRPr sz="1800"/>
+                </a:pPr>
+                <a:r>
+                  <a:rPr lang="en-ZA" sz="1800"/>
+                  <a:t>Rental Orders</a:t>
+                </a:r>
+              </a:p>
+            </c:rich>
+          </c:tx>
+          <c:layout/>
+          <c:overlay val="0"/>
+        </c:title>
+        <c:numFmt formatCode="General" sourceLinked="1"/>
+        <c:majorTickMark val="none"/>
+        <c:minorTickMark val="none"/>
+        <c:tickLblPos val="nextTo"/>
+        <c:crossAx val="38938880"/>
+        <c:crosses val="autoZero"/>
+        <c:crossBetween val="between"/>
+      </c:valAx>
+    </c:plotArea>
+    <c:legend>
+      <c:legendPos val="r"/>
+      <c:layout/>
+      <c:overlay val="0"/>
+    </c:legend>
+    <c:plotVisOnly val="1"/>
+    <c:dispBlanksAs val="gap"/>
+    <c:showDLblsOverMax val="0"/>
+  </c:chart>
+  <c:externalData r:id="rId2">
+    <c:autoUpdate val="0"/>
+  </c:externalData>
+  <c:extLst>
+    <c:ext xmlns:c14="http://schemas.microsoft.com/office/drawing/2007/8/2/chart" uri="{781A3756-C4B2-4CAC-9D66-4F8BD8637D16}">
+      <c14:pivotOptions>
+        <c14:dropZoneFilter val="1"/>
+        <c14:dropZoneCategories val="1"/>
+        <c14:dropZoneData val="1"/>
         <c14:dropZoneSeries val="1"/>
       </c14:pivotOptions>
     </c:ext>
@@ -5145,7 +5548,23 @@
           <a:p>
             <a:r>
               <a:rPr lang="en-ZA" dirty="0" smtClean="0"/>
-              <a:t>Amongst families,  the most popular category (from the categories  that  form part of the family viewing group) is Animation, with this category having 1 166 rentals.  </a:t>
+              <a:t>Amongst families,  the most popular category (from the categories  that  form part of the </a:t>
+            </a:r>
+            <a:r>
+              <a:rPr lang="en-ZA" dirty="0" smtClean="0"/>
+              <a:t>family-friendly group</a:t>
+            </a:r>
+            <a:r>
+              <a:rPr lang="en-ZA" dirty="0" smtClean="0"/>
+              <a:t>) is </a:t>
+            </a:r>
+            <a:r>
+              <a:rPr lang="en-ZA" dirty="0" smtClean="0"/>
+              <a:t>‘Animation’, </a:t>
+            </a:r>
+            <a:r>
+              <a:rPr lang="en-ZA" dirty="0" smtClean="0"/>
+              <a:t>with this category having 1 166 rentals.  </a:t>
             </a:r>
             <a:endParaRPr lang="en-ZA" dirty="0"/>
           </a:p>
@@ -5426,6 +5845,136 @@
     <p:extLst>
       <p:ext uri="{BB962C8B-B14F-4D97-AF65-F5344CB8AC3E}">
         <p14:creationId xmlns:p14="http://schemas.microsoft.com/office/powerpoint/2010/main" val="806615183"/>
+      </p:ext>
+    </p:extLst>
+  </p:cSld>
+  <p:clrMapOvr>
+    <a:masterClrMapping/>
+  </p:clrMapOvr>
+  <p:timing>
+    <p:tnLst>
+      <p:par>
+        <p:cTn id="1" dur="indefinite" restart="never" nodeType="tmRoot"/>
+      </p:par>
+    </p:tnLst>
+  </p:timing>
+</p:sld>
+</file>
+
+<file path=ppt/slides/slide4.xml><?xml version="1.0" encoding="utf-8"?>
+<p:sld xmlns:a="http://schemas.openxmlformats.org/drawingml/2006/main" xmlns:r="http://schemas.openxmlformats.org/officeDocument/2006/relationships" xmlns:p="http://schemas.openxmlformats.org/presentationml/2006/main">
+  <p:cSld>
+    <p:spTree>
+      <p:nvGrpSpPr>
+        <p:cNvPr id="1" name=""/>
+        <p:cNvGrpSpPr/>
+        <p:nvPr/>
+      </p:nvGrpSpPr>
+      <p:grpSpPr>
+        <a:xfrm>
+          <a:off x="0" y="0"/>
+          <a:ext cx="0" cy="0"/>
+          <a:chOff x="0" y="0"/>
+          <a:chExt cx="0" cy="0"/>
+        </a:xfrm>
+      </p:grpSpPr>
+      <p:sp>
+        <p:nvSpPr>
+          <p:cNvPr id="2" name="Title 1"/>
+          <p:cNvSpPr>
+            <a:spLocks noGrp="1"/>
+          </p:cNvSpPr>
+          <p:nvPr>
+            <p:ph type="title"/>
+          </p:nvPr>
+        </p:nvSpPr>
+        <p:spPr>
+          <a:xfrm>
+            <a:off x="5868144" y="764704"/>
+            <a:ext cx="2868632" cy="2232248"/>
+          </a:xfrm>
+        </p:spPr>
+        <p:txBody>
+          <a:bodyPr>
+            <a:noAutofit/>
+          </a:bodyPr>
+          <a:lstStyle/>
+          <a:p>
+            <a:pPr algn="ctr"/>
+            <a:r>
+              <a:rPr lang="en-ZA" sz="2400" dirty="0" smtClean="0"/>
+              <a:t>Looking at each store, how many rentals did each store process over the available time period?</a:t>
+            </a:r>
+            <a:endParaRPr lang="en-ZA" sz="2400" dirty="0"/>
+          </a:p>
+        </p:txBody>
+      </p:sp>
+      <p:sp>
+        <p:nvSpPr>
+          <p:cNvPr id="5" name="Text Placeholder 4"/>
+          <p:cNvSpPr>
+            <a:spLocks noGrp="1"/>
+          </p:cNvSpPr>
+          <p:nvPr>
+            <p:ph type="body" idx="2"/>
+          </p:nvPr>
+        </p:nvSpPr>
+        <p:spPr>
+          <a:xfrm>
+            <a:off x="5868144" y="3068961"/>
+            <a:ext cx="2868632" cy="3559486"/>
+          </a:xfrm>
+        </p:spPr>
+        <p:txBody>
+          <a:bodyPr/>
+          <a:lstStyle/>
+          <a:p>
+            <a:r>
+              <a:rPr lang="en-ZA" dirty="0" smtClean="0"/>
+              <a:t>As shown by the line graph, both Stores 1 and 2 have  processed a similar amount of rentals during the time period covered by the data.</a:t>
+            </a:r>
+          </a:p>
+          <a:p>
+            <a:endParaRPr lang="en-ZA" dirty="0"/>
+          </a:p>
+          <a:p>
+            <a:r>
+              <a:rPr lang="en-ZA" dirty="0" smtClean="0"/>
+              <a:t>Store 1 processed slightly more rentals than Store 2 in August 2005. </a:t>
+            </a:r>
+            <a:endParaRPr lang="en-ZA" dirty="0"/>
+          </a:p>
+        </p:txBody>
+      </p:sp>
+      <p:graphicFrame>
+        <p:nvGraphicFramePr>
+          <p:cNvPr id="6" name="Content Placeholder 5"/>
+          <p:cNvGraphicFramePr>
+            <a:graphicFrameLocks noGrp="1"/>
+          </p:cNvGraphicFramePr>
+          <p:nvPr>
+            <p:ph sz="half" idx="1"/>
+            <p:extLst>
+              <p:ext uri="{D42A27DB-BD31-4B8C-83A1-F6EECF244321}">
+                <p14:modId xmlns:p14="http://schemas.microsoft.com/office/powerpoint/2010/main" val="3144243547"/>
+              </p:ext>
+            </p:extLst>
+          </p:nvPr>
+        </p:nvGraphicFramePr>
+        <p:xfrm>
+          <a:off x="0" y="476672"/>
+          <a:ext cx="5940152" cy="6381328"/>
+        </p:xfrm>
+        <a:graphic>
+          <a:graphicData uri="http://schemas.openxmlformats.org/drawingml/2006/chart">
+            <c:chart xmlns:c="http://schemas.openxmlformats.org/drawingml/2006/chart" xmlns:r="http://schemas.openxmlformats.org/officeDocument/2006/relationships" r:id="rId2"/>
+          </a:graphicData>
+        </a:graphic>
+      </p:graphicFrame>
+    </p:spTree>
+    <p:extLst>
+      <p:ext uri="{BB962C8B-B14F-4D97-AF65-F5344CB8AC3E}">
+        <p14:creationId xmlns:p14="http://schemas.microsoft.com/office/powerpoint/2010/main" val="7615717"/>
       </p:ext>
     </p:extLst>
   </p:cSld>
@@ -6565,4 +7114,285 @@
     </a:bgFillStyleLst>
   </a:fmtScheme>
 </a:themeOverride>
+</file>
+
+<file path=ppt/theme/themeOverride4.xml><?xml version="1.0" encoding="utf-8"?>
+<a:themeOverride xmlns:a="http://schemas.openxmlformats.org/drawingml/2006/main">
+  <a:clrScheme name="Office">
+    <a:dk1>
+      <a:sysClr val="windowText" lastClr="000000"/>
+    </a:dk1>
+    <a:lt1>
+      <a:sysClr val="window" lastClr="FFFFFF"/>
+    </a:lt1>
+    <a:dk2>
+      <a:srgbClr val="1F497D"/>
+    </a:dk2>
+    <a:lt2>
+      <a:srgbClr val="EEECE1"/>
+    </a:lt2>
+    <a:accent1>
+      <a:srgbClr val="4F81BD"/>
+    </a:accent1>
+    <a:accent2>
+      <a:srgbClr val="C0504D"/>
+    </a:accent2>
+    <a:accent3>
+      <a:srgbClr val="9BBB59"/>
+    </a:accent3>
+    <a:accent4>
+      <a:srgbClr val="8064A2"/>
+    </a:accent4>
+    <a:accent5>
+      <a:srgbClr val="4BACC6"/>
+    </a:accent5>
+    <a:accent6>
+      <a:srgbClr val="F79646"/>
+    </a:accent6>
+    <a:hlink>
+      <a:srgbClr val="0000FF"/>
+    </a:hlink>
+    <a:folHlink>
+      <a:srgbClr val="800080"/>
+    </a:folHlink>
+  </a:clrScheme>
+  <a:fontScheme name="Office">
+    <a:majorFont>
+      <a:latin typeface="Cambria"/>
+      <a:ea typeface=""/>
+      <a:cs typeface=""/>
+      <a:font script="Jpan" typeface="ＭＳ Ｐゴシック"/>
+      <a:font script="Hang" typeface="맑은 고딕"/>
+      <a:font script="Hans" typeface="宋体"/>
+      <a:font script="Hant" typeface="新細明體"/>
+      <a:font script="Arab" typeface="Times New Roman"/>
+      <a:font script="Hebr" typeface="Times New Roman"/>
+      <a:font script="Thai" typeface="Tahoma"/>
+      <a:font script="Ethi" typeface="Nyala"/>
+      <a:font script="Beng" typeface="Vrinda"/>
+      <a:font script="Gujr" typeface="Shruti"/>
+      <a:font script="Khmr" typeface="MoolBoran"/>
+      <a:font script="Knda" typeface="Tunga"/>
+      <a:font script="Guru" typeface="Raavi"/>
+      <a:font script="Cans" typeface="Euphemia"/>
+      <a:font script="Cher" typeface="Plantagenet Cherokee"/>
+      <a:font script="Yiii" typeface="Microsoft Yi Baiti"/>
+      <a:font script="Tibt" typeface="Microsoft Himalaya"/>
+      <a:font script="Thaa" typeface="MV Boli"/>
+      <a:font script="Deva" typeface="Mangal"/>
+      <a:font script="Telu" typeface="Gautami"/>
+      <a:font script="Taml" typeface="Latha"/>
+      <a:font script="Syrc" typeface="Estrangelo Edessa"/>
+      <a:font script="Orya" typeface="Kalinga"/>
+      <a:font script="Mlym" typeface="Kartika"/>
+      <a:font script="Laoo" typeface="DokChampa"/>
+      <a:font script="Sinh" typeface="Iskoola Pota"/>
+      <a:font script="Mong" typeface="Mongolian Baiti"/>
+      <a:font script="Viet" typeface="Times New Roman"/>
+      <a:font script="Uigh" typeface="Microsoft Uighur"/>
+      <a:font script="Geor" typeface="Sylfaen"/>
+    </a:majorFont>
+    <a:minorFont>
+      <a:latin typeface="Calibri"/>
+      <a:ea typeface=""/>
+      <a:cs typeface=""/>
+      <a:font script="Jpan" typeface="ＭＳ Ｐゴシック"/>
+      <a:font script="Hang" typeface="맑은 고딕"/>
+      <a:font script="Hans" typeface="宋体"/>
+      <a:font script="Hant" typeface="新細明體"/>
+      <a:font script="Arab" typeface="Arial"/>
+      <a:font script="Hebr" typeface="Arial"/>
+      <a:font script="Thai" typeface="Tahoma"/>
+      <a:font script="Ethi" typeface="Nyala"/>
+      <a:font script="Beng" typeface="Vrinda"/>
+      <a:font script="Gujr" typeface="Shruti"/>
+      <a:font script="Khmr" typeface="DaunPenh"/>
+      <a:font script="Knda" typeface="Tunga"/>
+      <a:font script="Guru" typeface="Raavi"/>
+      <a:font script="Cans" typeface="Euphemia"/>
+      <a:font script="Cher" typeface="Plantagenet Cherokee"/>
+      <a:font script="Yiii" typeface="Microsoft Yi Baiti"/>
+      <a:font script="Tibt" typeface="Microsoft Himalaya"/>
+      <a:font script="Thaa" typeface="MV Boli"/>
+      <a:font script="Deva" typeface="Mangal"/>
+      <a:font script="Telu" typeface="Gautami"/>
+      <a:font script="Taml" typeface="Latha"/>
+      <a:font script="Syrc" typeface="Estrangelo Edessa"/>
+      <a:font script="Orya" typeface="Kalinga"/>
+      <a:font script="Mlym" typeface="Kartika"/>
+      <a:font script="Laoo" typeface="DokChampa"/>
+      <a:font script="Sinh" typeface="Iskoola Pota"/>
+      <a:font script="Mong" typeface="Mongolian Baiti"/>
+      <a:font script="Viet" typeface="Arial"/>
+      <a:font script="Uigh" typeface="Microsoft Uighur"/>
+      <a:font script="Geor" typeface="Sylfaen"/>
+    </a:minorFont>
+  </a:fontScheme>
+  <a:fmtScheme name="Office">
+    <a:fillStyleLst>
+      <a:solidFill>
+        <a:schemeClr val="phClr"/>
+      </a:solidFill>
+      <a:gradFill rotWithShape="1">
+        <a:gsLst>
+          <a:gs pos="0">
+            <a:schemeClr val="phClr">
+              <a:tint val="50000"/>
+              <a:satMod val="300000"/>
+            </a:schemeClr>
+          </a:gs>
+          <a:gs pos="35000">
+            <a:schemeClr val="phClr">
+              <a:tint val="37000"/>
+              <a:satMod val="300000"/>
+            </a:schemeClr>
+          </a:gs>
+          <a:gs pos="100000">
+            <a:schemeClr val="phClr">
+              <a:tint val="15000"/>
+              <a:satMod val="350000"/>
+            </a:schemeClr>
+          </a:gs>
+        </a:gsLst>
+        <a:lin ang="16200000" scaled="1"/>
+      </a:gradFill>
+      <a:gradFill rotWithShape="1">
+        <a:gsLst>
+          <a:gs pos="0">
+            <a:schemeClr val="phClr">
+              <a:shade val="51000"/>
+              <a:satMod val="130000"/>
+            </a:schemeClr>
+          </a:gs>
+          <a:gs pos="80000">
+            <a:schemeClr val="phClr">
+              <a:shade val="93000"/>
+              <a:satMod val="130000"/>
+            </a:schemeClr>
+          </a:gs>
+          <a:gs pos="100000">
+            <a:schemeClr val="phClr">
+              <a:shade val="94000"/>
+              <a:satMod val="135000"/>
+            </a:schemeClr>
+          </a:gs>
+        </a:gsLst>
+        <a:lin ang="16200000" scaled="0"/>
+      </a:gradFill>
+    </a:fillStyleLst>
+    <a:lnStyleLst>
+      <a:ln w="9525" cap="flat" cmpd="sng" algn="ctr">
+        <a:solidFill>
+          <a:schemeClr val="phClr">
+            <a:shade val="95000"/>
+            <a:satMod val="105000"/>
+          </a:schemeClr>
+        </a:solidFill>
+        <a:prstDash val="solid"/>
+      </a:ln>
+      <a:ln w="25400" cap="flat" cmpd="sng" algn="ctr">
+        <a:solidFill>
+          <a:schemeClr val="phClr"/>
+        </a:solidFill>
+        <a:prstDash val="solid"/>
+      </a:ln>
+      <a:ln w="38100" cap="flat" cmpd="sng" algn="ctr">
+        <a:solidFill>
+          <a:schemeClr val="phClr"/>
+        </a:solidFill>
+        <a:prstDash val="solid"/>
+      </a:ln>
+    </a:lnStyleLst>
+    <a:effectStyleLst>
+      <a:effectStyle>
+        <a:effectLst>
+          <a:outerShdw blurRad="40000" dist="20000" dir="5400000" rotWithShape="0">
+            <a:srgbClr val="000000">
+              <a:alpha val="38000"/>
+            </a:srgbClr>
+          </a:outerShdw>
+        </a:effectLst>
+      </a:effectStyle>
+      <a:effectStyle>
+        <a:effectLst>
+          <a:outerShdw blurRad="40000" dist="23000" dir="5400000" rotWithShape="0">
+            <a:srgbClr val="000000">
+              <a:alpha val="35000"/>
+            </a:srgbClr>
+          </a:outerShdw>
+        </a:effectLst>
+      </a:effectStyle>
+      <a:effectStyle>
+        <a:effectLst>
+          <a:outerShdw blurRad="40000" dist="23000" dir="5400000" rotWithShape="0">
+            <a:srgbClr val="000000">
+              <a:alpha val="35000"/>
+            </a:srgbClr>
+          </a:outerShdw>
+        </a:effectLst>
+        <a:scene3d>
+          <a:camera prst="orthographicFront">
+            <a:rot lat="0" lon="0" rev="0"/>
+          </a:camera>
+          <a:lightRig rig="threePt" dir="t">
+            <a:rot lat="0" lon="0" rev="1200000"/>
+          </a:lightRig>
+        </a:scene3d>
+        <a:sp3d>
+          <a:bevelT w="63500" h="25400"/>
+        </a:sp3d>
+      </a:effectStyle>
+    </a:effectStyleLst>
+    <a:bgFillStyleLst>
+      <a:solidFill>
+        <a:schemeClr val="phClr"/>
+      </a:solidFill>
+      <a:gradFill rotWithShape="1">
+        <a:gsLst>
+          <a:gs pos="0">
+            <a:schemeClr val="phClr">
+              <a:tint val="40000"/>
+              <a:satMod val="350000"/>
+            </a:schemeClr>
+          </a:gs>
+          <a:gs pos="40000">
+            <a:schemeClr val="phClr">
+              <a:tint val="45000"/>
+              <a:shade val="99000"/>
+              <a:satMod val="350000"/>
+            </a:schemeClr>
+          </a:gs>
+          <a:gs pos="100000">
+            <a:schemeClr val="phClr">
+              <a:shade val="20000"/>
+              <a:satMod val="255000"/>
+            </a:schemeClr>
+          </a:gs>
+        </a:gsLst>
+        <a:path path="circle">
+          <a:fillToRect l="50000" t="-80000" r="50000" b="180000"/>
+        </a:path>
+      </a:gradFill>
+      <a:gradFill rotWithShape="1">
+        <a:gsLst>
+          <a:gs pos="0">
+            <a:schemeClr val="phClr">
+              <a:tint val="80000"/>
+              <a:satMod val="300000"/>
+            </a:schemeClr>
+          </a:gs>
+          <a:gs pos="100000">
+            <a:schemeClr val="phClr">
+              <a:shade val="30000"/>
+              <a:satMod val="200000"/>
+            </a:schemeClr>
+          </a:gs>
+        </a:gsLst>
+        <a:path path="circle">
+          <a:fillToRect l="50000" t="50000" r="50000" b="50000"/>
+        </a:path>
+      </a:gradFill>
+    </a:bgFillStyleLst>
+  </a:fmtScheme>
+</a:themeOverride>
 </file>
</xml_diff>

<commit_message>
feat: Add ppt visualisation for Q2 in Question Set 2
</commit_message>
<xml_diff>
--- a/slideshow/movies-db-slideshow.pptx
+++ b/slideshow/movies-db-slideshow.pptx
@@ -9,6 +9,7 @@
     <p:sldId id="257" r:id="rId3"/>
     <p:sldId id="258" r:id="rId4"/>
     <p:sldId id="259" r:id="rId5"/>
+    <p:sldId id="260" r:id="rId6"/>
   </p:sldIdLst>
   <p:sldSz cx="9144000" cy="6858000" type="screen4x3"/>
   <p:notesSz cx="6858000" cy="9144000"/>
@@ -241,11 +242,11 @@
           <c:showBubbleSize val="0"/>
         </c:dLbls>
         <c:gapWidth val="75"/>
-        <c:axId val="77669888"/>
-        <c:axId val="77671808"/>
+        <c:axId val="70960256"/>
+        <c:axId val="70962176"/>
       </c:barChart>
       <c:catAx>
-        <c:axId val="77669888"/>
+        <c:axId val="70960256"/>
         <c:scaling>
           <c:orientation val="minMax"/>
         </c:scaling>
@@ -274,7 +275,7 @@
         <c:majorTickMark val="none"/>
         <c:minorTickMark val="none"/>
         <c:tickLblPos val="nextTo"/>
-        <c:crossAx val="77671808"/>
+        <c:crossAx val="70962176"/>
         <c:crosses val="autoZero"/>
         <c:auto val="1"/>
         <c:lblAlgn val="ctr"/>
@@ -282,7 +283,7 @@
         <c:noMultiLvlLbl val="0"/>
       </c:catAx>
       <c:valAx>
-        <c:axId val="77671808"/>
+        <c:axId val="70962176"/>
         <c:scaling>
           <c:orientation val="minMax"/>
         </c:scaling>
@@ -311,7 +312,7 @@
         <c:majorTickMark val="none"/>
         <c:minorTickMark val="none"/>
         <c:tickLblPos val="nextTo"/>
-        <c:crossAx val="77669888"/>
+        <c:crossAx val="70960256"/>
         <c:crosses val="autoZero"/>
         <c:crossBetween val="between"/>
       </c:valAx>
@@ -474,11 +475,11 @@
           <c:showBubbleSize val="0"/>
         </c:dLbls>
         <c:gapWidth val="75"/>
-        <c:axId val="36441088"/>
-        <c:axId val="36459648"/>
+        <c:axId val="78449664"/>
+        <c:axId val="78468224"/>
       </c:barChart>
       <c:catAx>
-        <c:axId val="36441088"/>
+        <c:axId val="78449664"/>
         <c:scaling>
           <c:orientation val="maxMin"/>
         </c:scaling>
@@ -510,7 +511,7 @@
         <c:majorTickMark val="none"/>
         <c:minorTickMark val="none"/>
         <c:tickLblPos val="nextTo"/>
-        <c:crossAx val="36459648"/>
+        <c:crossAx val="78468224"/>
         <c:crosses val="autoZero"/>
         <c:auto val="1"/>
         <c:lblAlgn val="ctr"/>
@@ -518,7 +519,7 @@
         <c:noMultiLvlLbl val="0"/>
       </c:catAx>
       <c:valAx>
-        <c:axId val="36459648"/>
+        <c:axId val="78468224"/>
         <c:scaling>
           <c:orientation val="minMax"/>
         </c:scaling>
@@ -552,7 +553,7 @@
         <c:majorTickMark val="none"/>
         <c:minorTickMark val="none"/>
         <c:tickLblPos val="nextTo"/>
-        <c:crossAx val="36441088"/>
+        <c:crossAx val="78449664"/>
         <c:crosses val="autoZero"/>
         <c:crossBetween val="between"/>
       </c:valAx>
@@ -996,11 +997,11 @@
         </c:dLbls>
         <c:gapWidth val="55"/>
         <c:overlap val="100"/>
-        <c:axId val="82612608"/>
-        <c:axId val="35120640"/>
+        <c:axId val="96172672"/>
+        <c:axId val="96936704"/>
       </c:barChart>
       <c:catAx>
-        <c:axId val="82612608"/>
+        <c:axId val="96172672"/>
         <c:scaling>
           <c:orientation val="minMax"/>
         </c:scaling>
@@ -1028,7 +1029,7 @@
         <c:majorTickMark val="none"/>
         <c:minorTickMark val="none"/>
         <c:tickLblPos val="nextTo"/>
-        <c:crossAx val="35120640"/>
+        <c:crossAx val="96936704"/>
         <c:crosses val="autoZero"/>
         <c:auto val="1"/>
         <c:lblAlgn val="ctr"/>
@@ -1036,7 +1037,7 @@
         <c:noMultiLvlLbl val="0"/>
       </c:catAx>
       <c:valAx>
-        <c:axId val="35120640"/>
+        <c:axId val="96936704"/>
         <c:scaling>
           <c:orientation val="minMax"/>
         </c:scaling>
@@ -1066,7 +1067,7 @@
         <c:majorTickMark val="none"/>
         <c:minorTickMark val="none"/>
         <c:tickLblPos val="nextTo"/>
-        <c:crossAx val="82612608"/>
+        <c:crossAx val="96172672"/>
         <c:crosses val="autoZero"/>
         <c:crossBetween val="between"/>
       </c:valAx>
@@ -1391,11 +1392,11 @@
         </c:dLbls>
         <c:marker val="1"/>
         <c:smooth val="0"/>
-        <c:axId val="38938880"/>
-        <c:axId val="38953344"/>
+        <c:axId val="96182656"/>
+        <c:axId val="96184576"/>
       </c:lineChart>
       <c:catAx>
-        <c:axId val="38938880"/>
+        <c:axId val="96182656"/>
         <c:scaling>
           <c:orientation val="minMax"/>
         </c:scaling>
@@ -1428,7 +1429,7 @@
         <c:majorTickMark val="none"/>
         <c:minorTickMark val="none"/>
         <c:tickLblPos val="nextTo"/>
-        <c:crossAx val="38953344"/>
+        <c:crossAx val="96184576"/>
         <c:crosses val="autoZero"/>
         <c:auto val="1"/>
         <c:lblAlgn val="ctr"/>
@@ -1436,7 +1437,7 @@
         <c:noMultiLvlLbl val="0"/>
       </c:catAx>
       <c:valAx>
-        <c:axId val="38953344"/>
+        <c:axId val="96184576"/>
         <c:scaling>
           <c:orientation val="minMax"/>
         </c:scaling>
@@ -1466,13 +1467,410 @@
         <c:majorTickMark val="none"/>
         <c:minorTickMark val="none"/>
         <c:tickLblPos val="nextTo"/>
-        <c:crossAx val="38938880"/>
+        <c:crossAx val="96182656"/>
         <c:crosses val="autoZero"/>
         <c:crossBetween val="between"/>
       </c:valAx>
     </c:plotArea>
     <c:legend>
       <c:legendPos val="r"/>
+      <c:layout/>
+      <c:overlay val="0"/>
+    </c:legend>
+    <c:plotVisOnly val="1"/>
+    <c:dispBlanksAs val="gap"/>
+    <c:showDLblsOverMax val="0"/>
+  </c:chart>
+  <c:externalData r:id="rId2">
+    <c:autoUpdate val="0"/>
+  </c:externalData>
+  <c:extLst>
+    <c:ext xmlns:c14="http://schemas.microsoft.com/office/drawing/2007/8/2/chart" uri="{781A3756-C4B2-4CAC-9D66-4F8BD8637D16}">
+      <c14:pivotOptions>
+        <c14:dropZoneFilter val="1"/>
+        <c14:dropZoneCategories val="1"/>
+        <c14:dropZoneData val="1"/>
+        <c14:dropZoneSeries val="1"/>
+      </c14:pivotOptions>
+    </c:ext>
+  </c:extLst>
+</c:chartSpace>
+</file>
+
+<file path=ppt/charts/chart5.xml><?xml version="1.0" encoding="utf-8"?>
+<c:chartSpace xmlns:c="http://schemas.openxmlformats.org/drawingml/2006/chart" xmlns:a="http://schemas.openxmlformats.org/drawingml/2006/main" xmlns:r="http://schemas.openxmlformats.org/officeDocument/2006/relationships">
+  <c:date1904 val="0"/>
+  <c:lang val="en-ZA"/>
+  <c:roundedCorners val="0"/>
+  <mc:AlternateContent xmlns:mc="http://schemas.openxmlformats.org/markup-compatibility/2006">
+    <mc:Choice xmlns:c14="http://schemas.microsoft.com/office/drawing/2007/8/2/chart" Requires="c14">
+      <c14:style val="102"/>
+    </mc:Choice>
+    <mc:Fallback>
+      <c:style val="2"/>
+    </mc:Fallback>
+  </mc:AlternateContent>
+  <c:clrMapOvr bg1="lt1" tx1="dk1" bg2="lt2" tx2="dk2" accent1="accent1" accent2="accent2" accent3="accent3" accent4="accent4" accent5="accent5" accent6="accent6" hlink="hlink" folHlink="folHlink"/>
+  <c:pivotSource>
+    <c:name>[top-10-customers.xlsx]Sheet1!PivotTable1</c:name>
+    <c:fmtId val="7"/>
+  </c:pivotSource>
+  <c:chart>
+    <c:title>
+      <c:tx>
+        <c:rich>
+          <a:bodyPr/>
+          <a:lstStyle/>
+          <a:p>
+            <a:pPr>
+              <a:defRPr sz="3200"/>
+            </a:pPr>
+            <a:r>
+              <a:rPr lang="en-ZA" sz="3200"/>
+              <a:t>Top</a:t>
+            </a:r>
+            <a:r>
+              <a:rPr lang="en-ZA" sz="3200" baseline="0"/>
+              <a:t> 10 Customers</a:t>
+            </a:r>
+            <a:endParaRPr lang="en-ZA" sz="3200"/>
+          </a:p>
+        </c:rich>
+      </c:tx>
+      <c:layout/>
+      <c:overlay val="1"/>
+    </c:title>
+    <c:autoTitleDeleted val="0"/>
+    <c:pivotFmts>
+      <c:pivotFmt>
+        <c:idx val="0"/>
+      </c:pivotFmt>
+      <c:pivotFmt>
+        <c:idx val="1"/>
+      </c:pivotFmt>
+      <c:pivotFmt>
+        <c:idx val="2"/>
+        <c:spPr>
+          <a:solidFill>
+            <a:schemeClr val="accent6"/>
+          </a:solidFill>
+        </c:spPr>
+      </c:pivotFmt>
+      <c:pivotFmt>
+        <c:idx val="3"/>
+        <c:spPr>
+          <a:solidFill>
+            <a:schemeClr val="tx2"/>
+          </a:solidFill>
+        </c:spPr>
+      </c:pivotFmt>
+      <c:pivotFmt>
+        <c:idx val="4"/>
+      </c:pivotFmt>
+      <c:pivotFmt>
+        <c:idx val="5"/>
+      </c:pivotFmt>
+      <c:pivotFmt>
+        <c:idx val="6"/>
+        <c:spPr>
+          <a:solidFill>
+            <a:schemeClr val="accent6"/>
+          </a:solidFill>
+        </c:spPr>
+        <c:marker>
+          <c:symbol val="none"/>
+        </c:marker>
+      </c:pivotFmt>
+      <c:pivotFmt>
+        <c:idx val="7"/>
+        <c:spPr>
+          <a:solidFill>
+            <a:schemeClr val="tx2"/>
+          </a:solidFill>
+        </c:spPr>
+        <c:marker>
+          <c:symbol val="none"/>
+        </c:marker>
+      </c:pivotFmt>
+      <c:pivotFmt>
+        <c:idx val="8"/>
+        <c:spPr>
+          <a:solidFill>
+            <a:schemeClr val="accent6"/>
+          </a:solidFill>
+        </c:spPr>
+        <c:marker>
+          <c:symbol val="none"/>
+        </c:marker>
+      </c:pivotFmt>
+      <c:pivotFmt>
+        <c:idx val="9"/>
+        <c:spPr>
+          <a:solidFill>
+            <a:schemeClr val="tx2"/>
+          </a:solidFill>
+        </c:spPr>
+        <c:marker>
+          <c:symbol val="none"/>
+        </c:marker>
+      </c:pivotFmt>
+    </c:pivotFmts>
+    <c:plotArea>
+      <c:layout/>
+      <c:barChart>
+        <c:barDir val="col"/>
+        <c:grouping val="clustered"/>
+        <c:varyColors val="0"/>
+        <c:ser>
+          <c:idx val="0"/>
+          <c:order val="0"/>
+          <c:tx>
+            <c:strRef>
+              <c:f>Sheet1!$B$3:$B$4</c:f>
+              <c:strCache>
+                <c:ptCount val="1"/>
+                <c:pt idx="0">
+                  <c:v>2007/03/01 00:00</c:v>
+                </c:pt>
+              </c:strCache>
+            </c:strRef>
+          </c:tx>
+          <c:spPr>
+            <a:solidFill>
+              <a:schemeClr val="accent6"/>
+            </a:solidFill>
+          </c:spPr>
+          <c:invertIfNegative val="0"/>
+          <c:cat>
+            <c:strRef>
+              <c:f>Sheet1!$A$5:$A$14</c:f>
+              <c:strCache>
+                <c:ptCount val="9"/>
+                <c:pt idx="0">
+                  <c:v>Eleanor Hunt</c:v>
+                </c:pt>
+                <c:pt idx="1">
+                  <c:v>Arnold Havens</c:v>
+                </c:pt>
+                <c:pt idx="2">
+                  <c:v>Gordon Allard</c:v>
+                </c:pt>
+                <c:pt idx="3">
+                  <c:v>Rhonda Kennedy</c:v>
+                </c:pt>
+                <c:pt idx="4">
+                  <c:v>Clara Shaw</c:v>
+                </c:pt>
+                <c:pt idx="5">
+                  <c:v>Tommy Collazo</c:v>
+                </c:pt>
+                <c:pt idx="6">
+                  <c:v>Karl Seal</c:v>
+                </c:pt>
+                <c:pt idx="7">
+                  <c:v>Marsha Douglas</c:v>
+                </c:pt>
+                <c:pt idx="8">
+                  <c:v>Daisy Bates</c:v>
+                </c:pt>
+              </c:strCache>
+            </c:strRef>
+          </c:cat>
+          <c:val>
+            <c:numRef>
+              <c:f>Sheet1!$B$5:$B$14</c:f>
+              <c:numCache>
+                <c:formatCode>General</c:formatCode>
+                <c:ptCount val="9"/>
+                <c:pt idx="0">
+                  <c:v>87.82</c:v>
+                </c:pt>
+              </c:numCache>
+            </c:numRef>
+          </c:val>
+        </c:ser>
+        <c:ser>
+          <c:idx val="1"/>
+          <c:order val="1"/>
+          <c:tx>
+            <c:strRef>
+              <c:f>Sheet1!$C$3:$C$4</c:f>
+              <c:strCache>
+                <c:ptCount val="1"/>
+                <c:pt idx="0">
+                  <c:v>2007/04/01 00:00</c:v>
+                </c:pt>
+              </c:strCache>
+            </c:strRef>
+          </c:tx>
+          <c:spPr>
+            <a:solidFill>
+              <a:schemeClr val="tx2"/>
+            </a:solidFill>
+          </c:spPr>
+          <c:invertIfNegative val="0"/>
+          <c:cat>
+            <c:strRef>
+              <c:f>Sheet1!$A$5:$A$14</c:f>
+              <c:strCache>
+                <c:ptCount val="9"/>
+                <c:pt idx="0">
+                  <c:v>Eleanor Hunt</c:v>
+                </c:pt>
+                <c:pt idx="1">
+                  <c:v>Arnold Havens</c:v>
+                </c:pt>
+                <c:pt idx="2">
+                  <c:v>Gordon Allard</c:v>
+                </c:pt>
+                <c:pt idx="3">
+                  <c:v>Rhonda Kennedy</c:v>
+                </c:pt>
+                <c:pt idx="4">
+                  <c:v>Clara Shaw</c:v>
+                </c:pt>
+                <c:pt idx="5">
+                  <c:v>Tommy Collazo</c:v>
+                </c:pt>
+                <c:pt idx="6">
+                  <c:v>Karl Seal</c:v>
+                </c:pt>
+                <c:pt idx="7">
+                  <c:v>Marsha Douglas</c:v>
+                </c:pt>
+                <c:pt idx="8">
+                  <c:v>Daisy Bates</c:v>
+                </c:pt>
+              </c:strCache>
+            </c:strRef>
+          </c:cat>
+          <c:val>
+            <c:numRef>
+              <c:f>Sheet1!$C$5:$C$14</c:f>
+              <c:numCache>
+                <c:formatCode>General</c:formatCode>
+                <c:ptCount val="9"/>
+                <c:pt idx="0">
+                  <c:v>100.78</c:v>
+                </c:pt>
+                <c:pt idx="1">
+                  <c:v>97.81</c:v>
+                </c:pt>
+                <c:pt idx="2">
+                  <c:v>96.83</c:v>
+                </c:pt>
+                <c:pt idx="3">
+                  <c:v>96.81</c:v>
+                </c:pt>
+                <c:pt idx="4">
+                  <c:v>93.82</c:v>
+                </c:pt>
+                <c:pt idx="5">
+                  <c:v>89.82</c:v>
+                </c:pt>
+                <c:pt idx="6">
+                  <c:v>89.8</c:v>
+                </c:pt>
+                <c:pt idx="7">
+                  <c:v>88.82</c:v>
+                </c:pt>
+                <c:pt idx="8">
+                  <c:v>88.81</c:v>
+                </c:pt>
+              </c:numCache>
+            </c:numRef>
+          </c:val>
+        </c:ser>
+        <c:dLbls>
+          <c:showLegendKey val="0"/>
+          <c:showVal val="0"/>
+          <c:showCatName val="0"/>
+          <c:showSerName val="0"/>
+          <c:showPercent val="0"/>
+          <c:showBubbleSize val="0"/>
+        </c:dLbls>
+        <c:gapWidth val="0"/>
+        <c:axId val="89633152"/>
+        <c:axId val="89635072"/>
+      </c:barChart>
+      <c:catAx>
+        <c:axId val="89633152"/>
+        <c:scaling>
+          <c:orientation val="minMax"/>
+        </c:scaling>
+        <c:delete val="0"/>
+        <c:axPos val="b"/>
+        <c:title>
+          <c:tx>
+            <c:rich>
+              <a:bodyPr/>
+              <a:lstStyle/>
+              <a:p>
+                <a:pPr>
+                  <a:defRPr sz="1800"/>
+                </a:pPr>
+                <a:r>
+                  <a:rPr lang="en-ZA" sz="1800"/>
+                  <a:t>Customers</a:t>
+                </a:r>
+              </a:p>
+            </c:rich>
+          </c:tx>
+          <c:layout/>
+          <c:overlay val="0"/>
+        </c:title>
+        <c:majorTickMark val="none"/>
+        <c:minorTickMark val="none"/>
+        <c:tickLblPos val="nextTo"/>
+        <c:crossAx val="89635072"/>
+        <c:crosses val="autoZero"/>
+        <c:auto val="1"/>
+        <c:lblAlgn val="ctr"/>
+        <c:lblOffset val="100"/>
+        <c:noMultiLvlLbl val="0"/>
+      </c:catAx>
+      <c:valAx>
+        <c:axId val="89635072"/>
+        <c:scaling>
+          <c:orientation val="minMax"/>
+        </c:scaling>
+        <c:delete val="0"/>
+        <c:axPos val="l"/>
+        <c:title>
+          <c:tx>
+            <c:rich>
+              <a:bodyPr/>
+              <a:lstStyle/>
+              <a:p>
+                <a:pPr>
+                  <a:defRPr sz="1800"/>
+                </a:pPr>
+                <a:r>
+                  <a:rPr lang="en-ZA" sz="1800"/>
+                  <a:t>Total Monthly Spending</a:t>
+                </a:r>
+                <a:r>
+                  <a:rPr lang="en-ZA" sz="1800" baseline="0"/>
+                  <a:t>  ($)</a:t>
+                </a:r>
+                <a:endParaRPr lang="en-ZA" sz="1800"/>
+              </a:p>
+            </c:rich>
+          </c:tx>
+          <c:layout/>
+          <c:overlay val="0"/>
+        </c:title>
+        <c:numFmt formatCode="General" sourceLinked="1"/>
+        <c:majorTickMark val="out"/>
+        <c:minorTickMark val="none"/>
+        <c:tickLblPos val="nextTo"/>
+        <c:crossAx val="89633152"/>
+        <c:crosses val="autoZero"/>
+        <c:crossBetween val="between"/>
+      </c:valAx>
+    </c:plotArea>
+    <c:legend>
+      <c:legendPos val="b"/>
       <c:layout/>
       <c:overlay val="0"/>
     </c:legend>
@@ -5548,23 +5946,7 @@
           <a:p>
             <a:r>
               <a:rPr lang="en-ZA" dirty="0" smtClean="0"/>
-              <a:t>Amongst families,  the most popular category (from the categories  that  form part of the </a:t>
-            </a:r>
-            <a:r>
-              <a:rPr lang="en-ZA" dirty="0" smtClean="0"/>
-              <a:t>family-friendly group</a:t>
-            </a:r>
-            <a:r>
-              <a:rPr lang="en-ZA" dirty="0" smtClean="0"/>
-              <a:t>) is </a:t>
-            </a:r>
-            <a:r>
-              <a:rPr lang="en-ZA" dirty="0" smtClean="0"/>
-              <a:t>‘Animation’, </a:t>
-            </a:r>
-            <a:r>
-              <a:rPr lang="en-ZA" dirty="0" smtClean="0"/>
-              <a:t>with this category having 1 166 rentals.  </a:t>
+              <a:t>Amongst families,  the most popular category (from the categories  that  form part of the family-friendly group) is ‘Animation’, with this category having 1 166 rentals.  </a:t>
             </a:r>
             <a:endParaRPr lang="en-ZA" dirty="0"/>
           </a:p>
@@ -5810,7 +6192,15 @@
           <a:p>
             <a:r>
               <a:rPr lang="en-ZA" dirty="0" smtClean="0"/>
-              <a:t>The ‘Children’ category is the only category with a near symmetrical quartile distribution.</a:t>
+              <a:t>The ‘</a:t>
+            </a:r>
+            <a:r>
+              <a:rPr lang="en-ZA" dirty="0" smtClean="0"/>
+              <a:t>Classic’ </a:t>
+            </a:r>
+            <a:r>
+              <a:rPr lang="en-ZA" dirty="0" smtClean="0"/>
+              <a:t>category is the only category with a near symmetrical quartile distribution.</a:t>
             </a:r>
             <a:endParaRPr lang="en-ZA" dirty="0"/>
           </a:p>
@@ -5975,6 +6365,136 @@
     <p:extLst>
       <p:ext uri="{BB962C8B-B14F-4D97-AF65-F5344CB8AC3E}">
         <p14:creationId xmlns:p14="http://schemas.microsoft.com/office/powerpoint/2010/main" val="7615717"/>
+      </p:ext>
+    </p:extLst>
+  </p:cSld>
+  <p:clrMapOvr>
+    <a:masterClrMapping/>
+  </p:clrMapOvr>
+  <p:timing>
+    <p:tnLst>
+      <p:par>
+        <p:cTn id="1" dur="indefinite" restart="never" nodeType="tmRoot"/>
+      </p:par>
+    </p:tnLst>
+  </p:timing>
+</p:sld>
+</file>
+
+<file path=ppt/slides/slide5.xml><?xml version="1.0" encoding="utf-8"?>
+<p:sld xmlns:a="http://schemas.openxmlformats.org/drawingml/2006/main" xmlns:r="http://schemas.openxmlformats.org/officeDocument/2006/relationships" xmlns:p="http://schemas.openxmlformats.org/presentationml/2006/main">
+  <p:cSld>
+    <p:spTree>
+      <p:nvGrpSpPr>
+        <p:cNvPr id="1" name=""/>
+        <p:cNvGrpSpPr/>
+        <p:nvPr/>
+      </p:nvGrpSpPr>
+      <p:grpSpPr>
+        <a:xfrm>
+          <a:off x="0" y="0"/>
+          <a:ext cx="0" cy="0"/>
+          <a:chOff x="0" y="0"/>
+          <a:chExt cx="0" cy="0"/>
+        </a:xfrm>
+      </p:grpSpPr>
+      <p:sp>
+        <p:nvSpPr>
+          <p:cNvPr id="2" name="Title 1"/>
+          <p:cNvSpPr>
+            <a:spLocks noGrp="1"/>
+          </p:cNvSpPr>
+          <p:nvPr>
+            <p:ph type="title"/>
+          </p:nvPr>
+        </p:nvSpPr>
+        <p:spPr>
+          <a:xfrm>
+            <a:off x="5868144" y="764704"/>
+            <a:ext cx="2868632" cy="1944216"/>
+          </a:xfrm>
+        </p:spPr>
+        <p:txBody>
+          <a:bodyPr>
+            <a:noAutofit/>
+          </a:bodyPr>
+          <a:lstStyle/>
+          <a:p>
+            <a:pPr algn="ctr"/>
+            <a:r>
+              <a:rPr lang="en-ZA" sz="2400" dirty="0" smtClean="0"/>
+              <a:t>Who are the top 10 paying customers based on a month-by-month analysis?</a:t>
+            </a:r>
+            <a:endParaRPr lang="en-ZA" sz="2400" dirty="0"/>
+          </a:p>
+        </p:txBody>
+      </p:sp>
+      <p:sp>
+        <p:nvSpPr>
+          <p:cNvPr id="5" name="Text Placeholder 4"/>
+          <p:cNvSpPr>
+            <a:spLocks noGrp="1"/>
+          </p:cNvSpPr>
+          <p:nvPr>
+            <p:ph type="body" idx="2"/>
+          </p:nvPr>
+        </p:nvSpPr>
+        <p:spPr>
+          <a:xfrm>
+            <a:off x="5868144" y="3068961"/>
+            <a:ext cx="2868632" cy="3559486"/>
+          </a:xfrm>
+        </p:spPr>
+        <p:txBody>
+          <a:bodyPr/>
+          <a:lstStyle/>
+          <a:p>
+            <a:r>
+              <a:rPr lang="en-ZA" dirty="0" smtClean="0"/>
+              <a:t>Eleanor Hunt is the number 1 ranked customer, spending $100.78 in April 2007.</a:t>
+            </a:r>
+          </a:p>
+          <a:p>
+            <a:endParaRPr lang="en-ZA" dirty="0"/>
+          </a:p>
+          <a:p>
+            <a:r>
+              <a:rPr lang="en-ZA" dirty="0" smtClean="0"/>
+              <a:t>Eleanor Hunt is also the number 10 ranked customer, spending  $87.82 in March 2007.</a:t>
+            </a:r>
+            <a:endParaRPr lang="en-ZA" dirty="0"/>
+          </a:p>
+        </p:txBody>
+      </p:sp>
+      <p:graphicFrame>
+        <p:nvGraphicFramePr>
+          <p:cNvPr id="7" name="Content Placeholder 6"/>
+          <p:cNvGraphicFramePr>
+            <a:graphicFrameLocks noGrp="1"/>
+          </p:cNvGraphicFramePr>
+          <p:nvPr>
+            <p:ph sz="half" idx="1"/>
+            <p:extLst>
+              <p:ext uri="{D42A27DB-BD31-4B8C-83A1-F6EECF244321}">
+                <p14:modId xmlns:p14="http://schemas.microsoft.com/office/powerpoint/2010/main" val="1035565868"/>
+              </p:ext>
+            </p:extLst>
+          </p:nvPr>
+        </p:nvGraphicFramePr>
+        <p:xfrm>
+          <a:off x="0" y="476672"/>
+          <a:ext cx="5940152" cy="6381328"/>
+        </p:xfrm>
+        <a:graphic>
+          <a:graphicData uri="http://schemas.openxmlformats.org/drawingml/2006/chart">
+            <c:chart xmlns:c="http://schemas.openxmlformats.org/drawingml/2006/chart" xmlns:r="http://schemas.openxmlformats.org/officeDocument/2006/relationships" r:id="rId2"/>
+          </a:graphicData>
+        </a:graphic>
+      </p:graphicFrame>
+    </p:spTree>
+    <p:extLst>
+      <p:ext uri="{BB962C8B-B14F-4D97-AF65-F5344CB8AC3E}">
+        <p14:creationId xmlns:p14="http://schemas.microsoft.com/office/powerpoint/2010/main" val="416378147"/>
       </p:ext>
     </p:extLst>
   </p:cSld>
@@ -7395,4 +7915,285 @@
     </a:bgFillStyleLst>
   </a:fmtScheme>
 </a:themeOverride>
+</file>
+
+<file path=ppt/theme/themeOverride5.xml><?xml version="1.0" encoding="utf-8"?>
+<a:themeOverride xmlns:a="http://schemas.openxmlformats.org/drawingml/2006/main">
+  <a:clrScheme name="Office">
+    <a:dk1>
+      <a:sysClr val="windowText" lastClr="000000"/>
+    </a:dk1>
+    <a:lt1>
+      <a:sysClr val="window" lastClr="FFFFFF"/>
+    </a:lt1>
+    <a:dk2>
+      <a:srgbClr val="1F497D"/>
+    </a:dk2>
+    <a:lt2>
+      <a:srgbClr val="EEECE1"/>
+    </a:lt2>
+    <a:accent1>
+      <a:srgbClr val="4F81BD"/>
+    </a:accent1>
+    <a:accent2>
+      <a:srgbClr val="C0504D"/>
+    </a:accent2>
+    <a:accent3>
+      <a:srgbClr val="9BBB59"/>
+    </a:accent3>
+    <a:accent4>
+      <a:srgbClr val="8064A2"/>
+    </a:accent4>
+    <a:accent5>
+      <a:srgbClr val="4BACC6"/>
+    </a:accent5>
+    <a:accent6>
+      <a:srgbClr val="F79646"/>
+    </a:accent6>
+    <a:hlink>
+      <a:srgbClr val="0000FF"/>
+    </a:hlink>
+    <a:folHlink>
+      <a:srgbClr val="800080"/>
+    </a:folHlink>
+  </a:clrScheme>
+  <a:fontScheme name="Office">
+    <a:majorFont>
+      <a:latin typeface="Cambria"/>
+      <a:ea typeface=""/>
+      <a:cs typeface=""/>
+      <a:font script="Jpan" typeface="ＭＳ Ｐゴシック"/>
+      <a:font script="Hang" typeface="맑은 고딕"/>
+      <a:font script="Hans" typeface="宋体"/>
+      <a:font script="Hant" typeface="新細明體"/>
+      <a:font script="Arab" typeface="Times New Roman"/>
+      <a:font script="Hebr" typeface="Times New Roman"/>
+      <a:font script="Thai" typeface="Tahoma"/>
+      <a:font script="Ethi" typeface="Nyala"/>
+      <a:font script="Beng" typeface="Vrinda"/>
+      <a:font script="Gujr" typeface="Shruti"/>
+      <a:font script="Khmr" typeface="MoolBoran"/>
+      <a:font script="Knda" typeface="Tunga"/>
+      <a:font script="Guru" typeface="Raavi"/>
+      <a:font script="Cans" typeface="Euphemia"/>
+      <a:font script="Cher" typeface="Plantagenet Cherokee"/>
+      <a:font script="Yiii" typeface="Microsoft Yi Baiti"/>
+      <a:font script="Tibt" typeface="Microsoft Himalaya"/>
+      <a:font script="Thaa" typeface="MV Boli"/>
+      <a:font script="Deva" typeface="Mangal"/>
+      <a:font script="Telu" typeface="Gautami"/>
+      <a:font script="Taml" typeface="Latha"/>
+      <a:font script="Syrc" typeface="Estrangelo Edessa"/>
+      <a:font script="Orya" typeface="Kalinga"/>
+      <a:font script="Mlym" typeface="Kartika"/>
+      <a:font script="Laoo" typeface="DokChampa"/>
+      <a:font script="Sinh" typeface="Iskoola Pota"/>
+      <a:font script="Mong" typeface="Mongolian Baiti"/>
+      <a:font script="Viet" typeface="Times New Roman"/>
+      <a:font script="Uigh" typeface="Microsoft Uighur"/>
+      <a:font script="Geor" typeface="Sylfaen"/>
+    </a:majorFont>
+    <a:minorFont>
+      <a:latin typeface="Calibri"/>
+      <a:ea typeface=""/>
+      <a:cs typeface=""/>
+      <a:font script="Jpan" typeface="ＭＳ Ｐゴシック"/>
+      <a:font script="Hang" typeface="맑은 고딕"/>
+      <a:font script="Hans" typeface="宋体"/>
+      <a:font script="Hant" typeface="新細明體"/>
+      <a:font script="Arab" typeface="Arial"/>
+      <a:font script="Hebr" typeface="Arial"/>
+      <a:font script="Thai" typeface="Tahoma"/>
+      <a:font script="Ethi" typeface="Nyala"/>
+      <a:font script="Beng" typeface="Vrinda"/>
+      <a:font script="Gujr" typeface="Shruti"/>
+      <a:font script="Khmr" typeface="DaunPenh"/>
+      <a:font script="Knda" typeface="Tunga"/>
+      <a:font script="Guru" typeface="Raavi"/>
+      <a:font script="Cans" typeface="Euphemia"/>
+      <a:font script="Cher" typeface="Plantagenet Cherokee"/>
+      <a:font script="Yiii" typeface="Microsoft Yi Baiti"/>
+      <a:font script="Tibt" typeface="Microsoft Himalaya"/>
+      <a:font script="Thaa" typeface="MV Boli"/>
+      <a:font script="Deva" typeface="Mangal"/>
+      <a:font script="Telu" typeface="Gautami"/>
+      <a:font script="Taml" typeface="Latha"/>
+      <a:font script="Syrc" typeface="Estrangelo Edessa"/>
+      <a:font script="Orya" typeface="Kalinga"/>
+      <a:font script="Mlym" typeface="Kartika"/>
+      <a:font script="Laoo" typeface="DokChampa"/>
+      <a:font script="Sinh" typeface="Iskoola Pota"/>
+      <a:font script="Mong" typeface="Mongolian Baiti"/>
+      <a:font script="Viet" typeface="Arial"/>
+      <a:font script="Uigh" typeface="Microsoft Uighur"/>
+      <a:font script="Geor" typeface="Sylfaen"/>
+    </a:minorFont>
+  </a:fontScheme>
+  <a:fmtScheme name="Office">
+    <a:fillStyleLst>
+      <a:solidFill>
+        <a:schemeClr val="phClr"/>
+      </a:solidFill>
+      <a:gradFill rotWithShape="1">
+        <a:gsLst>
+          <a:gs pos="0">
+            <a:schemeClr val="phClr">
+              <a:tint val="50000"/>
+              <a:satMod val="300000"/>
+            </a:schemeClr>
+          </a:gs>
+          <a:gs pos="35000">
+            <a:schemeClr val="phClr">
+              <a:tint val="37000"/>
+              <a:satMod val="300000"/>
+            </a:schemeClr>
+          </a:gs>
+          <a:gs pos="100000">
+            <a:schemeClr val="phClr">
+              <a:tint val="15000"/>
+              <a:satMod val="350000"/>
+            </a:schemeClr>
+          </a:gs>
+        </a:gsLst>
+        <a:lin ang="16200000" scaled="1"/>
+      </a:gradFill>
+      <a:gradFill rotWithShape="1">
+        <a:gsLst>
+          <a:gs pos="0">
+            <a:schemeClr val="phClr">
+              <a:shade val="51000"/>
+              <a:satMod val="130000"/>
+            </a:schemeClr>
+          </a:gs>
+          <a:gs pos="80000">
+            <a:schemeClr val="phClr">
+              <a:shade val="93000"/>
+              <a:satMod val="130000"/>
+            </a:schemeClr>
+          </a:gs>
+          <a:gs pos="100000">
+            <a:schemeClr val="phClr">
+              <a:shade val="94000"/>
+              <a:satMod val="135000"/>
+            </a:schemeClr>
+          </a:gs>
+        </a:gsLst>
+        <a:lin ang="16200000" scaled="0"/>
+      </a:gradFill>
+    </a:fillStyleLst>
+    <a:lnStyleLst>
+      <a:ln w="9525" cap="flat" cmpd="sng" algn="ctr">
+        <a:solidFill>
+          <a:schemeClr val="phClr">
+            <a:shade val="95000"/>
+            <a:satMod val="105000"/>
+          </a:schemeClr>
+        </a:solidFill>
+        <a:prstDash val="solid"/>
+      </a:ln>
+      <a:ln w="25400" cap="flat" cmpd="sng" algn="ctr">
+        <a:solidFill>
+          <a:schemeClr val="phClr"/>
+        </a:solidFill>
+        <a:prstDash val="solid"/>
+      </a:ln>
+      <a:ln w="38100" cap="flat" cmpd="sng" algn="ctr">
+        <a:solidFill>
+          <a:schemeClr val="phClr"/>
+        </a:solidFill>
+        <a:prstDash val="solid"/>
+      </a:ln>
+    </a:lnStyleLst>
+    <a:effectStyleLst>
+      <a:effectStyle>
+        <a:effectLst>
+          <a:outerShdw blurRad="40000" dist="20000" dir="5400000" rotWithShape="0">
+            <a:srgbClr val="000000">
+              <a:alpha val="38000"/>
+            </a:srgbClr>
+          </a:outerShdw>
+        </a:effectLst>
+      </a:effectStyle>
+      <a:effectStyle>
+        <a:effectLst>
+          <a:outerShdw blurRad="40000" dist="23000" dir="5400000" rotWithShape="0">
+            <a:srgbClr val="000000">
+              <a:alpha val="35000"/>
+            </a:srgbClr>
+          </a:outerShdw>
+        </a:effectLst>
+      </a:effectStyle>
+      <a:effectStyle>
+        <a:effectLst>
+          <a:outerShdw blurRad="40000" dist="23000" dir="5400000" rotWithShape="0">
+            <a:srgbClr val="000000">
+              <a:alpha val="35000"/>
+            </a:srgbClr>
+          </a:outerShdw>
+        </a:effectLst>
+        <a:scene3d>
+          <a:camera prst="orthographicFront">
+            <a:rot lat="0" lon="0" rev="0"/>
+          </a:camera>
+          <a:lightRig rig="threePt" dir="t">
+            <a:rot lat="0" lon="0" rev="1200000"/>
+          </a:lightRig>
+        </a:scene3d>
+        <a:sp3d>
+          <a:bevelT w="63500" h="25400"/>
+        </a:sp3d>
+      </a:effectStyle>
+    </a:effectStyleLst>
+    <a:bgFillStyleLst>
+      <a:solidFill>
+        <a:schemeClr val="phClr"/>
+      </a:solidFill>
+      <a:gradFill rotWithShape="1">
+        <a:gsLst>
+          <a:gs pos="0">
+            <a:schemeClr val="phClr">
+              <a:tint val="40000"/>
+              <a:satMod val="350000"/>
+            </a:schemeClr>
+          </a:gs>
+          <a:gs pos="40000">
+            <a:schemeClr val="phClr">
+              <a:tint val="45000"/>
+              <a:shade val="99000"/>
+              <a:satMod val="350000"/>
+            </a:schemeClr>
+          </a:gs>
+          <a:gs pos="100000">
+            <a:schemeClr val="phClr">
+              <a:shade val="20000"/>
+              <a:satMod val="255000"/>
+            </a:schemeClr>
+          </a:gs>
+        </a:gsLst>
+        <a:path path="circle">
+          <a:fillToRect l="50000" t="-80000" r="50000" b="180000"/>
+        </a:path>
+      </a:gradFill>
+      <a:gradFill rotWithShape="1">
+        <a:gsLst>
+          <a:gs pos="0">
+            <a:schemeClr val="phClr">
+              <a:tint val="80000"/>
+              <a:satMod val="300000"/>
+            </a:schemeClr>
+          </a:gs>
+          <a:gs pos="100000">
+            <a:schemeClr val="phClr">
+              <a:shade val="30000"/>
+              <a:satMod val="200000"/>
+            </a:schemeClr>
+          </a:gs>
+        </a:gsLst>
+        <a:path path="circle">
+          <a:fillToRect l="50000" t="50000" r="50000" b="50000"/>
+        </a:path>
+      </a:gradFill>
+    </a:bgFillStyleLst>
+  </a:fmtScheme>
+</a:themeOverride>
 </file>
</xml_diff>

<commit_message>
feat: Add ppt visualisation for Q3A in Custom Set
</commit_message>
<xml_diff>
--- a/slideshow/movies-db-slideshow.pptx
+++ b/slideshow/movies-db-slideshow.pptx
@@ -10,6 +10,7 @@
     <p:sldId id="258" r:id="rId4"/>
     <p:sldId id="259" r:id="rId5"/>
     <p:sldId id="260" r:id="rId6"/>
+    <p:sldId id="261" r:id="rId7"/>
   </p:sldIdLst>
   <p:sldSz cx="9144000" cy="6858000" type="screen4x3"/>
   <p:notesSz cx="6858000" cy="9144000"/>
@@ -242,11 +243,11 @@
           <c:showBubbleSize val="0"/>
         </c:dLbls>
         <c:gapWidth val="75"/>
-        <c:axId val="70960256"/>
-        <c:axId val="70962176"/>
+        <c:axId val="37452032"/>
+        <c:axId val="38293888"/>
       </c:barChart>
       <c:catAx>
-        <c:axId val="70960256"/>
+        <c:axId val="37452032"/>
         <c:scaling>
           <c:orientation val="minMax"/>
         </c:scaling>
@@ -275,7 +276,7 @@
         <c:majorTickMark val="none"/>
         <c:minorTickMark val="none"/>
         <c:tickLblPos val="nextTo"/>
-        <c:crossAx val="70962176"/>
+        <c:crossAx val="38293888"/>
         <c:crosses val="autoZero"/>
         <c:auto val="1"/>
         <c:lblAlgn val="ctr"/>
@@ -283,7 +284,7 @@
         <c:noMultiLvlLbl val="0"/>
       </c:catAx>
       <c:valAx>
-        <c:axId val="70962176"/>
+        <c:axId val="38293888"/>
         <c:scaling>
           <c:orientation val="minMax"/>
         </c:scaling>
@@ -312,7 +313,7 @@
         <c:majorTickMark val="none"/>
         <c:minorTickMark val="none"/>
         <c:tickLblPos val="nextTo"/>
-        <c:crossAx val="70960256"/>
+        <c:crossAx val="37452032"/>
         <c:crosses val="autoZero"/>
         <c:crossBetween val="between"/>
       </c:valAx>
@@ -475,11 +476,11 @@
           <c:showBubbleSize val="0"/>
         </c:dLbls>
         <c:gapWidth val="75"/>
-        <c:axId val="78449664"/>
-        <c:axId val="78468224"/>
+        <c:axId val="88547328"/>
+        <c:axId val="88549248"/>
       </c:barChart>
       <c:catAx>
-        <c:axId val="78449664"/>
+        <c:axId val="88547328"/>
         <c:scaling>
           <c:orientation val="maxMin"/>
         </c:scaling>
@@ -511,7 +512,7 @@
         <c:majorTickMark val="none"/>
         <c:minorTickMark val="none"/>
         <c:tickLblPos val="nextTo"/>
-        <c:crossAx val="78468224"/>
+        <c:crossAx val="88549248"/>
         <c:crosses val="autoZero"/>
         <c:auto val="1"/>
         <c:lblAlgn val="ctr"/>
@@ -519,7 +520,7 @@
         <c:noMultiLvlLbl val="0"/>
       </c:catAx>
       <c:valAx>
-        <c:axId val="78468224"/>
+        <c:axId val="88549248"/>
         <c:scaling>
           <c:orientation val="minMax"/>
         </c:scaling>
@@ -553,7 +554,7 @@
         <c:majorTickMark val="none"/>
         <c:minorTickMark val="none"/>
         <c:tickLblPos val="nextTo"/>
-        <c:crossAx val="78449664"/>
+        <c:crossAx val="88547328"/>
         <c:crosses val="autoZero"/>
         <c:crossBetween val="between"/>
       </c:valAx>
@@ -997,11 +998,11 @@
         </c:dLbls>
         <c:gapWidth val="55"/>
         <c:overlap val="100"/>
-        <c:axId val="96172672"/>
-        <c:axId val="96936704"/>
+        <c:axId val="36931840"/>
+        <c:axId val="36934016"/>
       </c:barChart>
       <c:catAx>
-        <c:axId val="96172672"/>
+        <c:axId val="36931840"/>
         <c:scaling>
           <c:orientation val="minMax"/>
         </c:scaling>
@@ -1029,7 +1030,7 @@
         <c:majorTickMark val="none"/>
         <c:minorTickMark val="none"/>
         <c:tickLblPos val="nextTo"/>
-        <c:crossAx val="96936704"/>
+        <c:crossAx val="36934016"/>
         <c:crosses val="autoZero"/>
         <c:auto val="1"/>
         <c:lblAlgn val="ctr"/>
@@ -1037,7 +1038,7 @@
         <c:noMultiLvlLbl val="0"/>
       </c:catAx>
       <c:valAx>
-        <c:axId val="96936704"/>
+        <c:axId val="36934016"/>
         <c:scaling>
           <c:orientation val="minMax"/>
         </c:scaling>
@@ -1067,7 +1068,7 @@
         <c:majorTickMark val="none"/>
         <c:minorTickMark val="none"/>
         <c:tickLblPos val="nextTo"/>
-        <c:crossAx val="96172672"/>
+        <c:crossAx val="36931840"/>
         <c:crosses val="autoZero"/>
         <c:crossBetween val="between"/>
       </c:valAx>
@@ -1392,11 +1393,11 @@
         </c:dLbls>
         <c:marker val="1"/>
         <c:smooth val="0"/>
-        <c:axId val="96182656"/>
-        <c:axId val="96184576"/>
+        <c:axId val="4881408"/>
+        <c:axId val="4789376"/>
       </c:lineChart>
       <c:catAx>
-        <c:axId val="96182656"/>
+        <c:axId val="4881408"/>
         <c:scaling>
           <c:orientation val="minMax"/>
         </c:scaling>
@@ -1429,7 +1430,7 @@
         <c:majorTickMark val="none"/>
         <c:minorTickMark val="none"/>
         <c:tickLblPos val="nextTo"/>
-        <c:crossAx val="96184576"/>
+        <c:crossAx val="4789376"/>
         <c:crosses val="autoZero"/>
         <c:auto val="1"/>
         <c:lblAlgn val="ctr"/>
@@ -1437,7 +1438,7 @@
         <c:noMultiLvlLbl val="0"/>
       </c:catAx>
       <c:valAx>
-        <c:axId val="96184576"/>
+        <c:axId val="4789376"/>
         <c:scaling>
           <c:orientation val="minMax"/>
         </c:scaling>
@@ -1467,7 +1468,7 @@
         <c:majorTickMark val="none"/>
         <c:minorTickMark val="none"/>
         <c:tickLblPos val="nextTo"/>
-        <c:crossAx val="96182656"/>
+        <c:crossAx val="4881408"/>
         <c:crosses val="autoZero"/>
         <c:crossBetween val="between"/>
       </c:valAx>
@@ -1790,11 +1791,11 @@
           <c:showBubbleSize val="0"/>
         </c:dLbls>
         <c:gapWidth val="0"/>
-        <c:axId val="89633152"/>
-        <c:axId val="89635072"/>
+        <c:axId val="30566272"/>
+        <c:axId val="30572544"/>
       </c:barChart>
       <c:catAx>
-        <c:axId val="89633152"/>
+        <c:axId val="30566272"/>
         <c:scaling>
           <c:orientation val="minMax"/>
         </c:scaling>
@@ -1822,7 +1823,7 @@
         <c:majorTickMark val="none"/>
         <c:minorTickMark val="none"/>
         <c:tickLblPos val="nextTo"/>
-        <c:crossAx val="89635072"/>
+        <c:crossAx val="30572544"/>
         <c:crosses val="autoZero"/>
         <c:auto val="1"/>
         <c:lblAlgn val="ctr"/>
@@ -1830,7 +1831,7 @@
         <c:noMultiLvlLbl val="0"/>
       </c:catAx>
       <c:valAx>
-        <c:axId val="89635072"/>
+        <c:axId val="30572544"/>
         <c:scaling>
           <c:orientation val="minMax"/>
         </c:scaling>
@@ -1864,7 +1865,7 @@
         <c:majorTickMark val="out"/>
         <c:minorTickMark val="none"/>
         <c:tickLblPos val="nextTo"/>
-        <c:crossAx val="89633152"/>
+        <c:crossAx val="30566272"/>
         <c:crosses val="autoZero"/>
         <c:crossBetween val="between"/>
       </c:valAx>
@@ -1891,6 +1892,211 @@
       </c14:pivotOptions>
     </c:ext>
   </c:extLst>
+</c:chartSpace>
+</file>
+
+<file path=ppt/charts/chart6.xml><?xml version="1.0" encoding="utf-8"?>
+<c:chartSpace xmlns:c="http://schemas.openxmlformats.org/drawingml/2006/chart" xmlns:a="http://schemas.openxmlformats.org/drawingml/2006/main" xmlns:r="http://schemas.openxmlformats.org/officeDocument/2006/relationships">
+  <c:date1904 val="0"/>
+  <c:lang val="en-ZA"/>
+  <c:roundedCorners val="0"/>
+  <mc:AlternateContent xmlns:mc="http://schemas.openxmlformats.org/markup-compatibility/2006">
+    <mc:Choice xmlns:c14="http://schemas.microsoft.com/office/drawing/2007/8/2/chart" Requires="c14">
+      <c14:style val="110"/>
+    </mc:Choice>
+    <mc:Fallback>
+      <c:style val="10"/>
+    </mc:Fallback>
+  </mc:AlternateContent>
+  <c:clrMapOvr bg1="lt1" tx1="dk1" bg2="lt2" tx2="dk2" accent1="accent1" accent2="accent2" accent3="accent3" accent4="accent4" accent5="accent5" accent6="accent6" hlink="hlink" folHlink="folHlink"/>
+  <c:chart>
+    <c:title>
+      <c:tx>
+        <c:rich>
+          <a:bodyPr/>
+          <a:lstStyle/>
+          <a:p>
+            <a:pPr>
+              <a:defRPr sz="3200"/>
+            </a:pPr>
+            <a:r>
+              <a:rPr lang="en-US" sz="3200"/>
+              <a:t>Movies</a:t>
+            </a:r>
+            <a:r>
+              <a:rPr lang="en-US" sz="3200" baseline="0"/>
+              <a:t> by Categories </a:t>
+            </a:r>
+            <a:endParaRPr lang="en-US" sz="3200"/>
+          </a:p>
+        </c:rich>
+      </c:tx>
+      <c:layout/>
+      <c:overlay val="0"/>
+    </c:title>
+    <c:autoTitleDeleted val="0"/>
+    <c:plotArea>
+      <c:layout/>
+      <c:pieChart>
+        <c:varyColors val="1"/>
+        <c:ser>
+          <c:idx val="0"/>
+          <c:order val="0"/>
+          <c:tx>
+            <c:strRef>
+              <c:f>'categories-count'!$B$1</c:f>
+              <c:strCache>
+                <c:ptCount val="1"/>
+                <c:pt idx="0">
+                  <c:v>movie_count</c:v>
+                </c:pt>
+              </c:strCache>
+            </c:strRef>
+          </c:tx>
+          <c:dLbls>
+            <c:dLblPos val="inEnd"/>
+            <c:showLegendKey val="0"/>
+            <c:showVal val="0"/>
+            <c:showCatName val="1"/>
+            <c:showSerName val="0"/>
+            <c:showPercent val="1"/>
+            <c:showBubbleSize val="0"/>
+            <c:showLeaderLines val="1"/>
+          </c:dLbls>
+          <c:cat>
+            <c:strRef>
+              <c:f>'categories-count'!$A$2:$A$17</c:f>
+              <c:strCache>
+                <c:ptCount val="16"/>
+                <c:pt idx="0">
+                  <c:v>Sports</c:v>
+                </c:pt>
+                <c:pt idx="1">
+                  <c:v>Foreign</c:v>
+                </c:pt>
+                <c:pt idx="2">
+                  <c:v>Family</c:v>
+                </c:pt>
+                <c:pt idx="3">
+                  <c:v>Documentary</c:v>
+                </c:pt>
+                <c:pt idx="4">
+                  <c:v>Animation</c:v>
+                </c:pt>
+                <c:pt idx="5">
+                  <c:v>Action</c:v>
+                </c:pt>
+                <c:pt idx="6">
+                  <c:v>New</c:v>
+                </c:pt>
+                <c:pt idx="7">
+                  <c:v>Drama</c:v>
+                </c:pt>
+                <c:pt idx="8">
+                  <c:v>Sci-Fi</c:v>
+                </c:pt>
+                <c:pt idx="9">
+                  <c:v>Games</c:v>
+                </c:pt>
+                <c:pt idx="10">
+                  <c:v>Children</c:v>
+                </c:pt>
+                <c:pt idx="11">
+                  <c:v>Comedy</c:v>
+                </c:pt>
+                <c:pt idx="12">
+                  <c:v>Travel</c:v>
+                </c:pt>
+                <c:pt idx="13">
+                  <c:v>Classics</c:v>
+                </c:pt>
+                <c:pt idx="14">
+                  <c:v>Horror</c:v>
+                </c:pt>
+                <c:pt idx="15">
+                  <c:v>Music</c:v>
+                </c:pt>
+              </c:strCache>
+            </c:strRef>
+          </c:cat>
+          <c:val>
+            <c:numRef>
+              <c:f>'categories-count'!$B$2:$B$17</c:f>
+              <c:numCache>
+                <c:formatCode>General</c:formatCode>
+                <c:ptCount val="16"/>
+                <c:pt idx="0">
+                  <c:v>74</c:v>
+                </c:pt>
+                <c:pt idx="1">
+                  <c:v>73</c:v>
+                </c:pt>
+                <c:pt idx="2">
+                  <c:v>69</c:v>
+                </c:pt>
+                <c:pt idx="3">
+                  <c:v>68</c:v>
+                </c:pt>
+                <c:pt idx="4">
+                  <c:v>66</c:v>
+                </c:pt>
+                <c:pt idx="5">
+                  <c:v>64</c:v>
+                </c:pt>
+                <c:pt idx="6">
+                  <c:v>63</c:v>
+                </c:pt>
+                <c:pt idx="7">
+                  <c:v>62</c:v>
+                </c:pt>
+                <c:pt idx="8">
+                  <c:v>61</c:v>
+                </c:pt>
+                <c:pt idx="9">
+                  <c:v>61</c:v>
+                </c:pt>
+                <c:pt idx="10">
+                  <c:v>60</c:v>
+                </c:pt>
+                <c:pt idx="11">
+                  <c:v>58</c:v>
+                </c:pt>
+                <c:pt idx="12">
+                  <c:v>57</c:v>
+                </c:pt>
+                <c:pt idx="13">
+                  <c:v>57</c:v>
+                </c:pt>
+                <c:pt idx="14">
+                  <c:v>56</c:v>
+                </c:pt>
+                <c:pt idx="15">
+                  <c:v>51</c:v>
+                </c:pt>
+              </c:numCache>
+            </c:numRef>
+          </c:val>
+        </c:ser>
+        <c:dLbls>
+          <c:dLblPos val="inEnd"/>
+          <c:showLegendKey val="0"/>
+          <c:showVal val="0"/>
+          <c:showCatName val="1"/>
+          <c:showSerName val="0"/>
+          <c:showPercent val="1"/>
+          <c:showBubbleSize val="0"/>
+          <c:showLeaderLines val="1"/>
+        </c:dLbls>
+        <c:firstSliceAng val="0"/>
+      </c:pieChart>
+    </c:plotArea>
+    <c:plotVisOnly val="1"/>
+    <c:dispBlanksAs val="gap"/>
+    <c:showDLblsOverMax val="0"/>
+  </c:chart>
+  <c:externalData r:id="rId2">
+    <c:autoUpdate val="0"/>
+  </c:externalData>
 </c:chartSpace>
 </file>
 
@@ -6192,15 +6398,7 @@
           <a:p>
             <a:r>
               <a:rPr lang="en-ZA" dirty="0" smtClean="0"/>
-              <a:t>The ‘</a:t>
-            </a:r>
-            <a:r>
-              <a:rPr lang="en-ZA" dirty="0" smtClean="0"/>
-              <a:t>Classic’ </a:t>
-            </a:r>
-            <a:r>
-              <a:rPr lang="en-ZA" dirty="0" smtClean="0"/>
-              <a:t>category is the only category with a near symmetrical quartile distribution.</a:t>
+              <a:t>The ‘Classic’ category is the only category with a near symmetrical quartile distribution.</a:t>
             </a:r>
             <a:endParaRPr lang="en-ZA" dirty="0"/>
           </a:p>
@@ -6216,14 +6414,14 @@
             <p:ph sz="half" idx="1"/>
             <p:extLst>
               <p:ext uri="{D42A27DB-BD31-4B8C-83A1-F6EECF244321}">
-                <p14:modId xmlns:p14="http://schemas.microsoft.com/office/powerpoint/2010/main" val="521902775"/>
+                <p14:modId xmlns:p14="http://schemas.microsoft.com/office/powerpoint/2010/main" val="3255551562"/>
               </p:ext>
             </p:extLst>
           </p:nvPr>
         </p:nvGraphicFramePr>
         <p:xfrm>
-          <a:off x="0" y="332656"/>
-          <a:ext cx="5868144" cy="6525344"/>
+          <a:off x="0" y="404664"/>
+          <a:ext cx="5868144" cy="6453336"/>
         </p:xfrm>
         <a:graphic>
           <a:graphicData uri="http://schemas.openxmlformats.org/drawingml/2006/chart">
@@ -6495,6 +6693,136 @@
     <p:extLst>
       <p:ext uri="{BB962C8B-B14F-4D97-AF65-F5344CB8AC3E}">
         <p14:creationId xmlns:p14="http://schemas.microsoft.com/office/powerpoint/2010/main" val="416378147"/>
+      </p:ext>
+    </p:extLst>
+  </p:cSld>
+  <p:clrMapOvr>
+    <a:masterClrMapping/>
+  </p:clrMapOvr>
+  <p:timing>
+    <p:tnLst>
+      <p:par>
+        <p:cTn id="1" dur="indefinite" restart="never" nodeType="tmRoot"/>
+      </p:par>
+    </p:tnLst>
+  </p:timing>
+</p:sld>
+</file>
+
+<file path=ppt/slides/slide6.xml><?xml version="1.0" encoding="utf-8"?>
+<p:sld xmlns:a="http://schemas.openxmlformats.org/drawingml/2006/main" xmlns:r="http://schemas.openxmlformats.org/officeDocument/2006/relationships" xmlns:p="http://schemas.openxmlformats.org/presentationml/2006/main">
+  <p:cSld>
+    <p:spTree>
+      <p:nvGrpSpPr>
+        <p:cNvPr id="1" name=""/>
+        <p:cNvGrpSpPr/>
+        <p:nvPr/>
+      </p:nvGrpSpPr>
+      <p:grpSpPr>
+        <a:xfrm>
+          <a:off x="0" y="0"/>
+          <a:ext cx="0" cy="0"/>
+          <a:chOff x="0" y="0"/>
+          <a:chExt cx="0" cy="0"/>
+        </a:xfrm>
+      </p:grpSpPr>
+      <p:sp>
+        <p:nvSpPr>
+          <p:cNvPr id="2" name="Title 1"/>
+          <p:cNvSpPr>
+            <a:spLocks noGrp="1"/>
+          </p:cNvSpPr>
+          <p:nvPr>
+            <p:ph type="title"/>
+          </p:nvPr>
+        </p:nvSpPr>
+        <p:spPr>
+          <a:xfrm>
+            <a:off x="5868144" y="764704"/>
+            <a:ext cx="2868632" cy="2808312"/>
+          </a:xfrm>
+        </p:spPr>
+        <p:txBody>
+          <a:bodyPr>
+            <a:noAutofit/>
+          </a:bodyPr>
+          <a:lstStyle/>
+          <a:p>
+            <a:pPr algn="ctr"/>
+            <a:r>
+              <a:rPr lang="en-ZA" sz="2400" dirty="0" smtClean="0"/>
+              <a:t>What is the overall percentage of movies per category? Is there any category that dominates the database?</a:t>
+            </a:r>
+            <a:endParaRPr lang="en-ZA" sz="2400" dirty="0"/>
+          </a:p>
+        </p:txBody>
+      </p:sp>
+      <p:sp>
+        <p:nvSpPr>
+          <p:cNvPr id="5" name="Text Placeholder 4"/>
+          <p:cNvSpPr>
+            <a:spLocks noGrp="1"/>
+          </p:cNvSpPr>
+          <p:nvPr>
+            <p:ph type="body" idx="2"/>
+          </p:nvPr>
+        </p:nvSpPr>
+        <p:spPr>
+          <a:xfrm>
+            <a:off x="5868144" y="3789041"/>
+            <a:ext cx="2868632" cy="2839406"/>
+          </a:xfrm>
+        </p:spPr>
+        <p:txBody>
+          <a:bodyPr/>
+          <a:lstStyle/>
+          <a:p>
+            <a:r>
+              <a:rPr lang="en-ZA" dirty="0" smtClean="0"/>
+              <a:t>As is evident from the accompanying pie chart, each category contains a similar amount of movies.</a:t>
+            </a:r>
+          </a:p>
+          <a:p>
+            <a:endParaRPr lang="en-ZA" dirty="0"/>
+          </a:p>
+          <a:p>
+            <a:r>
+              <a:rPr lang="en-ZA" dirty="0" smtClean="0"/>
+              <a:t>There is no dominant category within the database.</a:t>
+            </a:r>
+            <a:endParaRPr lang="en-ZA" dirty="0"/>
+          </a:p>
+        </p:txBody>
+      </p:sp>
+      <p:graphicFrame>
+        <p:nvGraphicFramePr>
+          <p:cNvPr id="6" name="Content Placeholder 5"/>
+          <p:cNvGraphicFramePr>
+            <a:graphicFrameLocks noGrp="1"/>
+          </p:cNvGraphicFramePr>
+          <p:nvPr>
+            <p:ph sz="half" idx="1"/>
+            <p:extLst>
+              <p:ext uri="{D42A27DB-BD31-4B8C-83A1-F6EECF244321}">
+                <p14:modId xmlns:p14="http://schemas.microsoft.com/office/powerpoint/2010/main" val="3294072309"/>
+              </p:ext>
+            </p:extLst>
+          </p:nvPr>
+        </p:nvGraphicFramePr>
+        <p:xfrm>
+          <a:off x="0" y="476672"/>
+          <a:ext cx="5868144" cy="6381328"/>
+        </p:xfrm>
+        <a:graphic>
+          <a:graphicData uri="http://schemas.openxmlformats.org/drawingml/2006/chart">
+            <c:chart xmlns:c="http://schemas.openxmlformats.org/drawingml/2006/chart" xmlns:r="http://schemas.openxmlformats.org/officeDocument/2006/relationships" r:id="rId2"/>
+          </a:graphicData>
+        </a:graphic>
+      </p:graphicFrame>
+    </p:spTree>
+    <p:extLst>
+      <p:ext uri="{BB962C8B-B14F-4D97-AF65-F5344CB8AC3E}">
+        <p14:creationId xmlns:p14="http://schemas.microsoft.com/office/powerpoint/2010/main" val="1588561530"/>
       </p:ext>
     </p:extLst>
   </p:cSld>
@@ -8196,4 +8524,285 @@
     </a:bgFillStyleLst>
   </a:fmtScheme>
 </a:themeOverride>
+</file>
+
+<file path=ppt/theme/themeOverride6.xml><?xml version="1.0" encoding="utf-8"?>
+<a:themeOverride xmlns:a="http://schemas.openxmlformats.org/drawingml/2006/main">
+  <a:clrScheme name="Office">
+    <a:dk1>
+      <a:sysClr val="windowText" lastClr="000000"/>
+    </a:dk1>
+    <a:lt1>
+      <a:sysClr val="window" lastClr="FFFFFF"/>
+    </a:lt1>
+    <a:dk2>
+      <a:srgbClr val="1F497D"/>
+    </a:dk2>
+    <a:lt2>
+      <a:srgbClr val="EEECE1"/>
+    </a:lt2>
+    <a:accent1>
+      <a:srgbClr val="4F81BD"/>
+    </a:accent1>
+    <a:accent2>
+      <a:srgbClr val="C0504D"/>
+    </a:accent2>
+    <a:accent3>
+      <a:srgbClr val="9BBB59"/>
+    </a:accent3>
+    <a:accent4>
+      <a:srgbClr val="8064A2"/>
+    </a:accent4>
+    <a:accent5>
+      <a:srgbClr val="4BACC6"/>
+    </a:accent5>
+    <a:accent6>
+      <a:srgbClr val="F79646"/>
+    </a:accent6>
+    <a:hlink>
+      <a:srgbClr val="0000FF"/>
+    </a:hlink>
+    <a:folHlink>
+      <a:srgbClr val="800080"/>
+    </a:folHlink>
+  </a:clrScheme>
+  <a:fontScheme name="Office">
+    <a:majorFont>
+      <a:latin typeface="Cambria"/>
+      <a:ea typeface=""/>
+      <a:cs typeface=""/>
+      <a:font script="Jpan" typeface="ＭＳ Ｐゴシック"/>
+      <a:font script="Hang" typeface="맑은 고딕"/>
+      <a:font script="Hans" typeface="宋体"/>
+      <a:font script="Hant" typeface="新細明體"/>
+      <a:font script="Arab" typeface="Times New Roman"/>
+      <a:font script="Hebr" typeface="Times New Roman"/>
+      <a:font script="Thai" typeface="Tahoma"/>
+      <a:font script="Ethi" typeface="Nyala"/>
+      <a:font script="Beng" typeface="Vrinda"/>
+      <a:font script="Gujr" typeface="Shruti"/>
+      <a:font script="Khmr" typeface="MoolBoran"/>
+      <a:font script="Knda" typeface="Tunga"/>
+      <a:font script="Guru" typeface="Raavi"/>
+      <a:font script="Cans" typeface="Euphemia"/>
+      <a:font script="Cher" typeface="Plantagenet Cherokee"/>
+      <a:font script="Yiii" typeface="Microsoft Yi Baiti"/>
+      <a:font script="Tibt" typeface="Microsoft Himalaya"/>
+      <a:font script="Thaa" typeface="MV Boli"/>
+      <a:font script="Deva" typeface="Mangal"/>
+      <a:font script="Telu" typeface="Gautami"/>
+      <a:font script="Taml" typeface="Latha"/>
+      <a:font script="Syrc" typeface="Estrangelo Edessa"/>
+      <a:font script="Orya" typeface="Kalinga"/>
+      <a:font script="Mlym" typeface="Kartika"/>
+      <a:font script="Laoo" typeface="DokChampa"/>
+      <a:font script="Sinh" typeface="Iskoola Pota"/>
+      <a:font script="Mong" typeface="Mongolian Baiti"/>
+      <a:font script="Viet" typeface="Times New Roman"/>
+      <a:font script="Uigh" typeface="Microsoft Uighur"/>
+      <a:font script="Geor" typeface="Sylfaen"/>
+    </a:majorFont>
+    <a:minorFont>
+      <a:latin typeface="Calibri"/>
+      <a:ea typeface=""/>
+      <a:cs typeface=""/>
+      <a:font script="Jpan" typeface="ＭＳ Ｐゴシック"/>
+      <a:font script="Hang" typeface="맑은 고딕"/>
+      <a:font script="Hans" typeface="宋体"/>
+      <a:font script="Hant" typeface="新細明體"/>
+      <a:font script="Arab" typeface="Arial"/>
+      <a:font script="Hebr" typeface="Arial"/>
+      <a:font script="Thai" typeface="Tahoma"/>
+      <a:font script="Ethi" typeface="Nyala"/>
+      <a:font script="Beng" typeface="Vrinda"/>
+      <a:font script="Gujr" typeface="Shruti"/>
+      <a:font script="Khmr" typeface="DaunPenh"/>
+      <a:font script="Knda" typeface="Tunga"/>
+      <a:font script="Guru" typeface="Raavi"/>
+      <a:font script="Cans" typeface="Euphemia"/>
+      <a:font script="Cher" typeface="Plantagenet Cherokee"/>
+      <a:font script="Yiii" typeface="Microsoft Yi Baiti"/>
+      <a:font script="Tibt" typeface="Microsoft Himalaya"/>
+      <a:font script="Thaa" typeface="MV Boli"/>
+      <a:font script="Deva" typeface="Mangal"/>
+      <a:font script="Telu" typeface="Gautami"/>
+      <a:font script="Taml" typeface="Latha"/>
+      <a:font script="Syrc" typeface="Estrangelo Edessa"/>
+      <a:font script="Orya" typeface="Kalinga"/>
+      <a:font script="Mlym" typeface="Kartika"/>
+      <a:font script="Laoo" typeface="DokChampa"/>
+      <a:font script="Sinh" typeface="Iskoola Pota"/>
+      <a:font script="Mong" typeface="Mongolian Baiti"/>
+      <a:font script="Viet" typeface="Arial"/>
+      <a:font script="Uigh" typeface="Microsoft Uighur"/>
+      <a:font script="Geor" typeface="Sylfaen"/>
+    </a:minorFont>
+  </a:fontScheme>
+  <a:fmtScheme name="Office">
+    <a:fillStyleLst>
+      <a:solidFill>
+        <a:schemeClr val="phClr"/>
+      </a:solidFill>
+      <a:gradFill rotWithShape="1">
+        <a:gsLst>
+          <a:gs pos="0">
+            <a:schemeClr val="phClr">
+              <a:tint val="50000"/>
+              <a:satMod val="300000"/>
+            </a:schemeClr>
+          </a:gs>
+          <a:gs pos="35000">
+            <a:schemeClr val="phClr">
+              <a:tint val="37000"/>
+              <a:satMod val="300000"/>
+            </a:schemeClr>
+          </a:gs>
+          <a:gs pos="100000">
+            <a:schemeClr val="phClr">
+              <a:tint val="15000"/>
+              <a:satMod val="350000"/>
+            </a:schemeClr>
+          </a:gs>
+        </a:gsLst>
+        <a:lin ang="16200000" scaled="1"/>
+      </a:gradFill>
+      <a:gradFill rotWithShape="1">
+        <a:gsLst>
+          <a:gs pos="0">
+            <a:schemeClr val="phClr">
+              <a:shade val="51000"/>
+              <a:satMod val="130000"/>
+            </a:schemeClr>
+          </a:gs>
+          <a:gs pos="80000">
+            <a:schemeClr val="phClr">
+              <a:shade val="93000"/>
+              <a:satMod val="130000"/>
+            </a:schemeClr>
+          </a:gs>
+          <a:gs pos="100000">
+            <a:schemeClr val="phClr">
+              <a:shade val="94000"/>
+              <a:satMod val="135000"/>
+            </a:schemeClr>
+          </a:gs>
+        </a:gsLst>
+        <a:lin ang="16200000" scaled="0"/>
+      </a:gradFill>
+    </a:fillStyleLst>
+    <a:lnStyleLst>
+      <a:ln w="9525" cap="flat" cmpd="sng" algn="ctr">
+        <a:solidFill>
+          <a:schemeClr val="phClr">
+            <a:shade val="95000"/>
+            <a:satMod val="105000"/>
+          </a:schemeClr>
+        </a:solidFill>
+        <a:prstDash val="solid"/>
+      </a:ln>
+      <a:ln w="25400" cap="flat" cmpd="sng" algn="ctr">
+        <a:solidFill>
+          <a:schemeClr val="phClr"/>
+        </a:solidFill>
+        <a:prstDash val="solid"/>
+      </a:ln>
+      <a:ln w="38100" cap="flat" cmpd="sng" algn="ctr">
+        <a:solidFill>
+          <a:schemeClr val="phClr"/>
+        </a:solidFill>
+        <a:prstDash val="solid"/>
+      </a:ln>
+    </a:lnStyleLst>
+    <a:effectStyleLst>
+      <a:effectStyle>
+        <a:effectLst>
+          <a:outerShdw blurRad="40000" dist="20000" dir="5400000" rotWithShape="0">
+            <a:srgbClr val="000000">
+              <a:alpha val="38000"/>
+            </a:srgbClr>
+          </a:outerShdw>
+        </a:effectLst>
+      </a:effectStyle>
+      <a:effectStyle>
+        <a:effectLst>
+          <a:outerShdw blurRad="40000" dist="23000" dir="5400000" rotWithShape="0">
+            <a:srgbClr val="000000">
+              <a:alpha val="35000"/>
+            </a:srgbClr>
+          </a:outerShdw>
+        </a:effectLst>
+      </a:effectStyle>
+      <a:effectStyle>
+        <a:effectLst>
+          <a:outerShdw blurRad="40000" dist="23000" dir="5400000" rotWithShape="0">
+            <a:srgbClr val="000000">
+              <a:alpha val="35000"/>
+            </a:srgbClr>
+          </a:outerShdw>
+        </a:effectLst>
+        <a:scene3d>
+          <a:camera prst="orthographicFront">
+            <a:rot lat="0" lon="0" rev="0"/>
+          </a:camera>
+          <a:lightRig rig="threePt" dir="t">
+            <a:rot lat="0" lon="0" rev="1200000"/>
+          </a:lightRig>
+        </a:scene3d>
+        <a:sp3d>
+          <a:bevelT w="63500" h="25400"/>
+        </a:sp3d>
+      </a:effectStyle>
+    </a:effectStyleLst>
+    <a:bgFillStyleLst>
+      <a:solidFill>
+        <a:schemeClr val="phClr"/>
+      </a:solidFill>
+      <a:gradFill rotWithShape="1">
+        <a:gsLst>
+          <a:gs pos="0">
+            <a:schemeClr val="phClr">
+              <a:tint val="40000"/>
+              <a:satMod val="350000"/>
+            </a:schemeClr>
+          </a:gs>
+          <a:gs pos="40000">
+            <a:schemeClr val="phClr">
+              <a:tint val="45000"/>
+              <a:shade val="99000"/>
+              <a:satMod val="350000"/>
+            </a:schemeClr>
+          </a:gs>
+          <a:gs pos="100000">
+            <a:schemeClr val="phClr">
+              <a:shade val="20000"/>
+              <a:satMod val="255000"/>
+            </a:schemeClr>
+          </a:gs>
+        </a:gsLst>
+        <a:path path="circle">
+          <a:fillToRect l="50000" t="-80000" r="50000" b="180000"/>
+        </a:path>
+      </a:gradFill>
+      <a:gradFill rotWithShape="1">
+        <a:gsLst>
+          <a:gs pos="0">
+            <a:schemeClr val="phClr">
+              <a:tint val="80000"/>
+              <a:satMod val="300000"/>
+            </a:schemeClr>
+          </a:gs>
+          <a:gs pos="100000">
+            <a:schemeClr val="phClr">
+              <a:shade val="30000"/>
+              <a:satMod val="200000"/>
+            </a:schemeClr>
+          </a:gs>
+        </a:gsLst>
+        <a:path path="circle">
+          <a:fillToRect l="50000" t="50000" r="50000" b="50000"/>
+        </a:path>
+      </a:gradFill>
+    </a:bgFillStyleLst>
+  </a:fmtScheme>
+</a:themeOverride>
 </file>
</xml_diff>

<commit_message>
feat: Add ppt visualisation for Q4A in Custom Set
</commit_message>
<xml_diff>
--- a/slideshow/movies-db-slideshow.pptx
+++ b/slideshow/movies-db-slideshow.pptx
@@ -5,12 +5,14 @@
     <p:sldMasterId id="2147483768" r:id="rId1"/>
   </p:sldMasterIdLst>
   <p:sldIdLst>
-    <p:sldId id="256" r:id="rId2"/>
-    <p:sldId id="257" r:id="rId3"/>
-    <p:sldId id="258" r:id="rId4"/>
-    <p:sldId id="259" r:id="rId5"/>
-    <p:sldId id="260" r:id="rId6"/>
-    <p:sldId id="261" r:id="rId7"/>
+    <p:sldId id="263" r:id="rId2"/>
+    <p:sldId id="256" r:id="rId3"/>
+    <p:sldId id="257" r:id="rId4"/>
+    <p:sldId id="258" r:id="rId5"/>
+    <p:sldId id="259" r:id="rId6"/>
+    <p:sldId id="260" r:id="rId7"/>
+    <p:sldId id="261" r:id="rId8"/>
+    <p:sldId id="262" r:id="rId9"/>
   </p:sldIdLst>
   <p:sldSz cx="9144000" cy="6858000" type="screen4x3"/>
   <p:notesSz cx="6858000" cy="9144000"/>
@@ -243,11 +245,11 @@
           <c:showBubbleSize val="0"/>
         </c:dLbls>
         <c:gapWidth val="75"/>
-        <c:axId val="37452032"/>
-        <c:axId val="38293888"/>
+        <c:axId val="76054912"/>
+        <c:axId val="38027264"/>
       </c:barChart>
       <c:catAx>
-        <c:axId val="37452032"/>
+        <c:axId val="76054912"/>
         <c:scaling>
           <c:orientation val="minMax"/>
         </c:scaling>
@@ -276,7 +278,7 @@
         <c:majorTickMark val="none"/>
         <c:minorTickMark val="none"/>
         <c:tickLblPos val="nextTo"/>
-        <c:crossAx val="38293888"/>
+        <c:crossAx val="38027264"/>
         <c:crosses val="autoZero"/>
         <c:auto val="1"/>
         <c:lblAlgn val="ctr"/>
@@ -284,7 +286,7 @@
         <c:noMultiLvlLbl val="0"/>
       </c:catAx>
       <c:valAx>
-        <c:axId val="38293888"/>
+        <c:axId val="38027264"/>
         <c:scaling>
           <c:orientation val="minMax"/>
         </c:scaling>
@@ -313,7 +315,7 @@
         <c:majorTickMark val="none"/>
         <c:minorTickMark val="none"/>
         <c:tickLblPos val="nextTo"/>
-        <c:crossAx val="37452032"/>
+        <c:crossAx val="76054912"/>
         <c:crosses val="autoZero"/>
         <c:crossBetween val="between"/>
       </c:valAx>
@@ -476,11 +478,11 @@
           <c:showBubbleSize val="0"/>
         </c:dLbls>
         <c:gapWidth val="75"/>
-        <c:axId val="88547328"/>
-        <c:axId val="88549248"/>
+        <c:axId val="78642560"/>
+        <c:axId val="78718464"/>
       </c:barChart>
       <c:catAx>
-        <c:axId val="88547328"/>
+        <c:axId val="78642560"/>
         <c:scaling>
           <c:orientation val="maxMin"/>
         </c:scaling>
@@ -512,7 +514,7 @@
         <c:majorTickMark val="none"/>
         <c:minorTickMark val="none"/>
         <c:tickLblPos val="nextTo"/>
-        <c:crossAx val="88549248"/>
+        <c:crossAx val="78718464"/>
         <c:crosses val="autoZero"/>
         <c:auto val="1"/>
         <c:lblAlgn val="ctr"/>
@@ -520,7 +522,7 @@
         <c:noMultiLvlLbl val="0"/>
       </c:catAx>
       <c:valAx>
-        <c:axId val="88549248"/>
+        <c:axId val="78718464"/>
         <c:scaling>
           <c:orientation val="minMax"/>
         </c:scaling>
@@ -554,7 +556,7 @@
         <c:majorTickMark val="none"/>
         <c:minorTickMark val="none"/>
         <c:tickLblPos val="nextTo"/>
-        <c:crossAx val="88547328"/>
+        <c:crossAx val="78642560"/>
         <c:crosses val="autoZero"/>
         <c:crossBetween val="between"/>
       </c:valAx>
@@ -998,11 +1000,11 @@
         </c:dLbls>
         <c:gapWidth val="55"/>
         <c:overlap val="100"/>
-        <c:axId val="36931840"/>
-        <c:axId val="36934016"/>
+        <c:axId val="36458496"/>
+        <c:axId val="36460416"/>
       </c:barChart>
       <c:catAx>
-        <c:axId val="36931840"/>
+        <c:axId val="36458496"/>
         <c:scaling>
           <c:orientation val="minMax"/>
         </c:scaling>
@@ -1030,7 +1032,7 @@
         <c:majorTickMark val="none"/>
         <c:minorTickMark val="none"/>
         <c:tickLblPos val="nextTo"/>
-        <c:crossAx val="36934016"/>
+        <c:crossAx val="36460416"/>
         <c:crosses val="autoZero"/>
         <c:auto val="1"/>
         <c:lblAlgn val="ctr"/>
@@ -1038,7 +1040,7 @@
         <c:noMultiLvlLbl val="0"/>
       </c:catAx>
       <c:valAx>
-        <c:axId val="36934016"/>
+        <c:axId val="36460416"/>
         <c:scaling>
           <c:orientation val="minMax"/>
         </c:scaling>
@@ -1068,7 +1070,7 @@
         <c:majorTickMark val="none"/>
         <c:minorTickMark val="none"/>
         <c:tickLblPos val="nextTo"/>
-        <c:crossAx val="36931840"/>
+        <c:crossAx val="36458496"/>
         <c:crosses val="autoZero"/>
         <c:crossBetween val="between"/>
       </c:valAx>
@@ -1393,11 +1395,11 @@
         </c:dLbls>
         <c:marker val="1"/>
         <c:smooth val="0"/>
-        <c:axId val="4881408"/>
-        <c:axId val="4789376"/>
+        <c:axId val="78779136"/>
+        <c:axId val="78781056"/>
       </c:lineChart>
       <c:catAx>
-        <c:axId val="4881408"/>
+        <c:axId val="78779136"/>
         <c:scaling>
           <c:orientation val="minMax"/>
         </c:scaling>
@@ -1430,7 +1432,7 @@
         <c:majorTickMark val="none"/>
         <c:minorTickMark val="none"/>
         <c:tickLblPos val="nextTo"/>
-        <c:crossAx val="4789376"/>
+        <c:crossAx val="78781056"/>
         <c:crosses val="autoZero"/>
         <c:auto val="1"/>
         <c:lblAlgn val="ctr"/>
@@ -1438,7 +1440,7 @@
         <c:noMultiLvlLbl val="0"/>
       </c:catAx>
       <c:valAx>
-        <c:axId val="4789376"/>
+        <c:axId val="78781056"/>
         <c:scaling>
           <c:orientation val="minMax"/>
         </c:scaling>
@@ -1468,7 +1470,7 @@
         <c:majorTickMark val="none"/>
         <c:minorTickMark val="none"/>
         <c:tickLblPos val="nextTo"/>
-        <c:crossAx val="4881408"/>
+        <c:crossAx val="78779136"/>
         <c:crosses val="autoZero"/>
         <c:crossBetween val="between"/>
       </c:valAx>
@@ -1791,11 +1793,11 @@
           <c:showBubbleSize val="0"/>
         </c:dLbls>
         <c:gapWidth val="0"/>
-        <c:axId val="30566272"/>
-        <c:axId val="30572544"/>
+        <c:axId val="80596352"/>
+        <c:axId val="80602624"/>
       </c:barChart>
       <c:catAx>
-        <c:axId val="30566272"/>
+        <c:axId val="80596352"/>
         <c:scaling>
           <c:orientation val="minMax"/>
         </c:scaling>
@@ -1823,7 +1825,7 @@
         <c:majorTickMark val="none"/>
         <c:minorTickMark val="none"/>
         <c:tickLblPos val="nextTo"/>
-        <c:crossAx val="30572544"/>
+        <c:crossAx val="80602624"/>
         <c:crosses val="autoZero"/>
         <c:auto val="1"/>
         <c:lblAlgn val="ctr"/>
@@ -1831,7 +1833,7 @@
         <c:noMultiLvlLbl val="0"/>
       </c:catAx>
       <c:valAx>
-        <c:axId val="30572544"/>
+        <c:axId val="80602624"/>
         <c:scaling>
           <c:orientation val="minMax"/>
         </c:scaling>
@@ -1865,7 +1867,7 @@
         <c:majorTickMark val="out"/>
         <c:minorTickMark val="none"/>
         <c:tickLblPos val="nextTo"/>
-        <c:crossAx val="30566272"/>
+        <c:crossAx val="80596352"/>
         <c:crosses val="autoZero"/>
         <c:crossBetween val="between"/>
       </c:valAx>
@@ -2089,6 +2091,244 @@
         </c:dLbls>
         <c:firstSliceAng val="0"/>
       </c:pieChart>
+    </c:plotArea>
+    <c:plotVisOnly val="1"/>
+    <c:dispBlanksAs val="gap"/>
+    <c:showDLblsOverMax val="0"/>
+  </c:chart>
+  <c:externalData r:id="rId2">
+    <c:autoUpdate val="0"/>
+  </c:externalData>
+</c:chartSpace>
+</file>
+
+<file path=ppt/charts/chart7.xml><?xml version="1.0" encoding="utf-8"?>
+<c:chartSpace xmlns:c="http://schemas.openxmlformats.org/drawingml/2006/chart" xmlns:a="http://schemas.openxmlformats.org/drawingml/2006/main" xmlns:r="http://schemas.openxmlformats.org/officeDocument/2006/relationships">
+  <c:date1904 val="0"/>
+  <c:lang val="en-ZA"/>
+  <c:roundedCorners val="0"/>
+  <mc:AlternateContent xmlns:mc="http://schemas.openxmlformats.org/markup-compatibility/2006">
+    <mc:Choice xmlns:c14="http://schemas.microsoft.com/office/drawing/2007/8/2/chart" Requires="c14">
+      <c14:style val="102"/>
+    </mc:Choice>
+    <mc:Fallback>
+      <c:style val="2"/>
+    </mc:Fallback>
+  </mc:AlternateContent>
+  <c:clrMapOvr bg1="lt1" tx1="dk1" bg2="lt2" tx2="dk2" accent1="accent1" accent2="accent2" accent3="accent3" accent4="accent4" accent5="accent5" accent6="accent6" hlink="hlink" folHlink="folHlink"/>
+  <c:chart>
+    <c:title>
+      <c:tx>
+        <c:rich>
+          <a:bodyPr/>
+          <a:lstStyle/>
+          <a:p>
+            <a:pPr>
+              <a:defRPr sz="3200"/>
+            </a:pPr>
+            <a:r>
+              <a:rPr lang="en-US" sz="3200"/>
+              <a:t>Category</a:t>
+            </a:r>
+            <a:r>
+              <a:rPr lang="en-US" sz="3200" baseline="0"/>
+              <a:t> Averages Greater than Overall Average</a:t>
+            </a:r>
+            <a:endParaRPr lang="en-US" sz="3200"/>
+          </a:p>
+        </c:rich>
+      </c:tx>
+      <c:layout/>
+      <c:overlay val="0"/>
+    </c:title>
+    <c:autoTitleDeleted val="0"/>
+    <c:plotArea>
+      <c:layout/>
+      <c:barChart>
+        <c:barDir val="col"/>
+        <c:grouping val="clustered"/>
+        <c:varyColors val="0"/>
+        <c:ser>
+          <c:idx val="0"/>
+          <c:order val="0"/>
+          <c:tx>
+            <c:strRef>
+              <c:f>'cat-avgs'!$B$1</c:f>
+              <c:strCache>
+                <c:ptCount val="1"/>
+                <c:pt idx="0">
+                  <c:v>avg_rental</c:v>
+                </c:pt>
+              </c:strCache>
+            </c:strRef>
+          </c:tx>
+          <c:spPr>
+            <a:solidFill>
+              <a:schemeClr val="tx2"/>
+            </a:solidFill>
+          </c:spPr>
+          <c:invertIfNegative val="0"/>
+          <c:cat>
+            <c:strRef>
+              <c:f>'cat-avgs'!$A$2:$A$10</c:f>
+              <c:strCache>
+                <c:ptCount val="9"/>
+                <c:pt idx="0">
+                  <c:v>Games</c:v>
+                </c:pt>
+                <c:pt idx="1">
+                  <c:v>Travel</c:v>
+                </c:pt>
+                <c:pt idx="2">
+                  <c:v>Sci-Fi</c:v>
+                </c:pt>
+                <c:pt idx="3">
+                  <c:v>Comedy</c:v>
+                </c:pt>
+                <c:pt idx="4">
+                  <c:v>Sports</c:v>
+                </c:pt>
+                <c:pt idx="5">
+                  <c:v>New</c:v>
+                </c:pt>
+                <c:pt idx="6">
+                  <c:v>Foreign</c:v>
+                </c:pt>
+                <c:pt idx="7">
+                  <c:v>Horror</c:v>
+                </c:pt>
+                <c:pt idx="8">
+                  <c:v>Drama</c:v>
+                </c:pt>
+              </c:strCache>
+            </c:strRef>
+          </c:cat>
+          <c:val>
+            <c:numRef>
+              <c:f>'cat-avgs'!$B$2:$B$10</c:f>
+              <c:numCache>
+                <c:formatCode>General</c:formatCode>
+                <c:ptCount val="9"/>
+                <c:pt idx="0">
+                  <c:v>3.25</c:v>
+                </c:pt>
+                <c:pt idx="1">
+                  <c:v>3.24</c:v>
+                </c:pt>
+                <c:pt idx="2">
+                  <c:v>3.22</c:v>
+                </c:pt>
+                <c:pt idx="3">
+                  <c:v>3.16</c:v>
+                </c:pt>
+                <c:pt idx="4">
+                  <c:v>3.13</c:v>
+                </c:pt>
+                <c:pt idx="5">
+                  <c:v>3.12</c:v>
+                </c:pt>
+                <c:pt idx="6">
+                  <c:v>3.1</c:v>
+                </c:pt>
+                <c:pt idx="7">
+                  <c:v>3.03</c:v>
+                </c:pt>
+                <c:pt idx="8">
+                  <c:v>3.02</c:v>
+                </c:pt>
+              </c:numCache>
+            </c:numRef>
+          </c:val>
+        </c:ser>
+        <c:dLbls>
+          <c:showLegendKey val="0"/>
+          <c:showVal val="0"/>
+          <c:showCatName val="0"/>
+          <c:showSerName val="0"/>
+          <c:showPercent val="0"/>
+          <c:showBubbleSize val="0"/>
+        </c:dLbls>
+        <c:gapWidth val="75"/>
+        <c:overlap val="-25"/>
+        <c:axId val="78323712"/>
+        <c:axId val="78325632"/>
+      </c:barChart>
+      <c:catAx>
+        <c:axId val="78323712"/>
+        <c:scaling>
+          <c:orientation val="minMax"/>
+        </c:scaling>
+        <c:delete val="0"/>
+        <c:axPos val="b"/>
+        <c:title>
+          <c:tx>
+            <c:rich>
+              <a:bodyPr/>
+              <a:lstStyle/>
+              <a:p>
+                <a:pPr>
+                  <a:defRPr sz="1800"/>
+                </a:pPr>
+                <a:r>
+                  <a:rPr lang="en-ZA" sz="1800"/>
+                  <a:t>Categories</a:t>
+                </a:r>
+              </a:p>
+            </c:rich>
+          </c:tx>
+          <c:layout/>
+          <c:overlay val="0"/>
+        </c:title>
+        <c:majorTickMark val="none"/>
+        <c:minorTickMark val="none"/>
+        <c:tickLblPos val="nextTo"/>
+        <c:crossAx val="78325632"/>
+        <c:crosses val="autoZero"/>
+        <c:auto val="1"/>
+        <c:lblAlgn val="ctr"/>
+        <c:lblOffset val="100"/>
+        <c:noMultiLvlLbl val="0"/>
+      </c:catAx>
+      <c:valAx>
+        <c:axId val="78325632"/>
+        <c:scaling>
+          <c:orientation val="minMax"/>
+        </c:scaling>
+        <c:delete val="0"/>
+        <c:axPos val="l"/>
+        <c:majorGridlines/>
+        <c:title>
+          <c:tx>
+            <c:rich>
+              <a:bodyPr rot="-5400000" vert="horz"/>
+              <a:lstStyle/>
+              <a:p>
+                <a:pPr>
+                  <a:defRPr sz="1800"/>
+                </a:pPr>
+                <a:r>
+                  <a:rPr lang="en-ZA" sz="1800"/>
+                  <a:t>Average Rental Rate ($)</a:t>
+                </a:r>
+              </a:p>
+            </c:rich>
+          </c:tx>
+          <c:layout/>
+          <c:overlay val="0"/>
+        </c:title>
+        <c:numFmt formatCode="General" sourceLinked="1"/>
+        <c:majorTickMark val="none"/>
+        <c:minorTickMark val="none"/>
+        <c:tickLblPos val="nextTo"/>
+        <c:spPr>
+          <a:ln w="9525">
+            <a:noFill/>
+          </a:ln>
+        </c:spPr>
+        <c:crossAx val="78323712"/>
+        <c:crosses val="autoZero"/>
+        <c:crossBetween val="between"/>
+      </c:valAx>
     </c:plotArea>
     <c:plotVisOnly val="1"/>
     <c:dispBlanksAs val="gap"/>
@@ -6101,6 +6341,142 @@
       </p:grpSpPr>
       <p:sp>
         <p:nvSpPr>
+          <p:cNvPr id="5" name="Title 4"/>
+          <p:cNvSpPr>
+            <a:spLocks noGrp="1"/>
+          </p:cNvSpPr>
+          <p:nvPr>
+            <p:ph type="ctrTitle"/>
+          </p:nvPr>
+        </p:nvSpPr>
+        <p:spPr/>
+        <p:txBody>
+          <a:bodyPr>
+            <a:normAutofit fontScale="90000"/>
+          </a:bodyPr>
+          <a:lstStyle/>
+          <a:p>
+            <a:r>
+              <a:rPr lang="en-ZA" dirty="0" err="1" smtClean="0"/>
+              <a:t>Raeez</a:t>
+            </a:r>
+            <a:r>
+              <a:rPr lang="en-ZA" dirty="0" smtClean="0"/>
+              <a:t> Ahmed </a:t>
+            </a:r>
+            <a:r>
+              <a:rPr lang="en-ZA" dirty="0" err="1" smtClean="0"/>
+              <a:t>Moosa</a:t>
+            </a:r>
+            <a:r>
+              <a:rPr lang="en-ZA" dirty="0" smtClean="0"/>
+              <a:t/>
+            </a:r>
+            <a:br>
+              <a:rPr lang="en-ZA" dirty="0" smtClean="0"/>
+            </a:br>
+            <a:r>
+              <a:rPr lang="en-ZA" dirty="0" smtClean="0"/>
+              <a:t/>
+            </a:r>
+            <a:br>
+              <a:rPr lang="en-ZA" dirty="0" smtClean="0"/>
+            </a:br>
+            <a:r>
+              <a:rPr lang="en-ZA" dirty="0" err="1" smtClean="0"/>
+              <a:t>Udacity</a:t>
+            </a:r>
+            <a:r>
+              <a:rPr lang="en-ZA" dirty="0" smtClean="0"/>
+              <a:t/>
+            </a:r>
+            <a:br>
+              <a:rPr lang="en-ZA" dirty="0" smtClean="0"/>
+            </a:br>
+            <a:r>
+              <a:rPr lang="en-ZA" dirty="0"/>
+              <a:t/>
+            </a:r>
+            <a:br>
+              <a:rPr lang="en-ZA" dirty="0"/>
+            </a:br>
+            <a:r>
+              <a:rPr lang="en-ZA" dirty="0" err="1" smtClean="0"/>
+              <a:t>Progamming</a:t>
+            </a:r>
+            <a:r>
+              <a:rPr lang="en-ZA" dirty="0" smtClean="0"/>
+              <a:t> for Data Science</a:t>
+            </a:r>
+            <a:br>
+              <a:rPr lang="en-ZA" dirty="0" smtClean="0"/>
+            </a:br>
+            <a:r>
+              <a:rPr lang="en-ZA" dirty="0" smtClean="0"/>
+              <a:t>Project 1 – Relational Database</a:t>
+            </a:r>
+            <a:endParaRPr lang="en-ZA" dirty="0"/>
+          </a:p>
+        </p:txBody>
+      </p:sp>
+      <p:sp>
+        <p:nvSpPr>
+          <p:cNvPr id="6" name="Subtitle 5"/>
+          <p:cNvSpPr>
+            <a:spLocks noGrp="1"/>
+          </p:cNvSpPr>
+          <p:nvPr>
+            <p:ph type="subTitle" idx="1"/>
+          </p:nvPr>
+        </p:nvSpPr>
+        <p:spPr/>
+        <p:txBody>
+          <a:bodyPr/>
+          <a:lstStyle/>
+          <a:p>
+            <a:endParaRPr lang="en-ZA"/>
+          </a:p>
+        </p:txBody>
+      </p:sp>
+    </p:spTree>
+    <p:extLst>
+      <p:ext uri="{BB962C8B-B14F-4D97-AF65-F5344CB8AC3E}">
+        <p14:creationId xmlns:p14="http://schemas.microsoft.com/office/powerpoint/2010/main" val="1796196699"/>
+      </p:ext>
+    </p:extLst>
+  </p:cSld>
+  <p:clrMapOvr>
+    <a:masterClrMapping/>
+  </p:clrMapOvr>
+  <p:timing>
+    <p:tnLst>
+      <p:par>
+        <p:cTn id="1" dur="indefinite" restart="never" nodeType="tmRoot"/>
+      </p:par>
+    </p:tnLst>
+  </p:timing>
+</p:sld>
+</file>
+
+<file path=ppt/slides/slide2.xml><?xml version="1.0" encoding="utf-8"?>
+<p:sld xmlns:a="http://schemas.openxmlformats.org/drawingml/2006/main" xmlns:r="http://schemas.openxmlformats.org/officeDocument/2006/relationships" xmlns:p="http://schemas.openxmlformats.org/presentationml/2006/main">
+  <p:cSld>
+    <p:spTree>
+      <p:nvGrpSpPr>
+        <p:cNvPr id="1" name=""/>
+        <p:cNvGrpSpPr/>
+        <p:nvPr/>
+      </p:nvGrpSpPr>
+      <p:grpSpPr>
+        <a:xfrm>
+          <a:off x="0" y="0"/>
+          <a:ext cx="0" cy="0"/>
+          <a:chOff x="0" y="0"/>
+          <a:chExt cx="0" cy="0"/>
+        </a:xfrm>
+      </p:grpSpPr>
+      <p:sp>
+        <p:nvSpPr>
           <p:cNvPr id="2" name="Title 1"/>
           <p:cNvSpPr>
             <a:spLocks noGrp="1"/>
@@ -6203,7 +6579,7 @@
 </p:sld>
 </file>
 
-<file path=ppt/slides/slide2.xml><?xml version="1.0" encoding="utf-8"?>
+<file path=ppt/slides/slide3.xml><?xml version="1.0" encoding="utf-8"?>
 <p:sld xmlns:a="http://schemas.openxmlformats.org/drawingml/2006/main" xmlns:r="http://schemas.openxmlformats.org/officeDocument/2006/relationships" xmlns:p="http://schemas.openxmlformats.org/presentationml/2006/main">
   <p:cSld>
     <p:spTree>
@@ -6328,7 +6704,7 @@
 </p:sld>
 </file>
 
-<file path=ppt/slides/slide3.xml><?xml version="1.0" encoding="utf-8"?>
+<file path=ppt/slides/slide4.xml><?xml version="1.0" encoding="utf-8"?>
 <p:sld xmlns:a="http://schemas.openxmlformats.org/drawingml/2006/main" xmlns:r="http://schemas.openxmlformats.org/officeDocument/2006/relationships" xmlns:p="http://schemas.openxmlformats.org/presentationml/2006/main">
   <p:cSld>
     <p:spTree>
@@ -6449,7 +6825,7 @@
 </p:sld>
 </file>
 
-<file path=ppt/slides/slide4.xml><?xml version="1.0" encoding="utf-8"?>
+<file path=ppt/slides/slide5.xml><?xml version="1.0" encoding="utf-8"?>
 <p:sld xmlns:a="http://schemas.openxmlformats.org/drawingml/2006/main" xmlns:r="http://schemas.openxmlformats.org/officeDocument/2006/relationships" xmlns:p="http://schemas.openxmlformats.org/presentationml/2006/main">
   <p:cSld>
     <p:spTree>
@@ -6579,7 +6955,7 @@
 </p:sld>
 </file>
 
-<file path=ppt/slides/slide5.xml><?xml version="1.0" encoding="utf-8"?>
+<file path=ppt/slides/slide6.xml><?xml version="1.0" encoding="utf-8"?>
 <p:sld xmlns:a="http://schemas.openxmlformats.org/drawingml/2006/main" xmlns:r="http://schemas.openxmlformats.org/officeDocument/2006/relationships" xmlns:p="http://schemas.openxmlformats.org/presentationml/2006/main">
   <p:cSld>
     <p:spTree>
@@ -6709,7 +7085,7 @@
 </p:sld>
 </file>
 
-<file path=ppt/slides/slide6.xml><?xml version="1.0" encoding="utf-8"?>
+<file path=ppt/slides/slide7.xml><?xml version="1.0" encoding="utf-8"?>
 <p:sld xmlns:a="http://schemas.openxmlformats.org/drawingml/2006/main" xmlns:r="http://schemas.openxmlformats.org/officeDocument/2006/relationships" xmlns:p="http://schemas.openxmlformats.org/presentationml/2006/main">
   <p:cSld>
     <p:spTree>
@@ -6823,6 +7199,136 @@
     <p:extLst>
       <p:ext uri="{BB962C8B-B14F-4D97-AF65-F5344CB8AC3E}">
         <p14:creationId xmlns:p14="http://schemas.microsoft.com/office/powerpoint/2010/main" val="1588561530"/>
+      </p:ext>
+    </p:extLst>
+  </p:cSld>
+  <p:clrMapOvr>
+    <a:masterClrMapping/>
+  </p:clrMapOvr>
+  <p:timing>
+    <p:tnLst>
+      <p:par>
+        <p:cTn id="1" dur="indefinite" restart="never" nodeType="tmRoot"/>
+      </p:par>
+    </p:tnLst>
+  </p:timing>
+</p:sld>
+</file>
+
+<file path=ppt/slides/slide8.xml><?xml version="1.0" encoding="utf-8"?>
+<p:sld xmlns:a="http://schemas.openxmlformats.org/drawingml/2006/main" xmlns:r="http://schemas.openxmlformats.org/officeDocument/2006/relationships" xmlns:p="http://schemas.openxmlformats.org/presentationml/2006/main">
+  <p:cSld>
+    <p:spTree>
+      <p:nvGrpSpPr>
+        <p:cNvPr id="1" name=""/>
+        <p:cNvGrpSpPr/>
+        <p:nvPr/>
+      </p:nvGrpSpPr>
+      <p:grpSpPr>
+        <a:xfrm>
+          <a:off x="0" y="0"/>
+          <a:ext cx="0" cy="0"/>
+          <a:chOff x="0" y="0"/>
+          <a:chExt cx="0" cy="0"/>
+        </a:xfrm>
+      </p:grpSpPr>
+      <p:sp>
+        <p:nvSpPr>
+          <p:cNvPr id="2" name="Title 1"/>
+          <p:cNvSpPr>
+            <a:spLocks noGrp="1"/>
+          </p:cNvSpPr>
+          <p:nvPr>
+            <p:ph type="title"/>
+          </p:nvPr>
+        </p:nvSpPr>
+        <p:spPr>
+          <a:xfrm>
+            <a:off x="5868144" y="764704"/>
+            <a:ext cx="2868632" cy="2304256"/>
+          </a:xfrm>
+        </p:spPr>
+        <p:txBody>
+          <a:bodyPr>
+            <a:noAutofit/>
+          </a:bodyPr>
+          <a:lstStyle/>
+          <a:p>
+            <a:pPr algn="ctr"/>
+            <a:r>
+              <a:rPr lang="en-ZA" sz="2400" dirty="0" smtClean="0"/>
+              <a:t>Which categories have an average rental rate that is greater than the overall rental rate?</a:t>
+            </a:r>
+            <a:endParaRPr lang="en-ZA" sz="2400" dirty="0"/>
+          </a:p>
+        </p:txBody>
+      </p:sp>
+      <p:sp>
+        <p:nvSpPr>
+          <p:cNvPr id="5" name="Text Placeholder 4"/>
+          <p:cNvSpPr>
+            <a:spLocks noGrp="1"/>
+          </p:cNvSpPr>
+          <p:nvPr>
+            <p:ph type="body" idx="2"/>
+          </p:nvPr>
+        </p:nvSpPr>
+        <p:spPr>
+          <a:xfrm>
+            <a:off x="5868144" y="3284984"/>
+            <a:ext cx="2868632" cy="3343463"/>
+          </a:xfrm>
+        </p:spPr>
+        <p:txBody>
+          <a:bodyPr/>
+          <a:lstStyle/>
+          <a:p>
+            <a:r>
+              <a:rPr lang="en-ZA" dirty="0" smtClean="0"/>
+              <a:t>There are 9 categories which have an average rental rate greater than the overall average rental rate of $2.98.</a:t>
+            </a:r>
+          </a:p>
+          <a:p>
+            <a:endParaRPr lang="en-ZA" dirty="0"/>
+          </a:p>
+          <a:p>
+            <a:r>
+              <a:rPr lang="en-ZA" dirty="0" smtClean="0"/>
+              <a:t>The ‘Games’ category has the highest average rental rate of $3.25,  being $0.27 higher than the overall average.</a:t>
+            </a:r>
+            <a:endParaRPr lang="en-ZA" dirty="0"/>
+          </a:p>
+        </p:txBody>
+      </p:sp>
+      <p:graphicFrame>
+        <p:nvGraphicFramePr>
+          <p:cNvPr id="8" name="Content Placeholder 7"/>
+          <p:cNvGraphicFramePr>
+            <a:graphicFrameLocks noGrp="1"/>
+          </p:cNvGraphicFramePr>
+          <p:nvPr>
+            <p:ph sz="half" idx="1"/>
+            <p:extLst>
+              <p:ext uri="{D42A27DB-BD31-4B8C-83A1-F6EECF244321}">
+                <p14:modId xmlns:p14="http://schemas.microsoft.com/office/powerpoint/2010/main" val="296165468"/>
+              </p:ext>
+            </p:extLst>
+          </p:nvPr>
+        </p:nvGraphicFramePr>
+        <p:xfrm>
+          <a:off x="0" y="476672"/>
+          <a:ext cx="5940152" cy="6381328"/>
+        </p:xfrm>
+        <a:graphic>
+          <a:graphicData uri="http://schemas.openxmlformats.org/drawingml/2006/chart">
+            <c:chart xmlns:c="http://schemas.openxmlformats.org/drawingml/2006/chart" xmlns:r="http://schemas.openxmlformats.org/officeDocument/2006/relationships" r:id="rId2"/>
+          </a:graphicData>
+        </a:graphic>
+      </p:graphicFrame>
+    </p:spTree>
+    <p:extLst>
+      <p:ext uri="{BB962C8B-B14F-4D97-AF65-F5344CB8AC3E}">
+        <p14:creationId xmlns:p14="http://schemas.microsoft.com/office/powerpoint/2010/main" val="2832348204"/>
       </p:ext>
     </p:extLst>
   </p:cSld>
@@ -8805,4 +9311,285 @@
     </a:bgFillStyleLst>
   </a:fmtScheme>
 </a:themeOverride>
+</file>
+
+<file path=ppt/theme/themeOverride7.xml><?xml version="1.0" encoding="utf-8"?>
+<a:themeOverride xmlns:a="http://schemas.openxmlformats.org/drawingml/2006/main">
+  <a:clrScheme name="Office">
+    <a:dk1>
+      <a:sysClr val="windowText" lastClr="000000"/>
+    </a:dk1>
+    <a:lt1>
+      <a:sysClr val="window" lastClr="FFFFFF"/>
+    </a:lt1>
+    <a:dk2>
+      <a:srgbClr val="1F497D"/>
+    </a:dk2>
+    <a:lt2>
+      <a:srgbClr val="EEECE1"/>
+    </a:lt2>
+    <a:accent1>
+      <a:srgbClr val="4F81BD"/>
+    </a:accent1>
+    <a:accent2>
+      <a:srgbClr val="C0504D"/>
+    </a:accent2>
+    <a:accent3>
+      <a:srgbClr val="9BBB59"/>
+    </a:accent3>
+    <a:accent4>
+      <a:srgbClr val="8064A2"/>
+    </a:accent4>
+    <a:accent5>
+      <a:srgbClr val="4BACC6"/>
+    </a:accent5>
+    <a:accent6>
+      <a:srgbClr val="F79646"/>
+    </a:accent6>
+    <a:hlink>
+      <a:srgbClr val="0000FF"/>
+    </a:hlink>
+    <a:folHlink>
+      <a:srgbClr val="800080"/>
+    </a:folHlink>
+  </a:clrScheme>
+  <a:fontScheme name="Office">
+    <a:majorFont>
+      <a:latin typeface="Cambria"/>
+      <a:ea typeface=""/>
+      <a:cs typeface=""/>
+      <a:font script="Jpan" typeface="ＭＳ Ｐゴシック"/>
+      <a:font script="Hang" typeface="맑은 고딕"/>
+      <a:font script="Hans" typeface="宋体"/>
+      <a:font script="Hant" typeface="新細明體"/>
+      <a:font script="Arab" typeface="Times New Roman"/>
+      <a:font script="Hebr" typeface="Times New Roman"/>
+      <a:font script="Thai" typeface="Tahoma"/>
+      <a:font script="Ethi" typeface="Nyala"/>
+      <a:font script="Beng" typeface="Vrinda"/>
+      <a:font script="Gujr" typeface="Shruti"/>
+      <a:font script="Khmr" typeface="MoolBoran"/>
+      <a:font script="Knda" typeface="Tunga"/>
+      <a:font script="Guru" typeface="Raavi"/>
+      <a:font script="Cans" typeface="Euphemia"/>
+      <a:font script="Cher" typeface="Plantagenet Cherokee"/>
+      <a:font script="Yiii" typeface="Microsoft Yi Baiti"/>
+      <a:font script="Tibt" typeface="Microsoft Himalaya"/>
+      <a:font script="Thaa" typeface="MV Boli"/>
+      <a:font script="Deva" typeface="Mangal"/>
+      <a:font script="Telu" typeface="Gautami"/>
+      <a:font script="Taml" typeface="Latha"/>
+      <a:font script="Syrc" typeface="Estrangelo Edessa"/>
+      <a:font script="Orya" typeface="Kalinga"/>
+      <a:font script="Mlym" typeface="Kartika"/>
+      <a:font script="Laoo" typeface="DokChampa"/>
+      <a:font script="Sinh" typeface="Iskoola Pota"/>
+      <a:font script="Mong" typeface="Mongolian Baiti"/>
+      <a:font script="Viet" typeface="Times New Roman"/>
+      <a:font script="Uigh" typeface="Microsoft Uighur"/>
+      <a:font script="Geor" typeface="Sylfaen"/>
+    </a:majorFont>
+    <a:minorFont>
+      <a:latin typeface="Calibri"/>
+      <a:ea typeface=""/>
+      <a:cs typeface=""/>
+      <a:font script="Jpan" typeface="ＭＳ Ｐゴシック"/>
+      <a:font script="Hang" typeface="맑은 고딕"/>
+      <a:font script="Hans" typeface="宋体"/>
+      <a:font script="Hant" typeface="新細明體"/>
+      <a:font script="Arab" typeface="Arial"/>
+      <a:font script="Hebr" typeface="Arial"/>
+      <a:font script="Thai" typeface="Tahoma"/>
+      <a:font script="Ethi" typeface="Nyala"/>
+      <a:font script="Beng" typeface="Vrinda"/>
+      <a:font script="Gujr" typeface="Shruti"/>
+      <a:font script="Khmr" typeface="DaunPenh"/>
+      <a:font script="Knda" typeface="Tunga"/>
+      <a:font script="Guru" typeface="Raavi"/>
+      <a:font script="Cans" typeface="Euphemia"/>
+      <a:font script="Cher" typeface="Plantagenet Cherokee"/>
+      <a:font script="Yiii" typeface="Microsoft Yi Baiti"/>
+      <a:font script="Tibt" typeface="Microsoft Himalaya"/>
+      <a:font script="Thaa" typeface="MV Boli"/>
+      <a:font script="Deva" typeface="Mangal"/>
+      <a:font script="Telu" typeface="Gautami"/>
+      <a:font script="Taml" typeface="Latha"/>
+      <a:font script="Syrc" typeface="Estrangelo Edessa"/>
+      <a:font script="Orya" typeface="Kalinga"/>
+      <a:font script="Mlym" typeface="Kartika"/>
+      <a:font script="Laoo" typeface="DokChampa"/>
+      <a:font script="Sinh" typeface="Iskoola Pota"/>
+      <a:font script="Mong" typeface="Mongolian Baiti"/>
+      <a:font script="Viet" typeface="Arial"/>
+      <a:font script="Uigh" typeface="Microsoft Uighur"/>
+      <a:font script="Geor" typeface="Sylfaen"/>
+    </a:minorFont>
+  </a:fontScheme>
+  <a:fmtScheme name="Office">
+    <a:fillStyleLst>
+      <a:solidFill>
+        <a:schemeClr val="phClr"/>
+      </a:solidFill>
+      <a:gradFill rotWithShape="1">
+        <a:gsLst>
+          <a:gs pos="0">
+            <a:schemeClr val="phClr">
+              <a:tint val="50000"/>
+              <a:satMod val="300000"/>
+            </a:schemeClr>
+          </a:gs>
+          <a:gs pos="35000">
+            <a:schemeClr val="phClr">
+              <a:tint val="37000"/>
+              <a:satMod val="300000"/>
+            </a:schemeClr>
+          </a:gs>
+          <a:gs pos="100000">
+            <a:schemeClr val="phClr">
+              <a:tint val="15000"/>
+              <a:satMod val="350000"/>
+            </a:schemeClr>
+          </a:gs>
+        </a:gsLst>
+        <a:lin ang="16200000" scaled="1"/>
+      </a:gradFill>
+      <a:gradFill rotWithShape="1">
+        <a:gsLst>
+          <a:gs pos="0">
+            <a:schemeClr val="phClr">
+              <a:shade val="51000"/>
+              <a:satMod val="130000"/>
+            </a:schemeClr>
+          </a:gs>
+          <a:gs pos="80000">
+            <a:schemeClr val="phClr">
+              <a:shade val="93000"/>
+              <a:satMod val="130000"/>
+            </a:schemeClr>
+          </a:gs>
+          <a:gs pos="100000">
+            <a:schemeClr val="phClr">
+              <a:shade val="94000"/>
+              <a:satMod val="135000"/>
+            </a:schemeClr>
+          </a:gs>
+        </a:gsLst>
+        <a:lin ang="16200000" scaled="0"/>
+      </a:gradFill>
+    </a:fillStyleLst>
+    <a:lnStyleLst>
+      <a:ln w="9525" cap="flat" cmpd="sng" algn="ctr">
+        <a:solidFill>
+          <a:schemeClr val="phClr">
+            <a:shade val="95000"/>
+            <a:satMod val="105000"/>
+          </a:schemeClr>
+        </a:solidFill>
+        <a:prstDash val="solid"/>
+      </a:ln>
+      <a:ln w="25400" cap="flat" cmpd="sng" algn="ctr">
+        <a:solidFill>
+          <a:schemeClr val="phClr"/>
+        </a:solidFill>
+        <a:prstDash val="solid"/>
+      </a:ln>
+      <a:ln w="38100" cap="flat" cmpd="sng" algn="ctr">
+        <a:solidFill>
+          <a:schemeClr val="phClr"/>
+        </a:solidFill>
+        <a:prstDash val="solid"/>
+      </a:ln>
+    </a:lnStyleLst>
+    <a:effectStyleLst>
+      <a:effectStyle>
+        <a:effectLst>
+          <a:outerShdw blurRad="40000" dist="20000" dir="5400000" rotWithShape="0">
+            <a:srgbClr val="000000">
+              <a:alpha val="38000"/>
+            </a:srgbClr>
+          </a:outerShdw>
+        </a:effectLst>
+      </a:effectStyle>
+      <a:effectStyle>
+        <a:effectLst>
+          <a:outerShdw blurRad="40000" dist="23000" dir="5400000" rotWithShape="0">
+            <a:srgbClr val="000000">
+              <a:alpha val="35000"/>
+            </a:srgbClr>
+          </a:outerShdw>
+        </a:effectLst>
+      </a:effectStyle>
+      <a:effectStyle>
+        <a:effectLst>
+          <a:outerShdw blurRad="40000" dist="23000" dir="5400000" rotWithShape="0">
+            <a:srgbClr val="000000">
+              <a:alpha val="35000"/>
+            </a:srgbClr>
+          </a:outerShdw>
+        </a:effectLst>
+        <a:scene3d>
+          <a:camera prst="orthographicFront">
+            <a:rot lat="0" lon="0" rev="0"/>
+          </a:camera>
+          <a:lightRig rig="threePt" dir="t">
+            <a:rot lat="0" lon="0" rev="1200000"/>
+          </a:lightRig>
+        </a:scene3d>
+        <a:sp3d>
+          <a:bevelT w="63500" h="25400"/>
+        </a:sp3d>
+      </a:effectStyle>
+    </a:effectStyleLst>
+    <a:bgFillStyleLst>
+      <a:solidFill>
+        <a:schemeClr val="phClr"/>
+      </a:solidFill>
+      <a:gradFill rotWithShape="1">
+        <a:gsLst>
+          <a:gs pos="0">
+            <a:schemeClr val="phClr">
+              <a:tint val="40000"/>
+              <a:satMod val="350000"/>
+            </a:schemeClr>
+          </a:gs>
+          <a:gs pos="40000">
+            <a:schemeClr val="phClr">
+              <a:tint val="45000"/>
+              <a:shade val="99000"/>
+              <a:satMod val="350000"/>
+            </a:schemeClr>
+          </a:gs>
+          <a:gs pos="100000">
+            <a:schemeClr val="phClr">
+              <a:shade val="20000"/>
+              <a:satMod val="255000"/>
+            </a:schemeClr>
+          </a:gs>
+        </a:gsLst>
+        <a:path path="circle">
+          <a:fillToRect l="50000" t="-80000" r="50000" b="180000"/>
+        </a:path>
+      </a:gradFill>
+      <a:gradFill rotWithShape="1">
+        <a:gsLst>
+          <a:gs pos="0">
+            <a:schemeClr val="phClr">
+              <a:tint val="80000"/>
+              <a:satMod val="300000"/>
+            </a:schemeClr>
+          </a:gs>
+          <a:gs pos="100000">
+            <a:schemeClr val="phClr">
+              <a:shade val="30000"/>
+              <a:satMod val="200000"/>
+            </a:schemeClr>
+          </a:gs>
+        </a:gsLst>
+        <a:path path="circle">
+          <a:fillToRect l="50000" t="50000" r="50000" b="50000"/>
+        </a:path>
+      </a:gradFill>
+    </a:bgFillStyleLst>
+  </a:fmtScheme>
+</a:themeOverride>
 </file>
</xml_diff>